<commit_message>
Equalized pops included in global estimations to localites estimations
</commit_message>
<xml_diff>
--- a/01_Localities/03_Asymetries/results/01_Asymmetries.pptx
+++ b/01_Localities/03_Asymetries/results/01_Asymmetries.pptx
@@ -3304,8 +3304,8 @@
           </p:nvSpPr>
           <p:spPr>
             <a:xfrm>
-              <a:off x="3829859" y="355232"/>
-              <a:ext cx="137458" cy="189505"/>
+              <a:off x="3823413" y="355232"/>
+              <a:ext cx="143903" cy="189505"/>
             </a:xfrm>
             <a:prstGeom prst="rect">
               <a:avLst/>
@@ -3330,8 +3330,8 @@
           </p:nvSpPr>
           <p:spPr>
             <a:xfrm>
-              <a:off x="3769664" y="565793"/>
-              <a:ext cx="197652" cy="189505"/>
+              <a:off x="3762946" y="565793"/>
+              <a:ext cx="204371" cy="189505"/>
             </a:xfrm>
             <a:prstGeom prst="rect">
               <a:avLst/>
@@ -3356,8 +3356,8 @@
           </p:nvSpPr>
           <p:spPr>
             <a:xfrm>
-              <a:off x="3074286" y="776355"/>
-              <a:ext cx="893030" cy="189505"/>
+              <a:off x="3014834" y="776355"/>
+              <a:ext cx="952482" cy="189505"/>
             </a:xfrm>
             <a:prstGeom prst="rect">
               <a:avLst/>
@@ -3382,8 +3382,8 @@
           </p:nvSpPr>
           <p:spPr>
             <a:xfrm>
-              <a:off x="2224829" y="986917"/>
-              <a:ext cx="1742487" cy="189505"/>
+              <a:off x="2383440" y="986917"/>
+              <a:ext cx="1583877" cy="189505"/>
             </a:xfrm>
             <a:prstGeom prst="rect">
               <a:avLst/>
@@ -3408,8 +3408,8 @@
           </p:nvSpPr>
           <p:spPr>
             <a:xfrm>
-              <a:off x="2743667" y="1197478"/>
-              <a:ext cx="1223649" cy="189505"/>
+              <a:off x="2757027" y="1197478"/>
+              <a:ext cx="1210290" cy="189505"/>
             </a:xfrm>
             <a:prstGeom prst="rect">
               <a:avLst/>
@@ -3719,7 +3719,7 @@
           <p:spPr>
             <a:xfrm>
               <a:off x="3967317" y="1773800"/>
-              <a:ext cx="1090383" cy="189505"/>
+              <a:ext cx="1145135" cy="189505"/>
             </a:xfrm>
             <a:prstGeom prst="rect">
               <a:avLst/>
@@ -3745,7 +3745,7 @@
           <p:spPr>
             <a:xfrm>
               <a:off x="3967317" y="1984362"/>
-              <a:ext cx="601193" cy="189505"/>
+              <a:ext cx="624051" cy="189505"/>
             </a:xfrm>
             <a:prstGeom prst="rect">
               <a:avLst/>
@@ -3770,8 +3770,8 @@
           </p:nvSpPr>
           <p:spPr>
             <a:xfrm>
-              <a:off x="3714681" y="2194924"/>
-              <a:ext cx="252635" cy="189505"/>
+              <a:off x="3697322" y="2194924"/>
+              <a:ext cx="269995" cy="189505"/>
             </a:xfrm>
             <a:prstGeom prst="rect">
               <a:avLst/>
@@ -3796,8 +3796,8 @@
           </p:nvSpPr>
           <p:spPr>
             <a:xfrm>
-              <a:off x="3727618" y="2405486"/>
-              <a:ext cx="239698" cy="189505"/>
+              <a:off x="3749446" y="2405486"/>
+              <a:ext cx="217871" cy="189505"/>
             </a:xfrm>
             <a:prstGeom prst="rect">
               <a:avLst/>
@@ -3822,8 +3822,8 @@
           </p:nvSpPr>
           <p:spPr>
             <a:xfrm>
-              <a:off x="3567699" y="2616047"/>
-              <a:ext cx="399617" cy="189505"/>
+              <a:off x="3572449" y="2616047"/>
+              <a:ext cx="394867" cy="189505"/>
             </a:xfrm>
             <a:prstGeom prst="rect">
               <a:avLst/>
@@ -4132,8 +4132,8 @@
           </p:nvSpPr>
           <p:spPr>
             <a:xfrm>
-              <a:off x="3951145" y="3192369"/>
-              <a:ext cx="16171" cy="189505"/>
+              <a:off x="3950442" y="3192369"/>
+              <a:ext cx="16874" cy="189505"/>
             </a:xfrm>
             <a:prstGeom prst="rect">
               <a:avLst/>
@@ -4158,8 +4158,8 @@
           </p:nvSpPr>
           <p:spPr>
             <a:xfrm>
-              <a:off x="3667244" y="3402931"/>
-              <a:ext cx="300072" cy="189505"/>
+              <a:off x="3657948" y="3402931"/>
+              <a:ext cx="309369" cy="189505"/>
             </a:xfrm>
             <a:prstGeom prst="rect">
               <a:avLst/>
@@ -4184,8 +4184,8 @@
           </p:nvSpPr>
           <p:spPr>
             <a:xfrm>
-              <a:off x="3448030" y="3613493"/>
-              <a:ext cx="519287" cy="189505"/>
+              <a:off x="3412327" y="3613493"/>
+              <a:ext cx="554989" cy="189505"/>
             </a:xfrm>
             <a:prstGeom prst="rect">
               <a:avLst/>
@@ -4210,8 +4210,8 @@
           </p:nvSpPr>
           <p:spPr>
             <a:xfrm>
-              <a:off x="1877590" y="3824054"/>
-              <a:ext cx="2089727" cy="189505"/>
+              <a:off x="2067977" y="3824054"/>
+              <a:ext cx="1899340" cy="189505"/>
             </a:xfrm>
             <a:prstGeom prst="rect">
               <a:avLst/>
@@ -4236,8 +4236,8 @@
           </p:nvSpPr>
           <p:spPr>
             <a:xfrm>
-              <a:off x="1832669" y="4034616"/>
-              <a:ext cx="2134648" cy="189505"/>
+              <a:off x="1856106" y="4034616"/>
+              <a:ext cx="2111211" cy="189505"/>
             </a:xfrm>
             <a:prstGeom prst="rect">
               <a:avLst/>
@@ -4547,7 +4547,7 @@
           <p:spPr>
             <a:xfrm>
               <a:off x="3967317" y="4610938"/>
-              <a:ext cx="467178" cy="189505"/>
+              <a:ext cx="491240" cy="189505"/>
             </a:xfrm>
             <a:prstGeom prst="rect">
               <a:avLst/>
@@ -4624,8 +4624,8 @@
           </p:nvSpPr>
           <p:spPr>
             <a:xfrm>
-              <a:off x="3518106" y="5242623"/>
-              <a:ext cx="449210" cy="189505"/>
+              <a:off x="3558574" y="5242623"/>
+              <a:ext cx="408742" cy="189505"/>
             </a:xfrm>
             <a:prstGeom prst="rect">
               <a:avLst/>
@@ -4650,8 +4650,8 @@
           </p:nvSpPr>
           <p:spPr>
             <a:xfrm>
-              <a:off x="3072490" y="5453185"/>
-              <a:ext cx="894827" cy="189505"/>
+              <a:off x="3082333" y="5453185"/>
+              <a:ext cx="884983" cy="189505"/>
             </a:xfrm>
             <a:prstGeom prst="rect">
               <a:avLst/>
@@ -4961,7 +4961,7 @@
           <p:spPr>
             <a:xfrm>
               <a:off x="3967317" y="6029507"/>
-              <a:ext cx="1791451" cy="189505"/>
+              <a:ext cx="1880590" cy="189505"/>
             </a:xfrm>
             <a:prstGeom prst="rect">
               <a:avLst/>
@@ -4987,7 +4987,7 @@
           <p:spPr>
             <a:xfrm>
               <a:off x="3967317" y="6240068"/>
-              <a:ext cx="1392552" cy="189505"/>
+              <a:ext cx="1445598" cy="189505"/>
             </a:xfrm>
             <a:prstGeom prst="rect">
               <a:avLst/>
@@ -5297,7 +5297,7 @@
           <p:spPr>
             <a:xfrm>
               <a:off x="3967317" y="7448075"/>
-              <a:ext cx="1286538" cy="189505"/>
+              <a:ext cx="1351850" cy="189505"/>
             </a:xfrm>
             <a:prstGeom prst="rect">
               <a:avLst/>
@@ -5323,7 +5323,7 @@
           <p:spPr>
             <a:xfrm>
               <a:off x="3967317" y="7658637"/>
-              <a:ext cx="583973" cy="189505"/>
+              <a:ext cx="605613" cy="189505"/>
             </a:xfrm>
             <a:prstGeom prst="rect">
               <a:avLst/>
@@ -5707,7 +5707,7 @@
           </p:nvSpPr>
           <p:spPr>
             <a:xfrm>
-              <a:off x="2170475" y="8511412"/>
+              <a:off x="2092351" y="8511412"/>
               <a:ext cx="0" cy="34794"/>
             </a:xfrm>
             <a:custGeom>
@@ -5747,7 +5747,7 @@
           </p:nvSpPr>
           <p:spPr>
             <a:xfrm>
-              <a:off x="3068896" y="8511412"/>
+              <a:off x="2561093" y="8511412"/>
               <a:ext cx="0" cy="34794"/>
             </a:xfrm>
             <a:custGeom>
@@ -5787,7 +5787,7 @@
           </p:nvSpPr>
           <p:spPr>
             <a:xfrm>
-              <a:off x="3967317" y="8511412"/>
+              <a:off x="3029834" y="8511412"/>
               <a:ext cx="0" cy="34794"/>
             </a:xfrm>
             <a:custGeom>
@@ -5827,7 +5827,7 @@
           </p:nvSpPr>
           <p:spPr>
             <a:xfrm>
-              <a:off x="4865738" y="8511412"/>
+              <a:off x="3498576" y="8511412"/>
               <a:ext cx="0" cy="34794"/>
             </a:xfrm>
             <a:custGeom>
@@ -5867,7 +5867,7 @@
           </p:nvSpPr>
           <p:spPr>
             <a:xfrm>
-              <a:off x="5764159" y="8511412"/>
+              <a:off x="3967317" y="8511412"/>
               <a:ext cx="0" cy="34794"/>
             </a:xfrm>
             <a:custGeom>
@@ -5901,14 +5901,174 @@
         </p:sp>
         <p:sp>
           <p:nvSpPr>
-            <p:cNvPr id="83" name="tx83"/>
-            <p:cNvSpPr/>
-            <p:nvPr/>
-          </p:nvSpPr>
-          <p:spPr>
-            <a:xfrm>
-              <a:off x="2041808" y="8569597"/>
-              <a:ext cx="257333" cy="112077"/>
+            <p:cNvPr id="83" name="pl83"/>
+            <p:cNvSpPr/>
+            <p:nvPr/>
+          </p:nvSpPr>
+          <p:spPr>
+            <a:xfrm>
+              <a:off x="4436058" y="8511412"/>
+              <a:ext cx="0" cy="34794"/>
+            </a:xfrm>
+            <a:custGeom>
+              <a:avLst/>
+              <a:pathLst>
+                <a:path w="0" h="34794">
+                  <a:moveTo>
+                    <a:pt x="0" y="34794"/>
+                  </a:moveTo>
+                  <a:lnTo>
+                    <a:pt x="0" y="0"/>
+                  </a:lnTo>
+                </a:path>
+              </a:pathLst>
+            </a:custGeom>
+            <a:ln w="13550" cap="flat">
+              <a:solidFill>
+                <a:srgbClr val="333333">
+                  <a:alpha val="100000"/>
+                </a:srgbClr>
+              </a:solidFill>
+              <a:prstDash val="solid"/>
+              <a:round/>
+            </a:ln>
+          </p:spPr>
+          <p:txBody>
+            <a:bodyPr/>
+            <a:lstStyle/>
+            <a:p/>
+          </p:txBody>
+        </p:sp>
+        <p:sp>
+          <p:nvSpPr>
+            <p:cNvPr id="84" name="pl84"/>
+            <p:cNvSpPr/>
+            <p:nvPr/>
+          </p:nvSpPr>
+          <p:spPr>
+            <a:xfrm>
+              <a:off x="4904800" y="8511412"/>
+              <a:ext cx="0" cy="34794"/>
+            </a:xfrm>
+            <a:custGeom>
+              <a:avLst/>
+              <a:pathLst>
+                <a:path w="0" h="34794">
+                  <a:moveTo>
+                    <a:pt x="0" y="34794"/>
+                  </a:moveTo>
+                  <a:lnTo>
+                    <a:pt x="0" y="0"/>
+                  </a:lnTo>
+                </a:path>
+              </a:pathLst>
+            </a:custGeom>
+            <a:ln w="13550" cap="flat">
+              <a:solidFill>
+                <a:srgbClr val="333333">
+                  <a:alpha val="100000"/>
+                </a:srgbClr>
+              </a:solidFill>
+              <a:prstDash val="solid"/>
+              <a:round/>
+            </a:ln>
+          </p:spPr>
+          <p:txBody>
+            <a:bodyPr/>
+            <a:lstStyle/>
+            <a:p/>
+          </p:txBody>
+        </p:sp>
+        <p:sp>
+          <p:nvSpPr>
+            <p:cNvPr id="85" name="pl85"/>
+            <p:cNvSpPr/>
+            <p:nvPr/>
+          </p:nvSpPr>
+          <p:spPr>
+            <a:xfrm>
+              <a:off x="5373541" y="8511412"/>
+              <a:ext cx="0" cy="34794"/>
+            </a:xfrm>
+            <a:custGeom>
+              <a:avLst/>
+              <a:pathLst>
+                <a:path w="0" h="34794">
+                  <a:moveTo>
+                    <a:pt x="0" y="34794"/>
+                  </a:moveTo>
+                  <a:lnTo>
+                    <a:pt x="0" y="0"/>
+                  </a:lnTo>
+                </a:path>
+              </a:pathLst>
+            </a:custGeom>
+            <a:ln w="13550" cap="flat">
+              <a:solidFill>
+                <a:srgbClr val="333333">
+                  <a:alpha val="100000"/>
+                </a:srgbClr>
+              </a:solidFill>
+              <a:prstDash val="solid"/>
+              <a:round/>
+            </a:ln>
+          </p:spPr>
+          <p:txBody>
+            <a:bodyPr/>
+            <a:lstStyle/>
+            <a:p/>
+          </p:txBody>
+        </p:sp>
+        <p:sp>
+          <p:nvSpPr>
+            <p:cNvPr id="86" name="pl86"/>
+            <p:cNvSpPr/>
+            <p:nvPr/>
+          </p:nvSpPr>
+          <p:spPr>
+            <a:xfrm>
+              <a:off x="5842283" y="8511412"/>
+              <a:ext cx="0" cy="34794"/>
+            </a:xfrm>
+            <a:custGeom>
+              <a:avLst/>
+              <a:pathLst>
+                <a:path w="0" h="34794">
+                  <a:moveTo>
+                    <a:pt x="0" y="34794"/>
+                  </a:moveTo>
+                  <a:lnTo>
+                    <a:pt x="0" y="0"/>
+                  </a:lnTo>
+                </a:path>
+              </a:pathLst>
+            </a:custGeom>
+            <a:ln w="13550" cap="flat">
+              <a:solidFill>
+                <a:srgbClr val="333333">
+                  <a:alpha val="100000"/>
+                </a:srgbClr>
+              </a:solidFill>
+              <a:prstDash val="solid"/>
+              <a:round/>
+            </a:ln>
+          </p:spPr>
+          <p:txBody>
+            <a:bodyPr/>
+            <a:lstStyle/>
+            <a:p/>
+          </p:txBody>
+        </p:sp>
+        <p:sp>
+          <p:nvSpPr>
+            <p:cNvPr id="87" name="tx87"/>
+            <p:cNvSpPr/>
+            <p:nvPr/>
+          </p:nvSpPr>
+          <p:spPr>
+            <a:xfrm>
+              <a:off x="1923044" y="8569597"/>
+              <a:ext cx="338613" cy="112077"/>
             </a:xfrm>
             <a:prstGeom prst="rect">
               <a:avLst/>
@@ -5940,21 +6100,21 @@
                   <a:latin typeface="Times New Roman"/>
                   <a:cs typeface="Times New Roman"/>
                 </a:rPr>
-                <a:t>-1.0</a:t>
+                <a:t>-1.00</a:t>
               </a:r>
             </a:p>
           </p:txBody>
         </p:sp>
         <p:sp>
           <p:nvSpPr>
-            <p:cNvPr id="84" name="tx84"/>
-            <p:cNvSpPr/>
-            <p:nvPr/>
-          </p:nvSpPr>
-          <p:spPr>
-            <a:xfrm>
-              <a:off x="2940229" y="8569597"/>
-              <a:ext cx="257333" cy="112077"/>
+            <p:cNvPr id="88" name="tx88"/>
+            <p:cNvSpPr/>
+            <p:nvPr/>
+          </p:nvSpPr>
+          <p:spPr>
+            <a:xfrm>
+              <a:off x="2391786" y="8569597"/>
+              <a:ext cx="338613" cy="112077"/>
             </a:xfrm>
             <a:prstGeom prst="rect">
               <a:avLst/>
@@ -5986,21 +6146,21 @@
                   <a:latin typeface="Times New Roman"/>
                   <a:cs typeface="Times New Roman"/>
                 </a:rPr>
-                <a:t>-0.5</a:t>
+                <a:t>-0.75</a:t>
               </a:r>
             </a:p>
           </p:txBody>
         </p:sp>
         <p:sp>
           <p:nvSpPr>
-            <p:cNvPr id="85" name="tx85"/>
-            <p:cNvSpPr/>
-            <p:nvPr/>
-          </p:nvSpPr>
-          <p:spPr>
-            <a:xfrm>
-              <a:off x="3865717" y="8569597"/>
-              <a:ext cx="203200" cy="112077"/>
+            <p:cNvPr id="89" name="tx89"/>
+            <p:cNvSpPr/>
+            <p:nvPr/>
+          </p:nvSpPr>
+          <p:spPr>
+            <a:xfrm>
+              <a:off x="2860527" y="8569597"/>
+              <a:ext cx="338613" cy="112077"/>
             </a:xfrm>
             <a:prstGeom prst="rect">
               <a:avLst/>
@@ -6032,21 +6192,21 @@
                   <a:latin typeface="Times New Roman"/>
                   <a:cs typeface="Times New Roman"/>
                 </a:rPr>
-                <a:t>0.0</a:t>
+                <a:t>-0.50</a:t>
               </a:r>
             </a:p>
           </p:txBody>
         </p:sp>
         <p:sp>
           <p:nvSpPr>
-            <p:cNvPr id="86" name="tx86"/>
-            <p:cNvSpPr/>
-            <p:nvPr/>
-          </p:nvSpPr>
-          <p:spPr>
-            <a:xfrm>
-              <a:off x="4764138" y="8569597"/>
-              <a:ext cx="203200" cy="112077"/>
+            <p:cNvPr id="90" name="tx90"/>
+            <p:cNvSpPr/>
+            <p:nvPr/>
+          </p:nvSpPr>
+          <p:spPr>
+            <a:xfrm>
+              <a:off x="3329269" y="8569597"/>
+              <a:ext cx="338613" cy="112077"/>
             </a:xfrm>
             <a:prstGeom prst="rect">
               <a:avLst/>
@@ -6078,21 +6238,21 @@
                   <a:latin typeface="Times New Roman"/>
                   <a:cs typeface="Times New Roman"/>
                 </a:rPr>
-                <a:t>0.5</a:t>
+                <a:t>-0.25</a:t>
               </a:r>
             </a:p>
           </p:txBody>
         </p:sp>
         <p:sp>
           <p:nvSpPr>
-            <p:cNvPr id="87" name="tx87"/>
-            <p:cNvSpPr/>
-            <p:nvPr/>
-          </p:nvSpPr>
-          <p:spPr>
-            <a:xfrm>
-              <a:off x="5662559" y="8569597"/>
-              <a:ext cx="203200" cy="112077"/>
+            <p:cNvPr id="91" name="tx91"/>
+            <p:cNvSpPr/>
+            <p:nvPr/>
+          </p:nvSpPr>
+          <p:spPr>
+            <a:xfrm>
+              <a:off x="3825077" y="8569597"/>
+              <a:ext cx="284480" cy="112077"/>
             </a:xfrm>
             <a:prstGeom prst="rect">
               <a:avLst/>
@@ -6124,14 +6284,198 @@
                   <a:latin typeface="Times New Roman"/>
                   <a:cs typeface="Times New Roman"/>
                 </a:rPr>
-                <a:t>1.0</a:t>
+                <a:t>0.00</a:t>
               </a:r>
             </a:p>
           </p:txBody>
         </p:sp>
         <p:sp>
           <p:nvSpPr>
-            <p:cNvPr id="88" name="pl88"/>
+            <p:cNvPr id="92" name="tx92"/>
+            <p:cNvSpPr/>
+            <p:nvPr/>
+          </p:nvSpPr>
+          <p:spPr>
+            <a:xfrm>
+              <a:off x="4293818" y="8569597"/>
+              <a:ext cx="284480" cy="112077"/>
+            </a:xfrm>
+            <a:prstGeom prst="rect">
+              <a:avLst/>
+            </a:prstGeom>
+            <a:noFill/>
+          </p:spPr>
+          <p:txBody>
+            <a:bodyPr lIns="0" rIns="0" tIns="0" bIns="0" anchorCtr="1" anchor="ctr" wrap="none"/>
+            <a:lstStyle/>
+            <a:p>
+              <a:pPr algn="l" marL="0" marR="0" indent="0">
+                <a:lnSpc>
+                  <a:spcPts val="1280"/>
+                </a:lnSpc>
+                <a:spcBef>
+                  <a:spcPts val="0"/>
+                </a:spcBef>
+                <a:spcAft>
+                  <a:spcPts val="0"/>
+                </a:spcAft>
+              </a:pPr>
+              <a:r>
+                <a:rPr sz="1280">
+                  <a:solidFill>
+                    <a:srgbClr val="4D4D4D">
+                      <a:alpha val="100000"/>
+                    </a:srgbClr>
+                  </a:solidFill>
+                  <a:latin typeface="Times New Roman"/>
+                  <a:cs typeface="Times New Roman"/>
+                </a:rPr>
+                <a:t>0.25</a:t>
+              </a:r>
+            </a:p>
+          </p:txBody>
+        </p:sp>
+        <p:sp>
+          <p:nvSpPr>
+            <p:cNvPr id="93" name="tx93"/>
+            <p:cNvSpPr/>
+            <p:nvPr/>
+          </p:nvSpPr>
+          <p:spPr>
+            <a:xfrm>
+              <a:off x="4762560" y="8569597"/>
+              <a:ext cx="284480" cy="112077"/>
+            </a:xfrm>
+            <a:prstGeom prst="rect">
+              <a:avLst/>
+            </a:prstGeom>
+            <a:noFill/>
+          </p:spPr>
+          <p:txBody>
+            <a:bodyPr lIns="0" rIns="0" tIns="0" bIns="0" anchorCtr="1" anchor="ctr" wrap="none"/>
+            <a:lstStyle/>
+            <a:p>
+              <a:pPr algn="l" marL="0" marR="0" indent="0">
+                <a:lnSpc>
+                  <a:spcPts val="1280"/>
+                </a:lnSpc>
+                <a:spcBef>
+                  <a:spcPts val="0"/>
+                </a:spcBef>
+                <a:spcAft>
+                  <a:spcPts val="0"/>
+                </a:spcAft>
+              </a:pPr>
+              <a:r>
+                <a:rPr sz="1280">
+                  <a:solidFill>
+                    <a:srgbClr val="4D4D4D">
+                      <a:alpha val="100000"/>
+                    </a:srgbClr>
+                  </a:solidFill>
+                  <a:latin typeface="Times New Roman"/>
+                  <a:cs typeface="Times New Roman"/>
+                </a:rPr>
+                <a:t>0.50</a:t>
+              </a:r>
+            </a:p>
+          </p:txBody>
+        </p:sp>
+        <p:sp>
+          <p:nvSpPr>
+            <p:cNvPr id="94" name="tx94"/>
+            <p:cNvSpPr/>
+            <p:nvPr/>
+          </p:nvSpPr>
+          <p:spPr>
+            <a:xfrm>
+              <a:off x="5231301" y="8569597"/>
+              <a:ext cx="284480" cy="112077"/>
+            </a:xfrm>
+            <a:prstGeom prst="rect">
+              <a:avLst/>
+            </a:prstGeom>
+            <a:noFill/>
+          </p:spPr>
+          <p:txBody>
+            <a:bodyPr lIns="0" rIns="0" tIns="0" bIns="0" anchorCtr="1" anchor="ctr" wrap="none"/>
+            <a:lstStyle/>
+            <a:p>
+              <a:pPr algn="l" marL="0" marR="0" indent="0">
+                <a:lnSpc>
+                  <a:spcPts val="1280"/>
+                </a:lnSpc>
+                <a:spcBef>
+                  <a:spcPts val="0"/>
+                </a:spcBef>
+                <a:spcAft>
+                  <a:spcPts val="0"/>
+                </a:spcAft>
+              </a:pPr>
+              <a:r>
+                <a:rPr sz="1280">
+                  <a:solidFill>
+                    <a:srgbClr val="4D4D4D">
+                      <a:alpha val="100000"/>
+                    </a:srgbClr>
+                  </a:solidFill>
+                  <a:latin typeface="Times New Roman"/>
+                  <a:cs typeface="Times New Roman"/>
+                </a:rPr>
+                <a:t>0.75</a:t>
+              </a:r>
+            </a:p>
+          </p:txBody>
+        </p:sp>
+        <p:sp>
+          <p:nvSpPr>
+            <p:cNvPr id="95" name="tx95"/>
+            <p:cNvSpPr/>
+            <p:nvPr/>
+          </p:nvSpPr>
+          <p:spPr>
+            <a:xfrm>
+              <a:off x="5700043" y="8569597"/>
+              <a:ext cx="284480" cy="112077"/>
+            </a:xfrm>
+            <a:prstGeom prst="rect">
+              <a:avLst/>
+            </a:prstGeom>
+            <a:noFill/>
+          </p:spPr>
+          <p:txBody>
+            <a:bodyPr lIns="0" rIns="0" tIns="0" bIns="0" anchorCtr="1" anchor="ctr" wrap="none"/>
+            <a:lstStyle/>
+            <a:p>
+              <a:pPr algn="l" marL="0" marR="0" indent="0">
+                <a:lnSpc>
+                  <a:spcPts val="1280"/>
+                </a:lnSpc>
+                <a:spcBef>
+                  <a:spcPts val="0"/>
+                </a:spcBef>
+                <a:spcAft>
+                  <a:spcPts val="0"/>
+                </a:spcAft>
+              </a:pPr>
+              <a:r>
+                <a:rPr sz="1280">
+                  <a:solidFill>
+                    <a:srgbClr val="4D4D4D">
+                      <a:alpha val="100000"/>
+                    </a:srgbClr>
+                  </a:solidFill>
+                  <a:latin typeface="Times New Roman"/>
+                  <a:cs typeface="Times New Roman"/>
+                </a:rPr>
+                <a:t>1.00</a:t>
+              </a:r>
+            </a:p>
+          </p:txBody>
+        </p:sp>
+        <p:sp>
+          <p:nvSpPr>
+            <p:cNvPr id="96" name="pl96"/>
             <p:cNvSpPr/>
             <p:nvPr/>
           </p:nvSpPr>
@@ -6171,7 +6515,7 @@
         </p:sp>
         <p:sp>
           <p:nvSpPr>
-            <p:cNvPr id="89" name="tx89"/>
+            <p:cNvPr id="97" name="tx97"/>
             <p:cNvSpPr/>
             <p:nvPr/>
           </p:nvSpPr>
@@ -6217,7 +6561,7 @@
         </p:sp>
         <p:sp>
           <p:nvSpPr>
-            <p:cNvPr id="90" name="tx90"/>
+            <p:cNvPr id="98" name="tx98"/>
             <p:cNvSpPr/>
             <p:nvPr/>
           </p:nvSpPr>
@@ -6263,7 +6607,7 @@
         </p:sp>
         <p:sp>
           <p:nvSpPr>
-            <p:cNvPr id="91" name="tx91"/>
+            <p:cNvPr id="99" name="tx99"/>
             <p:cNvSpPr/>
             <p:nvPr/>
           </p:nvSpPr>
@@ -6309,7 +6653,7 @@
         </p:sp>
         <p:sp>
           <p:nvSpPr>
-            <p:cNvPr id="92" name="tx92"/>
+            <p:cNvPr id="100" name="tx100"/>
             <p:cNvSpPr/>
             <p:nvPr/>
           </p:nvSpPr>
@@ -6355,7 +6699,7 @@
         </p:sp>
         <p:sp>
           <p:nvSpPr>
-            <p:cNvPr id="93" name="tx93"/>
+            <p:cNvPr id="101" name="tx101"/>
             <p:cNvSpPr/>
             <p:nvPr/>
           </p:nvSpPr>
@@ -6401,7 +6745,7 @@
         </p:sp>
         <p:sp>
           <p:nvSpPr>
-            <p:cNvPr id="94" name="pl94"/>
+            <p:cNvPr id="102" name="pl102"/>
             <p:cNvSpPr/>
             <p:nvPr/>
           </p:nvSpPr>
@@ -6441,7 +6785,7 @@
         </p:sp>
         <p:sp>
           <p:nvSpPr>
-            <p:cNvPr id="95" name="pl95"/>
+            <p:cNvPr id="103" name="pl103"/>
             <p:cNvSpPr/>
             <p:nvPr/>
           </p:nvSpPr>
@@ -6481,7 +6825,7 @@
         </p:sp>
         <p:sp>
           <p:nvSpPr>
-            <p:cNvPr id="96" name="pl96"/>
+            <p:cNvPr id="104" name="pl104"/>
             <p:cNvSpPr/>
             <p:nvPr/>
           </p:nvSpPr>
@@ -6521,7 +6865,7 @@
         </p:sp>
         <p:sp>
           <p:nvSpPr>
-            <p:cNvPr id="97" name="pl97"/>
+            <p:cNvPr id="105" name="pl105"/>
             <p:cNvSpPr/>
             <p:nvPr/>
           </p:nvSpPr>
@@ -6561,7 +6905,7 @@
         </p:sp>
         <p:sp>
           <p:nvSpPr>
-            <p:cNvPr id="98" name="pl98"/>
+            <p:cNvPr id="106" name="pl106"/>
             <p:cNvSpPr/>
             <p:nvPr/>
           </p:nvSpPr>
@@ -6601,7 +6945,7 @@
         </p:sp>
         <p:sp>
           <p:nvSpPr>
-            <p:cNvPr id="99" name="pl99"/>
+            <p:cNvPr id="107" name="pl107"/>
             <p:cNvSpPr/>
             <p:nvPr/>
           </p:nvSpPr>
@@ -6641,7 +6985,7 @@
         </p:sp>
         <p:sp>
           <p:nvSpPr>
-            <p:cNvPr id="100" name="tx100"/>
+            <p:cNvPr id="108" name="tx108"/>
             <p:cNvSpPr/>
             <p:nvPr/>
           </p:nvSpPr>
@@ -6687,7 +7031,7 @@
         </p:sp>
         <p:sp>
           <p:nvSpPr>
-            <p:cNvPr id="101" name="tx101"/>
+            <p:cNvPr id="109" name="tx109"/>
             <p:cNvSpPr/>
             <p:nvPr/>
           </p:nvSpPr>
@@ -6733,7 +7077,7 @@
         </p:sp>
         <p:sp>
           <p:nvSpPr>
-            <p:cNvPr id="102" name="tx102"/>
+            <p:cNvPr id="110" name="tx110"/>
             <p:cNvSpPr/>
             <p:nvPr/>
           </p:nvSpPr>
@@ -6779,7 +7123,7 @@
         </p:sp>
         <p:sp>
           <p:nvSpPr>
-            <p:cNvPr id="103" name="tx103"/>
+            <p:cNvPr id="111" name="tx111"/>
             <p:cNvSpPr/>
             <p:nvPr/>
           </p:nvSpPr>
@@ -6825,7 +7169,7 @@
         </p:sp>
         <p:sp>
           <p:nvSpPr>
-            <p:cNvPr id="104" name="tx104"/>
+            <p:cNvPr id="112" name="tx112"/>
             <p:cNvSpPr/>
             <p:nvPr/>
           </p:nvSpPr>
@@ -6871,7 +7215,7 @@
         </p:sp>
         <p:sp>
           <p:nvSpPr>
-            <p:cNvPr id="105" name="pl105"/>
+            <p:cNvPr id="113" name="pl113"/>
             <p:cNvSpPr/>
             <p:nvPr/>
           </p:nvSpPr>
@@ -6911,7 +7255,7 @@
         </p:sp>
         <p:sp>
           <p:nvSpPr>
-            <p:cNvPr id="106" name="pl106"/>
+            <p:cNvPr id="114" name="pl114"/>
             <p:cNvSpPr/>
             <p:nvPr/>
           </p:nvSpPr>
@@ -6951,7 +7295,7 @@
         </p:sp>
         <p:sp>
           <p:nvSpPr>
-            <p:cNvPr id="107" name="pl107"/>
+            <p:cNvPr id="115" name="pl115"/>
             <p:cNvSpPr/>
             <p:nvPr/>
           </p:nvSpPr>
@@ -6991,7 +7335,7 @@
         </p:sp>
         <p:sp>
           <p:nvSpPr>
-            <p:cNvPr id="108" name="pl108"/>
+            <p:cNvPr id="116" name="pl116"/>
             <p:cNvSpPr/>
             <p:nvPr/>
           </p:nvSpPr>
@@ -7031,7 +7375,7 @@
         </p:sp>
         <p:sp>
           <p:nvSpPr>
-            <p:cNvPr id="109" name="pl109"/>
+            <p:cNvPr id="117" name="pl117"/>
             <p:cNvSpPr/>
             <p:nvPr/>
           </p:nvSpPr>
@@ -7071,7 +7415,7 @@
         </p:sp>
         <p:sp>
           <p:nvSpPr>
-            <p:cNvPr id="110" name="pl110"/>
+            <p:cNvPr id="118" name="pl118"/>
             <p:cNvSpPr/>
             <p:nvPr/>
           </p:nvSpPr>
@@ -7111,7 +7455,7 @@
         </p:sp>
         <p:sp>
           <p:nvSpPr>
-            <p:cNvPr id="111" name="tx111"/>
+            <p:cNvPr id="119" name="tx119"/>
             <p:cNvSpPr/>
             <p:nvPr/>
           </p:nvSpPr>
@@ -7157,7 +7501,7 @@
         </p:sp>
         <p:sp>
           <p:nvSpPr>
-            <p:cNvPr id="112" name="tx112"/>
+            <p:cNvPr id="120" name="tx120"/>
             <p:cNvSpPr/>
             <p:nvPr/>
           </p:nvSpPr>
@@ -7203,7 +7547,7 @@
         </p:sp>
         <p:sp>
           <p:nvSpPr>
-            <p:cNvPr id="113" name="tx113"/>
+            <p:cNvPr id="121" name="tx121"/>
             <p:cNvSpPr/>
             <p:nvPr/>
           </p:nvSpPr>
@@ -7249,7 +7593,7 @@
         </p:sp>
         <p:sp>
           <p:nvSpPr>
-            <p:cNvPr id="114" name="tx114"/>
+            <p:cNvPr id="122" name="tx122"/>
             <p:cNvSpPr/>
             <p:nvPr/>
           </p:nvSpPr>
@@ -7295,7 +7639,7 @@
         </p:sp>
         <p:sp>
           <p:nvSpPr>
-            <p:cNvPr id="115" name="tx115"/>
+            <p:cNvPr id="123" name="tx123"/>
             <p:cNvSpPr/>
             <p:nvPr/>
           </p:nvSpPr>
@@ -7341,7 +7685,7 @@
         </p:sp>
         <p:sp>
           <p:nvSpPr>
-            <p:cNvPr id="116" name="pl116"/>
+            <p:cNvPr id="124" name="pl124"/>
             <p:cNvSpPr/>
             <p:nvPr/>
           </p:nvSpPr>
@@ -7381,7 +7725,7 @@
         </p:sp>
         <p:sp>
           <p:nvSpPr>
-            <p:cNvPr id="117" name="pl117"/>
+            <p:cNvPr id="125" name="pl125"/>
             <p:cNvSpPr/>
             <p:nvPr/>
           </p:nvSpPr>
@@ -7421,7 +7765,7 @@
         </p:sp>
         <p:sp>
           <p:nvSpPr>
-            <p:cNvPr id="118" name="pl118"/>
+            <p:cNvPr id="126" name="pl126"/>
             <p:cNvSpPr/>
             <p:nvPr/>
           </p:nvSpPr>
@@ -7461,7 +7805,7 @@
         </p:sp>
         <p:sp>
           <p:nvSpPr>
-            <p:cNvPr id="119" name="pl119"/>
+            <p:cNvPr id="127" name="pl127"/>
             <p:cNvSpPr/>
             <p:nvPr/>
           </p:nvSpPr>
@@ -7501,7 +7845,7 @@
         </p:sp>
         <p:sp>
           <p:nvSpPr>
-            <p:cNvPr id="120" name="pl120"/>
+            <p:cNvPr id="128" name="pl128"/>
             <p:cNvSpPr/>
             <p:nvPr/>
           </p:nvSpPr>
@@ -7541,7 +7885,7 @@
         </p:sp>
         <p:sp>
           <p:nvSpPr>
-            <p:cNvPr id="121" name="pl121"/>
+            <p:cNvPr id="129" name="pl129"/>
             <p:cNvSpPr/>
             <p:nvPr/>
           </p:nvSpPr>
@@ -7581,7 +7925,7 @@
         </p:sp>
         <p:sp>
           <p:nvSpPr>
-            <p:cNvPr id="122" name="tx122"/>
+            <p:cNvPr id="130" name="tx130"/>
             <p:cNvSpPr/>
             <p:nvPr/>
           </p:nvSpPr>
@@ -7627,7 +7971,7 @@
         </p:sp>
         <p:sp>
           <p:nvSpPr>
-            <p:cNvPr id="123" name="tx123"/>
+            <p:cNvPr id="131" name="tx131"/>
             <p:cNvSpPr/>
             <p:nvPr/>
           </p:nvSpPr>
@@ -7673,7 +8017,7 @@
         </p:sp>
         <p:sp>
           <p:nvSpPr>
-            <p:cNvPr id="124" name="tx124"/>
+            <p:cNvPr id="132" name="tx132"/>
             <p:cNvSpPr/>
             <p:nvPr/>
           </p:nvSpPr>
@@ -7719,7 +8063,7 @@
         </p:sp>
         <p:sp>
           <p:nvSpPr>
-            <p:cNvPr id="125" name="tx125"/>
+            <p:cNvPr id="133" name="tx133"/>
             <p:cNvSpPr/>
             <p:nvPr/>
           </p:nvSpPr>
@@ -7765,7 +8109,7 @@
         </p:sp>
         <p:sp>
           <p:nvSpPr>
-            <p:cNvPr id="126" name="tx126"/>
+            <p:cNvPr id="134" name="tx134"/>
             <p:cNvSpPr/>
             <p:nvPr/>
           </p:nvSpPr>
@@ -7811,7 +8155,7 @@
         </p:sp>
         <p:sp>
           <p:nvSpPr>
-            <p:cNvPr id="127" name="pl127"/>
+            <p:cNvPr id="135" name="pl135"/>
             <p:cNvSpPr/>
             <p:nvPr/>
           </p:nvSpPr>
@@ -7851,7 +8195,7 @@
         </p:sp>
         <p:sp>
           <p:nvSpPr>
-            <p:cNvPr id="128" name="pl128"/>
+            <p:cNvPr id="136" name="pl136"/>
             <p:cNvSpPr/>
             <p:nvPr/>
           </p:nvSpPr>
@@ -7891,7 +8235,7 @@
         </p:sp>
         <p:sp>
           <p:nvSpPr>
-            <p:cNvPr id="129" name="pl129"/>
+            <p:cNvPr id="137" name="pl137"/>
             <p:cNvSpPr/>
             <p:nvPr/>
           </p:nvSpPr>
@@ -7931,7 +8275,7 @@
         </p:sp>
         <p:sp>
           <p:nvSpPr>
-            <p:cNvPr id="130" name="pl130"/>
+            <p:cNvPr id="138" name="pl138"/>
             <p:cNvSpPr/>
             <p:nvPr/>
           </p:nvSpPr>
@@ -7971,7 +8315,7 @@
         </p:sp>
         <p:sp>
           <p:nvSpPr>
-            <p:cNvPr id="131" name="pl131"/>
+            <p:cNvPr id="139" name="pl139"/>
             <p:cNvSpPr/>
             <p:nvPr/>
           </p:nvSpPr>
@@ -8011,7 +8355,7 @@
         </p:sp>
         <p:sp>
           <p:nvSpPr>
-            <p:cNvPr id="132" name="pl132"/>
+            <p:cNvPr id="140" name="pl140"/>
             <p:cNvSpPr/>
             <p:nvPr/>
           </p:nvSpPr>
@@ -8051,7 +8395,7 @@
         </p:sp>
         <p:sp>
           <p:nvSpPr>
-            <p:cNvPr id="133" name="tx133"/>
+            <p:cNvPr id="141" name="tx141"/>
             <p:cNvSpPr/>
             <p:nvPr/>
           </p:nvSpPr>
@@ -8097,7 +8441,7 @@
         </p:sp>
         <p:sp>
           <p:nvSpPr>
-            <p:cNvPr id="134" name="tx134"/>
+            <p:cNvPr id="142" name="tx142"/>
             <p:cNvSpPr/>
             <p:nvPr/>
           </p:nvSpPr>
@@ -8143,7 +8487,7 @@
         </p:sp>
         <p:sp>
           <p:nvSpPr>
-            <p:cNvPr id="135" name="tx135"/>
+            <p:cNvPr id="143" name="tx143"/>
             <p:cNvSpPr/>
             <p:nvPr/>
           </p:nvSpPr>
@@ -8189,7 +8533,7 @@
         </p:sp>
         <p:sp>
           <p:nvSpPr>
-            <p:cNvPr id="136" name="tx136"/>
+            <p:cNvPr id="144" name="tx144"/>
             <p:cNvSpPr/>
             <p:nvPr/>
           </p:nvSpPr>
@@ -8235,7 +8579,7 @@
         </p:sp>
         <p:sp>
           <p:nvSpPr>
-            <p:cNvPr id="137" name="tx137"/>
+            <p:cNvPr id="145" name="tx145"/>
             <p:cNvSpPr/>
             <p:nvPr/>
           </p:nvSpPr>
@@ -8281,7 +8625,7 @@
         </p:sp>
         <p:sp>
           <p:nvSpPr>
-            <p:cNvPr id="138" name="pl138"/>
+            <p:cNvPr id="146" name="pl146"/>
             <p:cNvSpPr/>
             <p:nvPr/>
           </p:nvSpPr>
@@ -8321,7 +8665,7 @@
         </p:sp>
         <p:sp>
           <p:nvSpPr>
-            <p:cNvPr id="139" name="pl139"/>
+            <p:cNvPr id="147" name="pl147"/>
             <p:cNvSpPr/>
             <p:nvPr/>
           </p:nvSpPr>
@@ -8361,7 +8705,7 @@
         </p:sp>
         <p:sp>
           <p:nvSpPr>
-            <p:cNvPr id="140" name="pl140"/>
+            <p:cNvPr id="148" name="pl148"/>
             <p:cNvSpPr/>
             <p:nvPr/>
           </p:nvSpPr>
@@ -8401,7 +8745,7 @@
         </p:sp>
         <p:sp>
           <p:nvSpPr>
-            <p:cNvPr id="141" name="pl141"/>
+            <p:cNvPr id="149" name="pl149"/>
             <p:cNvSpPr/>
             <p:nvPr/>
           </p:nvSpPr>
@@ -8441,7 +8785,7 @@
         </p:sp>
         <p:sp>
           <p:nvSpPr>
-            <p:cNvPr id="142" name="pl142"/>
+            <p:cNvPr id="150" name="pl150"/>
             <p:cNvSpPr/>
             <p:nvPr/>
           </p:nvSpPr>
@@ -8481,7 +8825,7 @@
         </p:sp>
         <p:sp>
           <p:nvSpPr>
-            <p:cNvPr id="143" name="pl143"/>
+            <p:cNvPr id="151" name="pl151"/>
             <p:cNvSpPr/>
             <p:nvPr/>
           </p:nvSpPr>
@@ -8521,7 +8865,7 @@
         </p:sp>
         <p:sp>
           <p:nvSpPr>
-            <p:cNvPr id="144" name="tx144"/>
+            <p:cNvPr id="152" name="tx152"/>
             <p:cNvSpPr/>
             <p:nvPr/>
           </p:nvSpPr>
@@ -8567,7 +8911,7 @@
         </p:sp>
         <p:sp>
           <p:nvSpPr>
-            <p:cNvPr id="145" name="tx145"/>
+            <p:cNvPr id="153" name="tx153"/>
             <p:cNvSpPr/>
             <p:nvPr/>
           </p:nvSpPr>
@@ -8613,7 +8957,7 @@
         </p:sp>
         <p:sp>
           <p:nvSpPr>
-            <p:cNvPr id="146" name="tx146"/>
+            <p:cNvPr id="154" name="tx154"/>
             <p:cNvSpPr/>
             <p:nvPr/>
           </p:nvSpPr>
@@ -8659,7 +9003,7 @@
         </p:sp>
         <p:sp>
           <p:nvSpPr>
-            <p:cNvPr id="147" name="tx147"/>
+            <p:cNvPr id="155" name="tx155"/>
             <p:cNvSpPr/>
             <p:nvPr/>
           </p:nvSpPr>
@@ -8705,7 +9049,7 @@
         </p:sp>
         <p:sp>
           <p:nvSpPr>
-            <p:cNvPr id="148" name="tx148"/>
+            <p:cNvPr id="156" name="tx156"/>
             <p:cNvSpPr/>
             <p:nvPr/>
           </p:nvSpPr>
@@ -8751,7 +9095,7 @@
         </p:sp>
         <p:sp>
           <p:nvSpPr>
-            <p:cNvPr id="149" name="pl149"/>
+            <p:cNvPr id="157" name="pl157"/>
             <p:cNvSpPr/>
             <p:nvPr/>
           </p:nvSpPr>
@@ -8791,7 +9135,7 @@
         </p:sp>
         <p:sp>
           <p:nvSpPr>
-            <p:cNvPr id="150" name="pl150"/>
+            <p:cNvPr id="158" name="pl158"/>
             <p:cNvSpPr/>
             <p:nvPr/>
           </p:nvSpPr>
@@ -8831,7 +9175,7 @@
         </p:sp>
         <p:sp>
           <p:nvSpPr>
-            <p:cNvPr id="151" name="pl151"/>
+            <p:cNvPr id="159" name="pl159"/>
             <p:cNvSpPr/>
             <p:nvPr/>
           </p:nvSpPr>
@@ -8871,7 +9215,7 @@
         </p:sp>
         <p:sp>
           <p:nvSpPr>
-            <p:cNvPr id="152" name="pl152"/>
+            <p:cNvPr id="160" name="pl160"/>
             <p:cNvSpPr/>
             <p:nvPr/>
           </p:nvSpPr>
@@ -8911,7 +9255,7 @@
         </p:sp>
         <p:sp>
           <p:nvSpPr>
-            <p:cNvPr id="153" name="pl153"/>
+            <p:cNvPr id="161" name="pl161"/>
             <p:cNvSpPr/>
             <p:nvPr/>
           </p:nvSpPr>
@@ -8951,7 +9295,7 @@
         </p:sp>
         <p:sp>
           <p:nvSpPr>
-            <p:cNvPr id="154" name="tx154"/>
+            <p:cNvPr id="162" name="tx162"/>
             <p:cNvSpPr/>
             <p:nvPr/>
           </p:nvSpPr>
@@ -8997,7 +9341,7 @@
         </p:sp>
         <p:sp>
           <p:nvSpPr>
-            <p:cNvPr id="155" name="tx155"/>
+            <p:cNvPr id="163" name="tx163"/>
             <p:cNvSpPr/>
             <p:nvPr/>
           </p:nvSpPr>

</xml_diff>

<commit_message>
After peer-review on JoEB
</commit_message>
<xml_diff>
--- a/01_Localities/03_Asymetries/results/01_Asymmetries.pptx
+++ b/01_Localities/03_Asymetries/results/01_Asymmetries.pptx
@@ -2,13 +2,13 @@
 <file path=ppt/presentation.xml><?xml version="1.0" encoding="utf-8"?>
 <p:presentation xmlns:a="http://schemas.openxmlformats.org/drawingml/2006/main" xmlns:r="http://schemas.openxmlformats.org/officeDocument/2006/relationships" xmlns:p="http://schemas.openxmlformats.org/presentationml/2006/main" saveSubsetFonts="1">
   <p:sldMasterIdLst>
-    <p:sldMasterId id="2147483720" r:id="rId1"/>
+    <p:sldMasterId id="2147483696" r:id="rId1"/>
   </p:sldMasterIdLst>
   <p:sldIdLst>
     <p:sldId id="256" r:id="rId2"/>
   </p:sldIdLst>
-  <p:sldSz cx="6408738" cy="8999538"/>
-  <p:notesSz cx="9144000" cy="6858000"/>
+  <p:sldSz cx="6408738" cy="6408738"/>
+  <p:notesSz cx="6858000" cy="9144000"/>
   <p:defaultTextStyle>
     <a:defPPr>
       <a:defRPr lang="en-US"/>
@@ -141,8 +141,8 @@
         </p:nvSpPr>
         <p:spPr>
           <a:xfrm>
-            <a:off x="480656" y="1472842"/>
-            <a:ext cx="5447427" cy="3133172"/>
+            <a:off x="480656" y="1048838"/>
+            <a:ext cx="5447427" cy="2231190"/>
           </a:xfrm>
         </p:spPr>
         <p:txBody>
@@ -173,8 +173,8 @@
         </p:nvSpPr>
         <p:spPr>
           <a:xfrm>
-            <a:off x="801092" y="4726842"/>
-            <a:ext cx="4806554" cy="2172804"/>
+            <a:off x="801092" y="3366072"/>
+            <a:ext cx="4806554" cy="1547294"/>
           </a:xfrm>
         </p:spPr>
         <p:txBody>
@@ -243,7 +243,7 @@
           <a:p>
             <a:fld id="{A1626F8F-BADC-42B5-8999-017B7F317904}" type="datetimeFigureOut">
               <a:rPr lang="en-US" smtClean="0"/>
-              <a:t>5/24/2023</a:t>
+              <a:t>3/30/2024</a:t>
             </a:fld>
             <a:endParaRPr lang="en-US"/>
           </a:p>
@@ -294,7 +294,7 @@
     </p:spTree>
     <p:extLst>
       <p:ext uri="{BB962C8B-B14F-4D97-AF65-F5344CB8AC3E}">
-        <p14:creationId xmlns:p14="http://schemas.microsoft.com/office/powerpoint/2010/main" val="4089204208"/>
+        <p14:creationId xmlns:p14="http://schemas.microsoft.com/office/powerpoint/2010/main" val="1649303558"/>
       </p:ext>
     </p:extLst>
   </p:cSld>
@@ -413,7 +413,7 @@
           <a:p>
             <a:fld id="{A1626F8F-BADC-42B5-8999-017B7F317904}" type="datetimeFigureOut">
               <a:rPr lang="en-US" smtClean="0"/>
-              <a:t>5/24/2023</a:t>
+              <a:t>3/30/2024</a:t>
             </a:fld>
             <a:endParaRPr lang="en-US"/>
           </a:p>
@@ -464,7 +464,7 @@
     </p:spTree>
     <p:extLst>
       <p:ext uri="{BB962C8B-B14F-4D97-AF65-F5344CB8AC3E}">
-        <p14:creationId xmlns:p14="http://schemas.microsoft.com/office/powerpoint/2010/main" val="4285551289"/>
+        <p14:creationId xmlns:p14="http://schemas.microsoft.com/office/powerpoint/2010/main" val="1008074035"/>
       </p:ext>
     </p:extLst>
   </p:cSld>
@@ -503,8 +503,8 @@
         </p:nvSpPr>
         <p:spPr>
           <a:xfrm>
-            <a:off x="4586254" y="479142"/>
-            <a:ext cx="1381884" cy="7626692"/>
+            <a:off x="4586254" y="341206"/>
+            <a:ext cx="1381884" cy="5431109"/>
           </a:xfrm>
         </p:spPr>
         <p:txBody>
@@ -531,8 +531,8 @@
         </p:nvSpPr>
         <p:spPr>
           <a:xfrm>
-            <a:off x="440601" y="479142"/>
-            <a:ext cx="4065543" cy="7626692"/>
+            <a:off x="440601" y="341206"/>
+            <a:ext cx="4065543" cy="5431109"/>
           </a:xfrm>
         </p:spPr>
         <p:txBody>
@@ -593,7 +593,7 @@
           <a:p>
             <a:fld id="{A1626F8F-BADC-42B5-8999-017B7F317904}" type="datetimeFigureOut">
               <a:rPr lang="en-US" smtClean="0"/>
-              <a:t>5/24/2023</a:t>
+              <a:t>3/30/2024</a:t>
             </a:fld>
             <a:endParaRPr lang="en-US"/>
           </a:p>
@@ -644,7 +644,7 @@
     </p:spTree>
     <p:extLst>
       <p:ext uri="{BB962C8B-B14F-4D97-AF65-F5344CB8AC3E}">
-        <p14:creationId xmlns:p14="http://schemas.microsoft.com/office/powerpoint/2010/main" val="378016083"/>
+        <p14:creationId xmlns:p14="http://schemas.microsoft.com/office/powerpoint/2010/main" val="3925183514"/>
       </p:ext>
     </p:extLst>
   </p:cSld>
@@ -763,7 +763,7 @@
           <a:p>
             <a:fld id="{A1626F8F-BADC-42B5-8999-017B7F317904}" type="datetimeFigureOut">
               <a:rPr lang="en-US" smtClean="0"/>
-              <a:t>5/24/2023</a:t>
+              <a:t>3/30/2024</a:t>
             </a:fld>
             <a:endParaRPr lang="en-US"/>
           </a:p>
@@ -814,7 +814,7 @@
     </p:spTree>
     <p:extLst>
       <p:ext uri="{BB962C8B-B14F-4D97-AF65-F5344CB8AC3E}">
-        <p14:creationId xmlns:p14="http://schemas.microsoft.com/office/powerpoint/2010/main" val="2280455134"/>
+        <p14:creationId xmlns:p14="http://schemas.microsoft.com/office/powerpoint/2010/main" val="37003626"/>
       </p:ext>
     </p:extLst>
   </p:cSld>
@@ -853,8 +853,8 @@
         </p:nvSpPr>
         <p:spPr>
           <a:xfrm>
-            <a:off x="437263" y="2243638"/>
-            <a:ext cx="5527537" cy="3743557"/>
+            <a:off x="437263" y="1597736"/>
+            <a:ext cx="5527537" cy="2665857"/>
           </a:xfrm>
         </p:spPr>
         <p:txBody>
@@ -885,8 +885,8 @@
         </p:nvSpPr>
         <p:spPr>
           <a:xfrm>
-            <a:off x="437263" y="6022610"/>
-            <a:ext cx="5527537" cy="1968648"/>
+            <a:off x="437263" y="4288812"/>
+            <a:ext cx="5527537" cy="1401911"/>
           </a:xfrm>
         </p:spPr>
         <p:txBody>
@@ -1007,7 +1007,7 @@
           <a:p>
             <a:fld id="{A1626F8F-BADC-42B5-8999-017B7F317904}" type="datetimeFigureOut">
               <a:rPr lang="en-US" smtClean="0"/>
-              <a:t>5/24/2023</a:t>
+              <a:t>3/30/2024</a:t>
             </a:fld>
             <a:endParaRPr lang="en-US"/>
           </a:p>
@@ -1058,7 +1058,7 @@
     </p:spTree>
     <p:extLst>
       <p:ext uri="{BB962C8B-B14F-4D97-AF65-F5344CB8AC3E}">
-        <p14:creationId xmlns:p14="http://schemas.microsoft.com/office/powerpoint/2010/main" val="3210717802"/>
+        <p14:creationId xmlns:p14="http://schemas.microsoft.com/office/powerpoint/2010/main" val="3545126942"/>
       </p:ext>
     </p:extLst>
   </p:cSld>
@@ -1120,8 +1120,8 @@
         </p:nvSpPr>
         <p:spPr>
           <a:xfrm>
-            <a:off x="440601" y="2395710"/>
-            <a:ext cx="2723714" cy="5710124"/>
+            <a:off x="440601" y="1706030"/>
+            <a:ext cx="2723714" cy="4066285"/>
           </a:xfrm>
         </p:spPr>
         <p:txBody>
@@ -1177,8 +1177,8 @@
         </p:nvSpPr>
         <p:spPr>
           <a:xfrm>
-            <a:off x="3244423" y="2395710"/>
-            <a:ext cx="2723714" cy="5710124"/>
+            <a:off x="3244423" y="1706030"/>
+            <a:ext cx="2723714" cy="4066285"/>
           </a:xfrm>
         </p:spPr>
         <p:txBody>
@@ -1239,7 +1239,7 @@
           <a:p>
             <a:fld id="{A1626F8F-BADC-42B5-8999-017B7F317904}" type="datetimeFigureOut">
               <a:rPr lang="en-US" smtClean="0"/>
-              <a:t>5/24/2023</a:t>
+              <a:t>3/30/2024</a:t>
             </a:fld>
             <a:endParaRPr lang="en-US"/>
           </a:p>
@@ -1290,7 +1290,7 @@
     </p:spTree>
     <p:extLst>
       <p:ext uri="{BB962C8B-B14F-4D97-AF65-F5344CB8AC3E}">
-        <p14:creationId xmlns:p14="http://schemas.microsoft.com/office/powerpoint/2010/main" val="1581252807"/>
+        <p14:creationId xmlns:p14="http://schemas.microsoft.com/office/powerpoint/2010/main" val="2385724571"/>
       </p:ext>
     </p:extLst>
   </p:cSld>
@@ -1329,8 +1329,8 @@
         </p:nvSpPr>
         <p:spPr>
           <a:xfrm>
-            <a:off x="441435" y="479144"/>
-            <a:ext cx="5527537" cy="1739495"/>
+            <a:off x="441435" y="341208"/>
+            <a:ext cx="5527537" cy="1238726"/>
           </a:xfrm>
         </p:spPr>
         <p:txBody>
@@ -1357,8 +1357,8 @@
         </p:nvSpPr>
         <p:spPr>
           <a:xfrm>
-            <a:off x="441436" y="2206137"/>
-            <a:ext cx="2711196" cy="1081194"/>
+            <a:off x="441436" y="1571031"/>
+            <a:ext cx="2711196" cy="769938"/>
           </a:xfrm>
         </p:spPr>
         <p:txBody>
@@ -1422,8 +1422,8 @@
         </p:nvSpPr>
         <p:spPr>
           <a:xfrm>
-            <a:off x="441436" y="3287331"/>
-            <a:ext cx="2711196" cy="4835169"/>
+            <a:off x="441436" y="2340969"/>
+            <a:ext cx="2711196" cy="3443214"/>
           </a:xfrm>
         </p:spPr>
         <p:txBody>
@@ -1479,8 +1479,8 @@
         </p:nvSpPr>
         <p:spPr>
           <a:xfrm>
-            <a:off x="3244424" y="2206137"/>
-            <a:ext cx="2724548" cy="1081194"/>
+            <a:off x="3244424" y="1571031"/>
+            <a:ext cx="2724548" cy="769938"/>
           </a:xfrm>
         </p:spPr>
         <p:txBody>
@@ -1544,8 +1544,8 @@
         </p:nvSpPr>
         <p:spPr>
           <a:xfrm>
-            <a:off x="3244424" y="3287331"/>
-            <a:ext cx="2724548" cy="4835169"/>
+            <a:off x="3244424" y="2340969"/>
+            <a:ext cx="2724548" cy="3443214"/>
           </a:xfrm>
         </p:spPr>
         <p:txBody>
@@ -1606,7 +1606,7 @@
           <a:p>
             <a:fld id="{A1626F8F-BADC-42B5-8999-017B7F317904}" type="datetimeFigureOut">
               <a:rPr lang="en-US" smtClean="0"/>
-              <a:t>5/24/2023</a:t>
+              <a:t>3/30/2024</a:t>
             </a:fld>
             <a:endParaRPr lang="en-US"/>
           </a:p>
@@ -1657,7 +1657,7 @@
     </p:spTree>
     <p:extLst>
       <p:ext uri="{BB962C8B-B14F-4D97-AF65-F5344CB8AC3E}">
-        <p14:creationId xmlns:p14="http://schemas.microsoft.com/office/powerpoint/2010/main" val="864616951"/>
+        <p14:creationId xmlns:p14="http://schemas.microsoft.com/office/powerpoint/2010/main" val="195201741"/>
       </p:ext>
     </p:extLst>
   </p:cSld>
@@ -1724,7 +1724,7 @@
           <a:p>
             <a:fld id="{A1626F8F-BADC-42B5-8999-017B7F317904}" type="datetimeFigureOut">
               <a:rPr lang="en-US" smtClean="0"/>
-              <a:t>5/24/2023</a:t>
+              <a:t>3/30/2024</a:t>
             </a:fld>
             <a:endParaRPr lang="en-US"/>
           </a:p>
@@ -1775,7 +1775,7 @@
     </p:spTree>
     <p:extLst>
       <p:ext uri="{BB962C8B-B14F-4D97-AF65-F5344CB8AC3E}">
-        <p14:creationId xmlns:p14="http://schemas.microsoft.com/office/powerpoint/2010/main" val="471927585"/>
+        <p14:creationId xmlns:p14="http://schemas.microsoft.com/office/powerpoint/2010/main" val="403696712"/>
       </p:ext>
     </p:extLst>
   </p:cSld>
@@ -1819,7 +1819,7 @@
           <a:p>
             <a:fld id="{A1626F8F-BADC-42B5-8999-017B7F317904}" type="datetimeFigureOut">
               <a:rPr lang="en-US" smtClean="0"/>
-              <a:t>5/24/2023</a:t>
+              <a:t>3/30/2024</a:t>
             </a:fld>
             <a:endParaRPr lang="en-US"/>
           </a:p>
@@ -1870,7 +1870,7 @@
     </p:spTree>
     <p:extLst>
       <p:ext uri="{BB962C8B-B14F-4D97-AF65-F5344CB8AC3E}">
-        <p14:creationId xmlns:p14="http://schemas.microsoft.com/office/powerpoint/2010/main" val="712919019"/>
+        <p14:creationId xmlns:p14="http://schemas.microsoft.com/office/powerpoint/2010/main" val="2880138007"/>
       </p:ext>
     </p:extLst>
   </p:cSld>
@@ -1909,8 +1909,8 @@
         </p:nvSpPr>
         <p:spPr>
           <a:xfrm>
-            <a:off x="441435" y="599969"/>
-            <a:ext cx="2066985" cy="2099892"/>
+            <a:off x="441435" y="427249"/>
+            <a:ext cx="2066985" cy="1495372"/>
           </a:xfrm>
         </p:spPr>
         <p:txBody>
@@ -1941,8 +1941,8 @@
         </p:nvSpPr>
         <p:spPr>
           <a:xfrm>
-            <a:off x="2724548" y="1295769"/>
-            <a:ext cx="3244424" cy="6395505"/>
+            <a:off x="2724548" y="922741"/>
+            <a:ext cx="3244424" cy="4554358"/>
           </a:xfrm>
         </p:spPr>
         <p:txBody>
@@ -2026,8 +2026,8 @@
         </p:nvSpPr>
         <p:spPr>
           <a:xfrm>
-            <a:off x="441435" y="2699862"/>
-            <a:ext cx="2066985" cy="5001827"/>
+            <a:off x="441435" y="1922621"/>
+            <a:ext cx="2066985" cy="3561894"/>
           </a:xfrm>
         </p:spPr>
         <p:txBody>
@@ -2096,7 +2096,7 @@
           <a:p>
             <a:fld id="{A1626F8F-BADC-42B5-8999-017B7F317904}" type="datetimeFigureOut">
               <a:rPr lang="en-US" smtClean="0"/>
-              <a:t>5/24/2023</a:t>
+              <a:t>3/30/2024</a:t>
             </a:fld>
             <a:endParaRPr lang="en-US"/>
           </a:p>
@@ -2147,7 +2147,7 @@
     </p:spTree>
     <p:extLst>
       <p:ext uri="{BB962C8B-B14F-4D97-AF65-F5344CB8AC3E}">
-        <p14:creationId xmlns:p14="http://schemas.microsoft.com/office/powerpoint/2010/main" val="976423292"/>
+        <p14:creationId xmlns:p14="http://schemas.microsoft.com/office/powerpoint/2010/main" val="3369381459"/>
       </p:ext>
     </p:extLst>
   </p:cSld>
@@ -2186,8 +2186,8 @@
         </p:nvSpPr>
         <p:spPr>
           <a:xfrm>
-            <a:off x="441435" y="599969"/>
-            <a:ext cx="2066985" cy="2099892"/>
+            <a:off x="441435" y="427249"/>
+            <a:ext cx="2066985" cy="1495372"/>
           </a:xfrm>
         </p:spPr>
         <p:txBody>
@@ -2218,8 +2218,8 @@
         </p:nvSpPr>
         <p:spPr>
           <a:xfrm>
-            <a:off x="2724548" y="1295769"/>
-            <a:ext cx="3244424" cy="6395505"/>
+            <a:off x="2724548" y="922741"/>
+            <a:ext cx="3244424" cy="4554358"/>
           </a:xfrm>
         </p:spPr>
         <p:txBody>
@@ -2283,8 +2283,8 @@
         </p:nvSpPr>
         <p:spPr>
           <a:xfrm>
-            <a:off x="441435" y="2699862"/>
-            <a:ext cx="2066985" cy="5001827"/>
+            <a:off x="441435" y="1922621"/>
+            <a:ext cx="2066985" cy="3561894"/>
           </a:xfrm>
         </p:spPr>
         <p:txBody>
@@ -2353,7 +2353,7 @@
           <a:p>
             <a:fld id="{A1626F8F-BADC-42B5-8999-017B7F317904}" type="datetimeFigureOut">
               <a:rPr lang="en-US" smtClean="0"/>
-              <a:t>5/24/2023</a:t>
+              <a:t>3/30/2024</a:t>
             </a:fld>
             <a:endParaRPr lang="en-US"/>
           </a:p>
@@ -2404,7 +2404,7 @@
     </p:spTree>
     <p:extLst>
       <p:ext uri="{BB962C8B-B14F-4D97-AF65-F5344CB8AC3E}">
-        <p14:creationId xmlns:p14="http://schemas.microsoft.com/office/powerpoint/2010/main" val="1504319676"/>
+        <p14:creationId xmlns:p14="http://schemas.microsoft.com/office/powerpoint/2010/main" val="1447987415"/>
       </p:ext>
     </p:extLst>
   </p:cSld>
@@ -2448,8 +2448,8 @@
         </p:nvSpPr>
         <p:spPr>
           <a:xfrm>
-            <a:off x="440601" y="479144"/>
-            <a:ext cx="5527537" cy="1739495"/>
+            <a:off x="440601" y="341208"/>
+            <a:ext cx="5527537" cy="1238726"/>
           </a:xfrm>
           <a:prstGeom prst="rect">
             <a:avLst/>
@@ -2481,8 +2481,8 @@
         </p:nvSpPr>
         <p:spPr>
           <a:xfrm>
-            <a:off x="440601" y="2395710"/>
-            <a:ext cx="5527537" cy="5710124"/>
+            <a:off x="440601" y="1706030"/>
+            <a:ext cx="5527537" cy="4066285"/>
           </a:xfrm>
           <a:prstGeom prst="rect">
             <a:avLst/>
@@ -2543,8 +2543,8 @@
         </p:nvSpPr>
         <p:spPr>
           <a:xfrm>
-            <a:off x="440601" y="8341240"/>
-            <a:ext cx="1441966" cy="479142"/>
+            <a:off x="440601" y="5939952"/>
+            <a:ext cx="1441966" cy="341206"/>
           </a:xfrm>
           <a:prstGeom prst="rect">
             <a:avLst/>
@@ -2566,7 +2566,7 @@
           <a:p>
             <a:fld id="{A1626F8F-BADC-42B5-8999-017B7F317904}" type="datetimeFigureOut">
               <a:rPr lang="en-US" smtClean="0"/>
-              <a:t>5/24/2023</a:t>
+              <a:t>3/30/2024</a:t>
             </a:fld>
             <a:endParaRPr lang="en-US"/>
           </a:p>
@@ -2584,8 +2584,8 @@
         </p:nvSpPr>
         <p:spPr>
           <a:xfrm>
-            <a:off x="2122895" y="8341240"/>
-            <a:ext cx="2162949" cy="479142"/>
+            <a:off x="2122895" y="5939952"/>
+            <a:ext cx="2162949" cy="341206"/>
           </a:xfrm>
           <a:prstGeom prst="rect">
             <a:avLst/>
@@ -2621,8 +2621,8 @@
         </p:nvSpPr>
         <p:spPr>
           <a:xfrm>
-            <a:off x="4526171" y="8341240"/>
-            <a:ext cx="1441966" cy="479142"/>
+            <a:off x="4526171" y="5939952"/>
+            <a:ext cx="1441966" cy="341206"/>
           </a:xfrm>
           <a:prstGeom prst="rect">
             <a:avLst/>
@@ -2653,23 +2653,23 @@
     </p:spTree>
     <p:extLst>
       <p:ext uri="{BB962C8B-B14F-4D97-AF65-F5344CB8AC3E}">
-        <p14:creationId xmlns:p14="http://schemas.microsoft.com/office/powerpoint/2010/main" val="2350061715"/>
+        <p14:creationId xmlns:p14="http://schemas.microsoft.com/office/powerpoint/2010/main" val="2920603412"/>
       </p:ext>
     </p:extLst>
   </p:cSld>
   <p:clrMap bg1="lt1" tx1="dk1" bg2="lt2" tx2="dk2" accent1="accent1" accent2="accent2" accent3="accent3" accent4="accent4" accent5="accent5" accent6="accent6" hlink="hlink" folHlink="folHlink"/>
   <p:sldLayoutIdLst>
-    <p:sldLayoutId id="2147483721" r:id="rId1"/>
-    <p:sldLayoutId id="2147483722" r:id="rId2"/>
-    <p:sldLayoutId id="2147483723" r:id="rId3"/>
-    <p:sldLayoutId id="2147483724" r:id="rId4"/>
-    <p:sldLayoutId id="2147483725" r:id="rId5"/>
-    <p:sldLayoutId id="2147483726" r:id="rId6"/>
-    <p:sldLayoutId id="2147483727" r:id="rId7"/>
-    <p:sldLayoutId id="2147483728" r:id="rId8"/>
-    <p:sldLayoutId id="2147483729" r:id="rId9"/>
-    <p:sldLayoutId id="2147483730" r:id="rId10"/>
-    <p:sldLayoutId id="2147483731" r:id="rId11"/>
+    <p:sldLayoutId id="2147483697" r:id="rId1"/>
+    <p:sldLayoutId id="2147483698" r:id="rId2"/>
+    <p:sldLayoutId id="2147483699" r:id="rId3"/>
+    <p:sldLayoutId id="2147483700" r:id="rId4"/>
+    <p:sldLayoutId id="2147483701" r:id="rId5"/>
+    <p:sldLayoutId id="2147483702" r:id="rId6"/>
+    <p:sldLayoutId id="2147483703" r:id="rId7"/>
+    <p:sldLayoutId id="2147483704" r:id="rId8"/>
+    <p:sldLayoutId id="2147483705" r:id="rId9"/>
+    <p:sldLayoutId id="2147483706" r:id="rId10"/>
+    <p:sldLayoutId id="2147483707" r:id="rId11"/>
   </p:sldLayoutIdLst>
   <p:txStyles>
     <p:titleStyle>
@@ -2980,9 +2980,9 @@
         <p:grpSpPr>
           <a:xfrm rot="0">
             <a:off x="0" y="0"/>
-            <a:ext cx="6408738" cy="8999538"/>
+            <a:ext cx="6408738" cy="6408738"/>
             <a:chOff x="0" y="0"/>
-            <a:chExt cx="6408738" cy="8999538"/>
+            <a:chExt cx="6408738" cy="6408738"/>
           </a:xfrm>
         </p:grpSpPr>
         <p:sp>
@@ -2994,7 +2994,7 @@
           <p:spPr>
             <a:xfrm>
               <a:off x="0" y="0"/>
-              <a:ext cx="6408738" cy="8999537"/>
+              <a:ext cx="6408738" cy="6408738"/>
             </a:xfrm>
             <a:prstGeom prst="rect">
               <a:avLst/>
@@ -3029,7 +3029,7 @@
           <p:spPr>
             <a:xfrm>
               <a:off x="0" y="0"/>
-              <a:ext cx="6408737" cy="8999537"/>
+              <a:ext cx="6408737" cy="6408738"/>
             </a:xfrm>
             <a:prstGeom prst="rect">
               <a:avLst/>
@@ -3064,7 +3064,7 @@
           <p:spPr>
             <a:xfrm>
               <a:off x="1595485" y="323647"/>
-              <a:ext cx="4743663" cy="1094921"/>
+              <a:ext cx="4743663" cy="1156505"/>
             </a:xfrm>
             <a:prstGeom prst="rect">
               <a:avLst/>
@@ -3089,7 +3089,7 @@
           </p:nvSpPr>
           <p:spPr>
             <a:xfrm>
-              <a:off x="1595485" y="1292231"/>
+              <a:off x="1595485" y="1346710"/>
               <a:ext cx="4743663" cy="0"/>
             </a:xfrm>
             <a:custGeom>
@@ -3132,7 +3132,7 @@
           </p:nvSpPr>
           <p:spPr>
             <a:xfrm>
-              <a:off x="1595485" y="1081670"/>
+              <a:off x="1595485" y="1124305"/>
               <a:ext cx="4743663" cy="0"/>
             </a:xfrm>
             <a:custGeom>
@@ -3175,7 +3175,7 @@
           </p:nvSpPr>
           <p:spPr>
             <a:xfrm>
-              <a:off x="1595485" y="871108"/>
+              <a:off x="1595485" y="901900"/>
               <a:ext cx="4743663" cy="0"/>
             </a:xfrm>
             <a:custGeom>
@@ -3218,7 +3218,7 @@
           </p:nvSpPr>
           <p:spPr>
             <a:xfrm>
-              <a:off x="1595485" y="660546"/>
+              <a:off x="1595485" y="679495"/>
               <a:ext cx="4743663" cy="0"/>
             </a:xfrm>
             <a:custGeom>
@@ -3261,7 +3261,7 @@
           </p:nvSpPr>
           <p:spPr>
             <a:xfrm>
-              <a:off x="1595485" y="449984"/>
+              <a:off x="1595485" y="457090"/>
               <a:ext cx="4743663" cy="0"/>
             </a:xfrm>
             <a:custGeom>
@@ -3304,8 +3304,8 @@
           </p:nvSpPr>
           <p:spPr>
             <a:xfrm>
-              <a:off x="3823413" y="355232"/>
-              <a:ext cx="143903" cy="189505"/>
+              <a:off x="3950442" y="357008"/>
+              <a:ext cx="16874" cy="200164"/>
             </a:xfrm>
             <a:prstGeom prst="rect">
               <a:avLst/>
@@ -3330,8 +3330,8 @@
           </p:nvSpPr>
           <p:spPr>
             <a:xfrm>
-              <a:off x="3762946" y="565793"/>
-              <a:ext cx="204371" cy="189505"/>
+              <a:off x="3657948" y="579413"/>
+              <a:ext cx="309369" cy="200164"/>
             </a:xfrm>
             <a:prstGeom prst="rect">
               <a:avLst/>
@@ -3356,8 +3356,8 @@
           </p:nvSpPr>
           <p:spPr>
             <a:xfrm>
-              <a:off x="3014834" y="776355"/>
-              <a:ext cx="952482" cy="189505"/>
+              <a:off x="3412327" y="801818"/>
+              <a:ext cx="554989" cy="200164"/>
             </a:xfrm>
             <a:prstGeom prst="rect">
               <a:avLst/>
@@ -3382,8 +3382,8 @@
           </p:nvSpPr>
           <p:spPr>
             <a:xfrm>
-              <a:off x="2383440" y="986917"/>
-              <a:ext cx="1583877" cy="189505"/>
+              <a:off x="2067977" y="1024223"/>
+              <a:ext cx="1899340" cy="200164"/>
             </a:xfrm>
             <a:prstGeom prst="rect">
               <a:avLst/>
@@ -3408,8 +3408,8 @@
           </p:nvSpPr>
           <p:spPr>
             <a:xfrm>
-              <a:off x="2757027" y="1197478"/>
-              <a:ext cx="1210290" cy="189505"/>
+              <a:off x="1856106" y="1246628"/>
+              <a:ext cx="2111211" cy="200164"/>
             </a:xfrm>
             <a:prstGeom prst="rect">
               <a:avLst/>
@@ -3435,14 +3435,14 @@
           <p:spPr>
             <a:xfrm>
               <a:off x="3967317" y="323647"/>
-              <a:ext cx="0" cy="1094921"/>
+              <a:ext cx="0" cy="1156505"/>
             </a:xfrm>
             <a:custGeom>
               <a:avLst/>
               <a:pathLst>
-                <a:path w="0" h="1094921">
+                <a:path w="0" h="1156505">
                   <a:moveTo>
-                    <a:pt x="0" y="1094921"/>
+                    <a:pt x="0" y="1156505"/>
                   </a:moveTo>
                   <a:lnTo>
                     <a:pt x="0" y="0"/>
@@ -3477,8 +3477,8 @@
           </p:nvSpPr>
           <p:spPr>
             <a:xfrm>
-              <a:off x="1595485" y="1742216"/>
-              <a:ext cx="4743663" cy="1094921"/>
+              <a:off x="1595485" y="1803800"/>
+              <a:ext cx="4743663" cy="1156505"/>
             </a:xfrm>
             <a:prstGeom prst="rect">
               <a:avLst/>
@@ -3503,7 +3503,7 @@
           </p:nvSpPr>
           <p:spPr>
             <a:xfrm>
-              <a:off x="1595485" y="2710800"/>
+              <a:off x="1595485" y="2826863"/>
               <a:ext cx="4743663" cy="0"/>
             </a:xfrm>
             <a:custGeom>
@@ -3546,7 +3546,7 @@
           </p:nvSpPr>
           <p:spPr>
             <a:xfrm>
-              <a:off x="1595485" y="2500238"/>
+              <a:off x="1595485" y="2604458"/>
               <a:ext cx="4743663" cy="0"/>
             </a:xfrm>
             <a:custGeom>
@@ -3589,7 +3589,7 @@
           </p:nvSpPr>
           <p:spPr>
             <a:xfrm>
-              <a:off x="1595485" y="2289677"/>
+              <a:off x="1595485" y="2382053"/>
               <a:ext cx="4743663" cy="0"/>
             </a:xfrm>
             <a:custGeom>
@@ -3632,7 +3632,7 @@
           </p:nvSpPr>
           <p:spPr>
             <a:xfrm>
-              <a:off x="1595485" y="2079115"/>
+              <a:off x="1595485" y="2159648"/>
               <a:ext cx="4743663" cy="0"/>
             </a:xfrm>
             <a:custGeom>
@@ -3675,7 +3675,7 @@
           </p:nvSpPr>
           <p:spPr>
             <a:xfrm>
-              <a:off x="1595485" y="1868553"/>
+              <a:off x="1595485" y="1937243"/>
               <a:ext cx="4743663" cy="0"/>
             </a:xfrm>
             <a:custGeom>
@@ -3718,8 +3718,8 @@
           </p:nvSpPr>
           <p:spPr>
             <a:xfrm>
-              <a:off x="3967317" y="1773800"/>
-              <a:ext cx="1145135" cy="189505"/>
+              <a:off x="3967317" y="1837161"/>
+              <a:ext cx="491240" cy="200164"/>
             </a:xfrm>
             <a:prstGeom prst="rect">
               <a:avLst/>
@@ -3744,34 +3744,8 @@
           </p:nvSpPr>
           <p:spPr>
             <a:xfrm>
-              <a:off x="3967317" y="1984362"/>
-              <a:ext cx="624051" cy="189505"/>
-            </a:xfrm>
-            <a:prstGeom prst="rect">
-              <a:avLst/>
-            </a:prstGeom>
-            <a:solidFill>
-              <a:srgbClr val="A65628">
-                <a:alpha val="100000"/>
-              </a:srgbClr>
-            </a:solidFill>
-          </p:spPr>
-          <p:txBody>
-            <a:bodyPr/>
-            <a:lstStyle/>
-            <a:p/>
-          </p:txBody>
-        </p:sp>
-        <p:sp>
-          <p:nvSpPr>
-            <p:cNvPr id="25" name="rc25"/>
-            <p:cNvSpPr/>
-            <p:nvPr/>
-          </p:nvSpPr>
-          <p:spPr>
-            <a:xfrm>
-              <a:off x="3697322" y="2194924"/>
-              <a:ext cx="269995" cy="189505"/>
+              <a:off x="3967317" y="2059566"/>
+              <a:ext cx="0" cy="200164"/>
             </a:xfrm>
             <a:prstGeom prst="rect">
               <a:avLst/>
@@ -3790,14 +3764,14 @@
         </p:sp>
         <p:sp>
           <p:nvSpPr>
-            <p:cNvPr id="26" name="rc26"/>
-            <p:cNvSpPr/>
-            <p:nvPr/>
-          </p:nvSpPr>
-          <p:spPr>
-            <a:xfrm>
-              <a:off x="3749446" y="2405486"/>
-              <a:ext cx="217871" cy="189505"/>
+            <p:cNvPr id="25" name="rc25"/>
+            <p:cNvSpPr/>
+            <p:nvPr/>
+          </p:nvSpPr>
+          <p:spPr>
+            <a:xfrm>
+              <a:off x="3967317" y="2281971"/>
+              <a:ext cx="0" cy="200164"/>
             </a:xfrm>
             <a:prstGeom prst="rect">
               <a:avLst/>
@@ -3816,14 +3790,14 @@
         </p:sp>
         <p:sp>
           <p:nvSpPr>
-            <p:cNvPr id="27" name="rc27"/>
-            <p:cNvSpPr/>
-            <p:nvPr/>
-          </p:nvSpPr>
-          <p:spPr>
-            <a:xfrm>
-              <a:off x="3572449" y="2616047"/>
-              <a:ext cx="394867" cy="189505"/>
+            <p:cNvPr id="26" name="rc26"/>
+            <p:cNvSpPr/>
+            <p:nvPr/>
+          </p:nvSpPr>
+          <p:spPr>
+            <a:xfrm>
+              <a:off x="3558574" y="2504376"/>
+              <a:ext cx="408742" cy="200164"/>
             </a:xfrm>
             <a:prstGeom prst="rect">
               <a:avLst/>
@@ -3842,21 +3816,47 @@
         </p:sp>
         <p:sp>
           <p:nvSpPr>
+            <p:cNvPr id="27" name="rc27"/>
+            <p:cNvSpPr/>
+            <p:nvPr/>
+          </p:nvSpPr>
+          <p:spPr>
+            <a:xfrm>
+              <a:off x="3082333" y="2726781"/>
+              <a:ext cx="884983" cy="200164"/>
+            </a:xfrm>
+            <a:prstGeom prst="rect">
+              <a:avLst/>
+            </a:prstGeom>
+            <a:solidFill>
+              <a:srgbClr val="984EA3">
+                <a:alpha val="100000"/>
+              </a:srgbClr>
+            </a:solidFill>
+          </p:spPr>
+          <p:txBody>
+            <a:bodyPr/>
+            <a:lstStyle/>
+            <a:p/>
+          </p:txBody>
+        </p:sp>
+        <p:sp>
+          <p:nvSpPr>
             <p:cNvPr id="28" name="pl28"/>
             <p:cNvSpPr/>
             <p:nvPr/>
           </p:nvSpPr>
           <p:spPr>
             <a:xfrm>
-              <a:off x="3967317" y="1742216"/>
-              <a:ext cx="0" cy="1094921"/>
+              <a:off x="3967317" y="1803800"/>
+              <a:ext cx="0" cy="1156505"/>
             </a:xfrm>
             <a:custGeom>
               <a:avLst/>
               <a:pathLst>
-                <a:path w="0" h="1094921">
+                <a:path w="0" h="1156505">
                   <a:moveTo>
-                    <a:pt x="0" y="1094921"/>
+                    <a:pt x="0" y="1156505"/>
                   </a:moveTo>
                   <a:lnTo>
                     <a:pt x="0" y="0"/>
@@ -3891,8 +3891,8 @@
           </p:nvSpPr>
           <p:spPr>
             <a:xfrm>
-              <a:off x="1595485" y="3160785"/>
-              <a:ext cx="4743663" cy="1094921"/>
+              <a:off x="1595485" y="3283954"/>
+              <a:ext cx="4743663" cy="1156505"/>
             </a:xfrm>
             <a:prstGeom prst="rect">
               <a:avLst/>
@@ -3917,7 +3917,7 @@
           </p:nvSpPr>
           <p:spPr>
             <a:xfrm>
-              <a:off x="1595485" y="4129369"/>
+              <a:off x="1595485" y="4307016"/>
               <a:ext cx="4743663" cy="0"/>
             </a:xfrm>
             <a:custGeom>
@@ -3960,7 +3960,7 @@
           </p:nvSpPr>
           <p:spPr>
             <a:xfrm>
-              <a:off x="1595485" y="3918807"/>
+              <a:off x="1595485" y="4084611"/>
               <a:ext cx="4743663" cy="0"/>
             </a:xfrm>
             <a:custGeom>
@@ -4003,7 +4003,7 @@
           </p:nvSpPr>
           <p:spPr>
             <a:xfrm>
-              <a:off x="1595485" y="3708245"/>
+              <a:off x="1595485" y="3862206"/>
               <a:ext cx="4743663" cy="0"/>
             </a:xfrm>
             <a:custGeom>
@@ -4046,7 +4046,7 @@
           </p:nvSpPr>
           <p:spPr>
             <a:xfrm>
-              <a:off x="1595485" y="3497684"/>
+              <a:off x="1595485" y="3639801"/>
               <a:ext cx="4743663" cy="0"/>
             </a:xfrm>
             <a:custGeom>
@@ -4089,7 +4089,7 @@
           </p:nvSpPr>
           <p:spPr>
             <a:xfrm>
-              <a:off x="1595485" y="3287122"/>
+              <a:off x="1595485" y="3417397"/>
               <a:ext cx="4743663" cy="0"/>
             </a:xfrm>
             <a:custGeom>
@@ -4132,14 +4132,14 @@
           </p:nvSpPr>
           <p:spPr>
             <a:xfrm>
-              <a:off x="3950442" y="3192369"/>
-              <a:ext cx="16874" cy="189505"/>
+              <a:off x="3967317" y="3317314"/>
+              <a:ext cx="1880590" cy="200164"/>
             </a:xfrm>
             <a:prstGeom prst="rect">
               <a:avLst/>
             </a:prstGeom>
             <a:solidFill>
-              <a:srgbClr val="984EA3">
+              <a:srgbClr val="A65628">
                 <a:alpha val="100000"/>
               </a:srgbClr>
             </a:solidFill>
@@ -4158,14 +4158,14 @@
           </p:nvSpPr>
           <p:spPr>
             <a:xfrm>
-              <a:off x="3657948" y="3402931"/>
-              <a:ext cx="309369" cy="189505"/>
+              <a:off x="3967317" y="3539719"/>
+              <a:ext cx="1445598" cy="200164"/>
             </a:xfrm>
             <a:prstGeom prst="rect">
               <a:avLst/>
             </a:prstGeom>
             <a:solidFill>
-              <a:srgbClr val="984EA3">
+              <a:srgbClr val="A65628">
                 <a:alpha val="100000"/>
               </a:srgbClr>
             </a:solidFill>
@@ -4178,99 +4178,21 @@
         </p:sp>
         <p:sp>
           <p:nvSpPr>
-            <p:cNvPr id="37" name="rc37"/>
-            <p:cNvSpPr/>
-            <p:nvPr/>
-          </p:nvSpPr>
-          <p:spPr>
-            <a:xfrm>
-              <a:off x="3412327" y="3613493"/>
-              <a:ext cx="554989" cy="189505"/>
-            </a:xfrm>
-            <a:prstGeom prst="rect">
-              <a:avLst/>
-            </a:prstGeom>
-            <a:solidFill>
-              <a:srgbClr val="984EA3">
-                <a:alpha val="100000"/>
-              </a:srgbClr>
-            </a:solidFill>
-          </p:spPr>
-          <p:txBody>
-            <a:bodyPr/>
-            <a:lstStyle/>
-            <a:p/>
-          </p:txBody>
-        </p:sp>
-        <p:sp>
-          <p:nvSpPr>
-            <p:cNvPr id="38" name="rc38"/>
-            <p:cNvSpPr/>
-            <p:nvPr/>
-          </p:nvSpPr>
-          <p:spPr>
-            <a:xfrm>
-              <a:off x="2067977" y="3824054"/>
-              <a:ext cx="1899340" cy="189505"/>
-            </a:xfrm>
-            <a:prstGeom prst="rect">
-              <a:avLst/>
-            </a:prstGeom>
-            <a:solidFill>
-              <a:srgbClr val="984EA3">
-                <a:alpha val="100000"/>
-              </a:srgbClr>
-            </a:solidFill>
-          </p:spPr>
-          <p:txBody>
-            <a:bodyPr/>
-            <a:lstStyle/>
-            <a:p/>
-          </p:txBody>
-        </p:sp>
-        <p:sp>
-          <p:nvSpPr>
-            <p:cNvPr id="39" name="rc39"/>
-            <p:cNvSpPr/>
-            <p:nvPr/>
-          </p:nvSpPr>
-          <p:spPr>
-            <a:xfrm>
-              <a:off x="1856106" y="4034616"/>
-              <a:ext cx="2111211" cy="189505"/>
-            </a:xfrm>
-            <a:prstGeom prst="rect">
-              <a:avLst/>
-            </a:prstGeom>
-            <a:solidFill>
-              <a:srgbClr val="984EA3">
-                <a:alpha val="100000"/>
-              </a:srgbClr>
-            </a:solidFill>
-          </p:spPr>
-          <p:txBody>
-            <a:bodyPr/>
-            <a:lstStyle/>
-            <a:p/>
-          </p:txBody>
-        </p:sp>
-        <p:sp>
-          <p:nvSpPr>
-            <p:cNvPr id="40" name="pl40"/>
-            <p:cNvSpPr/>
-            <p:nvPr/>
-          </p:nvSpPr>
-          <p:spPr>
-            <a:xfrm>
-              <a:off x="3967317" y="3160785"/>
-              <a:ext cx="0" cy="1094921"/>
+            <p:cNvPr id="37" name="pl37"/>
+            <p:cNvSpPr/>
+            <p:nvPr/>
+          </p:nvSpPr>
+          <p:spPr>
+            <a:xfrm>
+              <a:off x="3967317" y="3283954"/>
+              <a:ext cx="0" cy="1156505"/>
             </a:xfrm>
             <a:custGeom>
               <a:avLst/>
               <a:pathLst>
-                <a:path w="0" h="1094921">
+                <a:path w="0" h="1156505">
                   <a:moveTo>
-                    <a:pt x="0" y="1094921"/>
+                    <a:pt x="0" y="1156505"/>
                   </a:moveTo>
                   <a:lnTo>
                     <a:pt x="0" y="0"/>
@@ -4299,14 +4221,14 @@
         </p:sp>
         <p:sp>
           <p:nvSpPr>
-            <p:cNvPr id="41" name="rc41"/>
-            <p:cNvSpPr/>
-            <p:nvPr/>
-          </p:nvSpPr>
-          <p:spPr>
-            <a:xfrm>
-              <a:off x="1595485" y="4579354"/>
-              <a:ext cx="4743663" cy="1094921"/>
+            <p:cNvPr id="38" name="rc38"/>
+            <p:cNvSpPr/>
+            <p:nvPr/>
+          </p:nvSpPr>
+          <p:spPr>
+            <a:xfrm>
+              <a:off x="1595485" y="4764107"/>
+              <a:ext cx="4743663" cy="1156505"/>
             </a:xfrm>
             <a:prstGeom prst="rect">
               <a:avLst/>
@@ -4325,13 +4247,13 @@
         </p:sp>
         <p:sp>
           <p:nvSpPr>
-            <p:cNvPr id="42" name="pl42"/>
-            <p:cNvSpPr/>
-            <p:nvPr/>
-          </p:nvSpPr>
-          <p:spPr>
-            <a:xfrm>
-              <a:off x="1595485" y="5547938"/>
+            <p:cNvPr id="39" name="pl39"/>
+            <p:cNvSpPr/>
+            <p:nvPr/>
+          </p:nvSpPr>
+          <p:spPr>
+            <a:xfrm>
+              <a:off x="1595485" y="5787169"/>
               <a:ext cx="4743663" cy="0"/>
             </a:xfrm>
             <a:custGeom>
@@ -4368,13 +4290,13 @@
         </p:sp>
         <p:sp>
           <p:nvSpPr>
-            <p:cNvPr id="43" name="pl43"/>
-            <p:cNvSpPr/>
-            <p:nvPr/>
-          </p:nvSpPr>
-          <p:spPr>
-            <a:xfrm>
-              <a:off x="1595485" y="5337376"/>
+            <p:cNvPr id="40" name="pl40"/>
+            <p:cNvSpPr/>
+            <p:nvPr/>
+          </p:nvSpPr>
+          <p:spPr>
+            <a:xfrm>
+              <a:off x="1595485" y="5564764"/>
               <a:ext cx="4743663" cy="0"/>
             </a:xfrm>
             <a:custGeom>
@@ -4411,13 +4333,13 @@
         </p:sp>
         <p:sp>
           <p:nvSpPr>
-            <p:cNvPr id="44" name="pl44"/>
-            <p:cNvSpPr/>
-            <p:nvPr/>
-          </p:nvSpPr>
-          <p:spPr>
-            <a:xfrm>
-              <a:off x="1595485" y="5126814"/>
+            <p:cNvPr id="41" name="pl41"/>
+            <p:cNvSpPr/>
+            <p:nvPr/>
+          </p:nvSpPr>
+          <p:spPr>
+            <a:xfrm>
+              <a:off x="1595485" y="5342360"/>
               <a:ext cx="4743663" cy="0"/>
             </a:xfrm>
             <a:custGeom>
@@ -4454,13 +4376,13 @@
         </p:sp>
         <p:sp>
           <p:nvSpPr>
-            <p:cNvPr id="45" name="pl45"/>
-            <p:cNvSpPr/>
-            <p:nvPr/>
-          </p:nvSpPr>
-          <p:spPr>
-            <a:xfrm>
-              <a:off x="1595485" y="4916252"/>
+            <p:cNvPr id="42" name="pl42"/>
+            <p:cNvSpPr/>
+            <p:nvPr/>
+          </p:nvSpPr>
+          <p:spPr>
+            <a:xfrm>
+              <a:off x="1595485" y="5119955"/>
               <a:ext cx="4743663" cy="0"/>
             </a:xfrm>
             <a:custGeom>
@@ -4497,13 +4419,13 @@
         </p:sp>
         <p:sp>
           <p:nvSpPr>
-            <p:cNvPr id="46" name="pl46"/>
-            <p:cNvSpPr/>
-            <p:nvPr/>
-          </p:nvSpPr>
-          <p:spPr>
-            <a:xfrm>
-              <a:off x="1595485" y="4705691"/>
+            <p:cNvPr id="43" name="pl43"/>
+            <p:cNvSpPr/>
+            <p:nvPr/>
+          </p:nvSpPr>
+          <p:spPr>
+            <a:xfrm>
+              <a:off x="1595485" y="4897550"/>
               <a:ext cx="4743663" cy="0"/>
             </a:xfrm>
             <a:custGeom>
@@ -4540,14 +4462,14 @@
         </p:sp>
         <p:sp>
           <p:nvSpPr>
-            <p:cNvPr id="47" name="rc47"/>
-            <p:cNvSpPr/>
-            <p:nvPr/>
-          </p:nvSpPr>
-          <p:spPr>
-            <a:xfrm>
-              <a:off x="3967317" y="4610938"/>
-              <a:ext cx="491240" cy="189505"/>
+            <p:cNvPr id="44" name="rc44"/>
+            <p:cNvSpPr/>
+            <p:nvPr/>
+          </p:nvSpPr>
+          <p:spPr>
+            <a:xfrm>
+              <a:off x="3967317" y="4797468"/>
+              <a:ext cx="1351850" cy="200164"/>
             </a:xfrm>
             <a:prstGeom prst="rect">
               <a:avLst/>
@@ -4566,20 +4488,20 @@
         </p:sp>
         <p:sp>
           <p:nvSpPr>
-            <p:cNvPr id="48" name="rc48"/>
-            <p:cNvSpPr/>
-            <p:nvPr/>
-          </p:nvSpPr>
-          <p:spPr>
-            <a:xfrm>
-              <a:off x="3967317" y="4821500"/>
-              <a:ext cx="0" cy="189505"/>
+            <p:cNvPr id="45" name="rc45"/>
+            <p:cNvSpPr/>
+            <p:nvPr/>
+          </p:nvSpPr>
+          <p:spPr>
+            <a:xfrm>
+              <a:off x="3967317" y="5019872"/>
+              <a:ext cx="605613" cy="200164"/>
             </a:xfrm>
             <a:prstGeom prst="rect">
               <a:avLst/>
             </a:prstGeom>
             <a:solidFill>
-              <a:srgbClr val="984EA3">
+              <a:srgbClr val="A65628">
                 <a:alpha val="100000"/>
               </a:srgbClr>
             </a:solidFill>
@@ -4592,99 +4514,21 @@
         </p:sp>
         <p:sp>
           <p:nvSpPr>
-            <p:cNvPr id="49" name="rc49"/>
-            <p:cNvSpPr/>
-            <p:nvPr/>
-          </p:nvSpPr>
-          <p:spPr>
-            <a:xfrm>
-              <a:off x="3967317" y="5032061"/>
-              <a:ext cx="0" cy="189505"/>
-            </a:xfrm>
-            <a:prstGeom prst="rect">
-              <a:avLst/>
-            </a:prstGeom>
-            <a:solidFill>
-              <a:srgbClr val="984EA3">
-                <a:alpha val="100000"/>
-              </a:srgbClr>
-            </a:solidFill>
-          </p:spPr>
-          <p:txBody>
-            <a:bodyPr/>
-            <a:lstStyle/>
-            <a:p/>
-          </p:txBody>
-        </p:sp>
-        <p:sp>
-          <p:nvSpPr>
-            <p:cNvPr id="50" name="rc50"/>
-            <p:cNvSpPr/>
-            <p:nvPr/>
-          </p:nvSpPr>
-          <p:spPr>
-            <a:xfrm>
-              <a:off x="3558574" y="5242623"/>
-              <a:ext cx="408742" cy="189505"/>
-            </a:xfrm>
-            <a:prstGeom prst="rect">
-              <a:avLst/>
-            </a:prstGeom>
-            <a:solidFill>
-              <a:srgbClr val="984EA3">
-                <a:alpha val="100000"/>
-              </a:srgbClr>
-            </a:solidFill>
-          </p:spPr>
-          <p:txBody>
-            <a:bodyPr/>
-            <a:lstStyle/>
-            <a:p/>
-          </p:txBody>
-        </p:sp>
-        <p:sp>
-          <p:nvSpPr>
-            <p:cNvPr id="51" name="rc51"/>
-            <p:cNvSpPr/>
-            <p:nvPr/>
-          </p:nvSpPr>
-          <p:spPr>
-            <a:xfrm>
-              <a:off x="3082333" y="5453185"/>
-              <a:ext cx="884983" cy="189505"/>
-            </a:xfrm>
-            <a:prstGeom prst="rect">
-              <a:avLst/>
-            </a:prstGeom>
-            <a:solidFill>
-              <a:srgbClr val="984EA3">
-                <a:alpha val="100000"/>
-              </a:srgbClr>
-            </a:solidFill>
-          </p:spPr>
-          <p:txBody>
-            <a:bodyPr/>
-            <a:lstStyle/>
-            <a:p/>
-          </p:txBody>
-        </p:sp>
-        <p:sp>
-          <p:nvSpPr>
-            <p:cNvPr id="52" name="pl52"/>
-            <p:cNvSpPr/>
-            <p:nvPr/>
-          </p:nvSpPr>
-          <p:spPr>
-            <a:xfrm>
-              <a:off x="3967317" y="4579354"/>
-              <a:ext cx="0" cy="1094921"/>
+            <p:cNvPr id="46" name="pl46"/>
+            <p:cNvSpPr/>
+            <p:nvPr/>
+          </p:nvSpPr>
+          <p:spPr>
+            <a:xfrm>
+              <a:off x="3967317" y="4764107"/>
+              <a:ext cx="0" cy="1156505"/>
             </a:xfrm>
             <a:custGeom>
               <a:avLst/>
               <a:pathLst>
-                <a:path w="0" h="1094921">
+                <a:path w="0" h="1156505">
                   <a:moveTo>
-                    <a:pt x="0" y="1094921"/>
+                    <a:pt x="0" y="1156505"/>
                   </a:moveTo>
                   <a:lnTo>
                     <a:pt x="0" y="0"/>
@@ -4713,685 +4557,13 @@
         </p:sp>
         <p:sp>
           <p:nvSpPr>
-            <p:cNvPr id="53" name="rc53"/>
-            <p:cNvSpPr/>
-            <p:nvPr/>
-          </p:nvSpPr>
-          <p:spPr>
-            <a:xfrm>
-              <a:off x="1595485" y="5997922"/>
-              <a:ext cx="4743663" cy="1094921"/>
-            </a:xfrm>
-            <a:prstGeom prst="rect">
-              <a:avLst/>
-            </a:prstGeom>
-            <a:solidFill>
-              <a:srgbClr val="FFFFFF">
-                <a:alpha val="100000"/>
-              </a:srgbClr>
-            </a:solidFill>
-          </p:spPr>
-          <p:txBody>
-            <a:bodyPr/>
-            <a:lstStyle/>
-            <a:p/>
-          </p:txBody>
-        </p:sp>
-        <p:sp>
-          <p:nvSpPr>
-            <p:cNvPr id="54" name="pl54"/>
-            <p:cNvSpPr/>
-            <p:nvPr/>
-          </p:nvSpPr>
-          <p:spPr>
-            <a:xfrm>
-              <a:off x="1595485" y="6966506"/>
-              <a:ext cx="4743663" cy="0"/>
-            </a:xfrm>
-            <a:custGeom>
-              <a:avLst/>
-              <a:pathLst>
-                <a:path w="4743663" h="0">
-                  <a:moveTo>
-                    <a:pt x="0" y="0"/>
-                  </a:moveTo>
-                  <a:lnTo>
-                    <a:pt x="4743663" y="0"/>
-                  </a:lnTo>
-                  <a:lnTo>
-                    <a:pt x="4743663" y="0"/>
-                  </a:lnTo>
-                </a:path>
-              </a:pathLst>
-            </a:custGeom>
-            <a:ln w="13550" cap="flat">
-              <a:solidFill>
-                <a:srgbClr val="BEBEBE">
-                  <a:alpha val="100000"/>
-                </a:srgbClr>
-              </a:solidFill>
-              <a:prstDash val="solid"/>
-              <a:round/>
-            </a:ln>
-          </p:spPr>
-          <p:txBody>
-            <a:bodyPr/>
-            <a:lstStyle/>
-            <a:p/>
-          </p:txBody>
-        </p:sp>
-        <p:sp>
-          <p:nvSpPr>
-            <p:cNvPr id="55" name="pl55"/>
-            <p:cNvSpPr/>
-            <p:nvPr/>
-          </p:nvSpPr>
-          <p:spPr>
-            <a:xfrm>
-              <a:off x="1595485" y="6755945"/>
-              <a:ext cx="4743663" cy="0"/>
-            </a:xfrm>
-            <a:custGeom>
-              <a:avLst/>
-              <a:pathLst>
-                <a:path w="4743663" h="0">
-                  <a:moveTo>
-                    <a:pt x="0" y="0"/>
-                  </a:moveTo>
-                  <a:lnTo>
-                    <a:pt x="4743663" y="0"/>
-                  </a:lnTo>
-                  <a:lnTo>
-                    <a:pt x="4743663" y="0"/>
-                  </a:lnTo>
-                </a:path>
-              </a:pathLst>
-            </a:custGeom>
-            <a:ln w="13550" cap="flat">
-              <a:solidFill>
-                <a:srgbClr val="BEBEBE">
-                  <a:alpha val="100000"/>
-                </a:srgbClr>
-              </a:solidFill>
-              <a:prstDash val="solid"/>
-              <a:round/>
-            </a:ln>
-          </p:spPr>
-          <p:txBody>
-            <a:bodyPr/>
-            <a:lstStyle/>
-            <a:p/>
-          </p:txBody>
-        </p:sp>
-        <p:sp>
-          <p:nvSpPr>
-            <p:cNvPr id="56" name="pl56"/>
-            <p:cNvSpPr/>
-            <p:nvPr/>
-          </p:nvSpPr>
-          <p:spPr>
-            <a:xfrm>
-              <a:off x="1595485" y="6545383"/>
-              <a:ext cx="4743663" cy="0"/>
-            </a:xfrm>
-            <a:custGeom>
-              <a:avLst/>
-              <a:pathLst>
-                <a:path w="4743663" h="0">
-                  <a:moveTo>
-                    <a:pt x="0" y="0"/>
-                  </a:moveTo>
-                  <a:lnTo>
-                    <a:pt x="4743663" y="0"/>
-                  </a:lnTo>
-                  <a:lnTo>
-                    <a:pt x="4743663" y="0"/>
-                  </a:lnTo>
-                </a:path>
-              </a:pathLst>
-            </a:custGeom>
-            <a:ln w="13550" cap="flat">
-              <a:solidFill>
-                <a:srgbClr val="BEBEBE">
-                  <a:alpha val="100000"/>
-                </a:srgbClr>
-              </a:solidFill>
-              <a:prstDash val="solid"/>
-              <a:round/>
-            </a:ln>
-          </p:spPr>
-          <p:txBody>
-            <a:bodyPr/>
-            <a:lstStyle/>
-            <a:p/>
-          </p:txBody>
-        </p:sp>
-        <p:sp>
-          <p:nvSpPr>
-            <p:cNvPr id="57" name="pl57"/>
-            <p:cNvSpPr/>
-            <p:nvPr/>
-          </p:nvSpPr>
-          <p:spPr>
-            <a:xfrm>
-              <a:off x="1595485" y="6334821"/>
-              <a:ext cx="4743663" cy="0"/>
-            </a:xfrm>
-            <a:custGeom>
-              <a:avLst/>
-              <a:pathLst>
-                <a:path w="4743663" h="0">
-                  <a:moveTo>
-                    <a:pt x="0" y="0"/>
-                  </a:moveTo>
-                  <a:lnTo>
-                    <a:pt x="4743663" y="0"/>
-                  </a:lnTo>
-                  <a:lnTo>
-                    <a:pt x="4743663" y="0"/>
-                  </a:lnTo>
-                </a:path>
-              </a:pathLst>
-            </a:custGeom>
-            <a:ln w="13550" cap="flat">
-              <a:solidFill>
-                <a:srgbClr val="BEBEBE">
-                  <a:alpha val="100000"/>
-                </a:srgbClr>
-              </a:solidFill>
-              <a:prstDash val="solid"/>
-              <a:round/>
-            </a:ln>
-          </p:spPr>
-          <p:txBody>
-            <a:bodyPr/>
-            <a:lstStyle/>
-            <a:p/>
-          </p:txBody>
-        </p:sp>
-        <p:sp>
-          <p:nvSpPr>
-            <p:cNvPr id="58" name="pl58"/>
-            <p:cNvSpPr/>
-            <p:nvPr/>
-          </p:nvSpPr>
-          <p:spPr>
-            <a:xfrm>
-              <a:off x="1595485" y="6124259"/>
-              <a:ext cx="4743663" cy="0"/>
-            </a:xfrm>
-            <a:custGeom>
-              <a:avLst/>
-              <a:pathLst>
-                <a:path w="4743663" h="0">
-                  <a:moveTo>
-                    <a:pt x="0" y="0"/>
-                  </a:moveTo>
-                  <a:lnTo>
-                    <a:pt x="4743663" y="0"/>
-                  </a:lnTo>
-                  <a:lnTo>
-                    <a:pt x="4743663" y="0"/>
-                  </a:lnTo>
-                </a:path>
-              </a:pathLst>
-            </a:custGeom>
-            <a:ln w="13550" cap="flat">
-              <a:solidFill>
-                <a:srgbClr val="BEBEBE">
-                  <a:alpha val="100000"/>
-                </a:srgbClr>
-              </a:solidFill>
-              <a:prstDash val="solid"/>
-              <a:round/>
-            </a:ln>
-          </p:spPr>
-          <p:txBody>
-            <a:bodyPr/>
-            <a:lstStyle/>
-            <a:p/>
-          </p:txBody>
-        </p:sp>
-        <p:sp>
-          <p:nvSpPr>
-            <p:cNvPr id="59" name="rc59"/>
-            <p:cNvSpPr/>
-            <p:nvPr/>
-          </p:nvSpPr>
-          <p:spPr>
-            <a:xfrm>
-              <a:off x="3967317" y="6029507"/>
-              <a:ext cx="1880590" cy="189505"/>
-            </a:xfrm>
-            <a:prstGeom prst="rect">
-              <a:avLst/>
-            </a:prstGeom>
-            <a:solidFill>
-              <a:srgbClr val="A65628">
-                <a:alpha val="100000"/>
-              </a:srgbClr>
-            </a:solidFill>
-          </p:spPr>
-          <p:txBody>
-            <a:bodyPr/>
-            <a:lstStyle/>
-            <a:p/>
-          </p:txBody>
-        </p:sp>
-        <p:sp>
-          <p:nvSpPr>
-            <p:cNvPr id="60" name="rc60"/>
-            <p:cNvSpPr/>
-            <p:nvPr/>
-          </p:nvSpPr>
-          <p:spPr>
-            <a:xfrm>
-              <a:off x="3967317" y="6240068"/>
-              <a:ext cx="1445598" cy="189505"/>
-            </a:xfrm>
-            <a:prstGeom prst="rect">
-              <a:avLst/>
-            </a:prstGeom>
-            <a:solidFill>
-              <a:srgbClr val="A65628">
-                <a:alpha val="100000"/>
-              </a:srgbClr>
-            </a:solidFill>
-          </p:spPr>
-          <p:txBody>
-            <a:bodyPr/>
-            <a:lstStyle/>
-            <a:p/>
-          </p:txBody>
-        </p:sp>
-        <p:sp>
-          <p:nvSpPr>
-            <p:cNvPr id="61" name="pl61"/>
-            <p:cNvSpPr/>
-            <p:nvPr/>
-          </p:nvSpPr>
-          <p:spPr>
-            <a:xfrm>
-              <a:off x="3967317" y="5997922"/>
-              <a:ext cx="0" cy="1094921"/>
-            </a:xfrm>
-            <a:custGeom>
-              <a:avLst/>
-              <a:pathLst>
-                <a:path w="0" h="1094921">
-                  <a:moveTo>
-                    <a:pt x="0" y="1094921"/>
-                  </a:moveTo>
-                  <a:lnTo>
-                    <a:pt x="0" y="0"/>
-                  </a:lnTo>
-                  <a:lnTo>
-                    <a:pt x="0" y="0"/>
-                  </a:lnTo>
-                </a:path>
-              </a:pathLst>
-            </a:custGeom>
-            <a:ln w="13550" cap="flat">
-              <a:solidFill>
-                <a:srgbClr val="000000">
-                  <a:alpha val="100000"/>
-                </a:srgbClr>
-              </a:solidFill>
-              <a:prstDash val="solid"/>
-              <a:round/>
-            </a:ln>
-          </p:spPr>
-          <p:txBody>
-            <a:bodyPr/>
-            <a:lstStyle/>
-            <a:p/>
-          </p:txBody>
-        </p:sp>
-        <p:sp>
-          <p:nvSpPr>
-            <p:cNvPr id="62" name="rc62"/>
-            <p:cNvSpPr/>
-            <p:nvPr/>
-          </p:nvSpPr>
-          <p:spPr>
-            <a:xfrm>
-              <a:off x="1595485" y="7416491"/>
-              <a:ext cx="4743663" cy="1094921"/>
-            </a:xfrm>
-            <a:prstGeom prst="rect">
-              <a:avLst/>
-            </a:prstGeom>
-            <a:solidFill>
-              <a:srgbClr val="FFFFFF">
-                <a:alpha val="100000"/>
-              </a:srgbClr>
-            </a:solidFill>
-          </p:spPr>
-          <p:txBody>
-            <a:bodyPr/>
-            <a:lstStyle/>
-            <a:p/>
-          </p:txBody>
-        </p:sp>
-        <p:sp>
-          <p:nvSpPr>
-            <p:cNvPr id="63" name="pl63"/>
-            <p:cNvSpPr/>
-            <p:nvPr/>
-          </p:nvSpPr>
-          <p:spPr>
-            <a:xfrm>
-              <a:off x="1595485" y="8385075"/>
-              <a:ext cx="4743663" cy="0"/>
-            </a:xfrm>
-            <a:custGeom>
-              <a:avLst/>
-              <a:pathLst>
-                <a:path w="4743663" h="0">
-                  <a:moveTo>
-                    <a:pt x="0" y="0"/>
-                  </a:moveTo>
-                  <a:lnTo>
-                    <a:pt x="4743663" y="0"/>
-                  </a:lnTo>
-                  <a:lnTo>
-                    <a:pt x="4743663" y="0"/>
-                  </a:lnTo>
-                </a:path>
-              </a:pathLst>
-            </a:custGeom>
-            <a:ln w="13550" cap="flat">
-              <a:solidFill>
-                <a:srgbClr val="BEBEBE">
-                  <a:alpha val="100000"/>
-                </a:srgbClr>
-              </a:solidFill>
-              <a:prstDash val="solid"/>
-              <a:round/>
-            </a:ln>
-          </p:spPr>
-          <p:txBody>
-            <a:bodyPr/>
-            <a:lstStyle/>
-            <a:p/>
-          </p:txBody>
-        </p:sp>
-        <p:sp>
-          <p:nvSpPr>
-            <p:cNvPr id="64" name="pl64"/>
-            <p:cNvSpPr/>
-            <p:nvPr/>
-          </p:nvSpPr>
-          <p:spPr>
-            <a:xfrm>
-              <a:off x="1595485" y="8174513"/>
-              <a:ext cx="4743663" cy="0"/>
-            </a:xfrm>
-            <a:custGeom>
-              <a:avLst/>
-              <a:pathLst>
-                <a:path w="4743663" h="0">
-                  <a:moveTo>
-                    <a:pt x="0" y="0"/>
-                  </a:moveTo>
-                  <a:lnTo>
-                    <a:pt x="4743663" y="0"/>
-                  </a:lnTo>
-                  <a:lnTo>
-                    <a:pt x="4743663" y="0"/>
-                  </a:lnTo>
-                </a:path>
-              </a:pathLst>
-            </a:custGeom>
-            <a:ln w="13550" cap="flat">
-              <a:solidFill>
-                <a:srgbClr val="BEBEBE">
-                  <a:alpha val="100000"/>
-                </a:srgbClr>
-              </a:solidFill>
-              <a:prstDash val="solid"/>
-              <a:round/>
-            </a:ln>
-          </p:spPr>
-          <p:txBody>
-            <a:bodyPr/>
-            <a:lstStyle/>
-            <a:p/>
-          </p:txBody>
-        </p:sp>
-        <p:sp>
-          <p:nvSpPr>
-            <p:cNvPr id="65" name="pl65"/>
-            <p:cNvSpPr/>
-            <p:nvPr/>
-          </p:nvSpPr>
-          <p:spPr>
-            <a:xfrm>
-              <a:off x="1595485" y="7963952"/>
-              <a:ext cx="4743663" cy="0"/>
-            </a:xfrm>
-            <a:custGeom>
-              <a:avLst/>
-              <a:pathLst>
-                <a:path w="4743663" h="0">
-                  <a:moveTo>
-                    <a:pt x="0" y="0"/>
-                  </a:moveTo>
-                  <a:lnTo>
-                    <a:pt x="4743663" y="0"/>
-                  </a:lnTo>
-                  <a:lnTo>
-                    <a:pt x="4743663" y="0"/>
-                  </a:lnTo>
-                </a:path>
-              </a:pathLst>
-            </a:custGeom>
-            <a:ln w="13550" cap="flat">
-              <a:solidFill>
-                <a:srgbClr val="BEBEBE">
-                  <a:alpha val="100000"/>
-                </a:srgbClr>
-              </a:solidFill>
-              <a:prstDash val="solid"/>
-              <a:round/>
-            </a:ln>
-          </p:spPr>
-          <p:txBody>
-            <a:bodyPr/>
-            <a:lstStyle/>
-            <a:p/>
-          </p:txBody>
-        </p:sp>
-        <p:sp>
-          <p:nvSpPr>
-            <p:cNvPr id="66" name="pl66"/>
-            <p:cNvSpPr/>
-            <p:nvPr/>
-          </p:nvSpPr>
-          <p:spPr>
-            <a:xfrm>
-              <a:off x="1595485" y="7753390"/>
-              <a:ext cx="4743663" cy="0"/>
-            </a:xfrm>
-            <a:custGeom>
-              <a:avLst/>
-              <a:pathLst>
-                <a:path w="4743663" h="0">
-                  <a:moveTo>
-                    <a:pt x="0" y="0"/>
-                  </a:moveTo>
-                  <a:lnTo>
-                    <a:pt x="4743663" y="0"/>
-                  </a:lnTo>
-                  <a:lnTo>
-                    <a:pt x="4743663" y="0"/>
-                  </a:lnTo>
-                </a:path>
-              </a:pathLst>
-            </a:custGeom>
-            <a:ln w="13550" cap="flat">
-              <a:solidFill>
-                <a:srgbClr val="BEBEBE">
-                  <a:alpha val="100000"/>
-                </a:srgbClr>
-              </a:solidFill>
-              <a:prstDash val="solid"/>
-              <a:round/>
-            </a:ln>
-          </p:spPr>
-          <p:txBody>
-            <a:bodyPr/>
-            <a:lstStyle/>
-            <a:p/>
-          </p:txBody>
-        </p:sp>
-        <p:sp>
-          <p:nvSpPr>
-            <p:cNvPr id="67" name="pl67"/>
-            <p:cNvSpPr/>
-            <p:nvPr/>
-          </p:nvSpPr>
-          <p:spPr>
-            <a:xfrm>
-              <a:off x="1595485" y="7542828"/>
-              <a:ext cx="4743663" cy="0"/>
-            </a:xfrm>
-            <a:custGeom>
-              <a:avLst/>
-              <a:pathLst>
-                <a:path w="4743663" h="0">
-                  <a:moveTo>
-                    <a:pt x="0" y="0"/>
-                  </a:moveTo>
-                  <a:lnTo>
-                    <a:pt x="4743663" y="0"/>
-                  </a:lnTo>
-                  <a:lnTo>
-                    <a:pt x="4743663" y="0"/>
-                  </a:lnTo>
-                </a:path>
-              </a:pathLst>
-            </a:custGeom>
-            <a:ln w="13550" cap="flat">
-              <a:solidFill>
-                <a:srgbClr val="BEBEBE">
-                  <a:alpha val="100000"/>
-                </a:srgbClr>
-              </a:solidFill>
-              <a:prstDash val="solid"/>
-              <a:round/>
-            </a:ln>
-          </p:spPr>
-          <p:txBody>
-            <a:bodyPr/>
-            <a:lstStyle/>
-            <a:p/>
-          </p:txBody>
-        </p:sp>
-        <p:sp>
-          <p:nvSpPr>
-            <p:cNvPr id="68" name="rc68"/>
-            <p:cNvSpPr/>
-            <p:nvPr/>
-          </p:nvSpPr>
-          <p:spPr>
-            <a:xfrm>
-              <a:off x="3967317" y="7448075"/>
-              <a:ext cx="1351850" cy="189505"/>
-            </a:xfrm>
-            <a:prstGeom prst="rect">
-              <a:avLst/>
-            </a:prstGeom>
-            <a:solidFill>
-              <a:srgbClr val="A65628">
-                <a:alpha val="100000"/>
-              </a:srgbClr>
-            </a:solidFill>
-          </p:spPr>
-          <p:txBody>
-            <a:bodyPr/>
-            <a:lstStyle/>
-            <a:p/>
-          </p:txBody>
-        </p:sp>
-        <p:sp>
-          <p:nvSpPr>
-            <p:cNvPr id="69" name="rc69"/>
-            <p:cNvSpPr/>
-            <p:nvPr/>
-          </p:nvSpPr>
-          <p:spPr>
-            <a:xfrm>
-              <a:off x="3967317" y="7658637"/>
-              <a:ext cx="605613" cy="189505"/>
-            </a:xfrm>
-            <a:prstGeom prst="rect">
-              <a:avLst/>
-            </a:prstGeom>
-            <a:solidFill>
-              <a:srgbClr val="A65628">
-                <a:alpha val="100000"/>
-              </a:srgbClr>
-            </a:solidFill>
-          </p:spPr>
-          <p:txBody>
-            <a:bodyPr/>
-            <a:lstStyle/>
-            <a:p/>
-          </p:txBody>
-        </p:sp>
-        <p:sp>
-          <p:nvSpPr>
-            <p:cNvPr id="70" name="pl70"/>
-            <p:cNvSpPr/>
-            <p:nvPr/>
-          </p:nvSpPr>
-          <p:spPr>
-            <a:xfrm>
-              <a:off x="3967317" y="7416491"/>
-              <a:ext cx="0" cy="1094921"/>
-            </a:xfrm>
-            <a:custGeom>
-              <a:avLst/>
-              <a:pathLst>
-                <a:path w="0" h="1094921">
-                  <a:moveTo>
-                    <a:pt x="0" y="1094921"/>
-                  </a:moveTo>
-                  <a:lnTo>
-                    <a:pt x="0" y="0"/>
-                  </a:lnTo>
-                  <a:lnTo>
-                    <a:pt x="0" y="0"/>
-                  </a:lnTo>
-                </a:path>
-              </a:pathLst>
-            </a:custGeom>
-            <a:ln w="13550" cap="flat">
-              <a:solidFill>
-                <a:srgbClr val="000000">
-                  <a:alpha val="100000"/>
-                </a:srgbClr>
-              </a:solidFill>
-              <a:prstDash val="solid"/>
-              <a:round/>
-            </a:ln>
-          </p:spPr>
-          <p:txBody>
-            <a:bodyPr/>
-            <a:lstStyle/>
-            <a:p/>
-          </p:txBody>
-        </p:sp>
-        <p:sp>
-          <p:nvSpPr>
-            <p:cNvPr id="71" name="tx71"/>
-            <p:cNvSpPr/>
-            <p:nvPr/>
-          </p:nvSpPr>
-          <p:spPr>
-            <a:xfrm>
-              <a:off x="1651157" y="7195323"/>
+            <p:cNvPr id="47" name="tx47"/>
+            <p:cNvSpPr/>
+            <p:nvPr/>
+          </p:nvSpPr>
+          <p:spPr>
+            <a:xfrm>
+              <a:off x="1651157" y="4542939"/>
               <a:ext cx="2983626" cy="147955"/>
             </a:xfrm>
             <a:prstGeom prst="rect">
@@ -5431,13 +4603,13 @@
         </p:sp>
         <p:sp>
           <p:nvSpPr>
-            <p:cNvPr id="72" name="tx72"/>
-            <p:cNvSpPr/>
-            <p:nvPr/>
-          </p:nvSpPr>
-          <p:spPr>
-            <a:xfrm>
-              <a:off x="1651157" y="5776754"/>
+            <p:cNvPr id="48" name="tx48"/>
+            <p:cNvSpPr/>
+            <p:nvPr/>
+          </p:nvSpPr>
+          <p:spPr>
+            <a:xfrm>
+              <a:off x="1651157" y="3062786"/>
               <a:ext cx="2983626" cy="147955"/>
             </a:xfrm>
             <a:prstGeom prst="rect">
@@ -5477,13 +4649,13 @@
         </p:sp>
         <p:sp>
           <p:nvSpPr>
-            <p:cNvPr id="73" name="tx73"/>
-            <p:cNvSpPr/>
-            <p:nvPr/>
-          </p:nvSpPr>
-          <p:spPr>
-            <a:xfrm>
-              <a:off x="1651157" y="4358186"/>
+            <p:cNvPr id="49" name="tx49"/>
+            <p:cNvSpPr/>
+            <p:nvPr/>
+          </p:nvSpPr>
+          <p:spPr>
+            <a:xfrm>
+              <a:off x="1651157" y="1582632"/>
               <a:ext cx="3273186" cy="147955"/>
             </a:xfrm>
             <a:prstGeom prst="rect">
@@ -5523,13 +4695,13 @@
         </p:sp>
         <p:sp>
           <p:nvSpPr>
-            <p:cNvPr id="74" name="tx74"/>
-            <p:cNvSpPr/>
-            <p:nvPr/>
-          </p:nvSpPr>
-          <p:spPr>
-            <a:xfrm>
-              <a:off x="1651157" y="2939617"/>
+            <p:cNvPr id="50" name="tx50"/>
+            <p:cNvSpPr/>
+            <p:nvPr/>
+          </p:nvSpPr>
+          <p:spPr>
+            <a:xfrm>
+              <a:off x="1651157" y="102479"/>
               <a:ext cx="3444557" cy="147955"/>
             </a:xfrm>
             <a:prstGeom prst="rect">
@@ -5569,105 +4741,13 @@
         </p:sp>
         <p:sp>
           <p:nvSpPr>
-            <p:cNvPr id="75" name="tx75"/>
-            <p:cNvSpPr/>
-            <p:nvPr/>
-          </p:nvSpPr>
-          <p:spPr>
-            <a:xfrm>
-              <a:off x="1651157" y="1523826"/>
-              <a:ext cx="1223327" cy="145176"/>
-            </a:xfrm>
-            <a:prstGeom prst="rect">
-              <a:avLst/>
-            </a:prstGeom>
-            <a:noFill/>
-          </p:spPr>
-          <p:txBody>
-            <a:bodyPr lIns="0" rIns="0" tIns="0" bIns="0" anchorCtr="1" anchor="ctr" wrap="none"/>
-            <a:lstStyle/>
-            <a:p>
-              <a:pPr algn="l" marL="0" marR="0" indent="0">
-                <a:lnSpc>
-                  <a:spcPts val="1280"/>
-                </a:lnSpc>
-                <a:spcBef>
-                  <a:spcPts val="0"/>
-                </a:spcBef>
-                <a:spcAft>
-                  <a:spcPts val="0"/>
-                </a:spcAft>
-              </a:pPr>
-              <a:r>
-                <a:rPr sz="1280">
-                  <a:solidFill>
-                    <a:srgbClr val="1A1A1A">
-                      <a:alpha val="100000"/>
-                    </a:srgbClr>
-                  </a:solidFill>
-                  <a:latin typeface="Times New Roman"/>
-                  <a:cs typeface="Times New Roman"/>
-                </a:rPr>
-                <a:t>Average Sympatry</a:t>
-              </a:r>
-            </a:p>
-          </p:txBody>
-        </p:sp>
-        <p:sp>
-          <p:nvSpPr>
-            <p:cNvPr id="76" name="tx76"/>
-            <p:cNvSpPr/>
-            <p:nvPr/>
-          </p:nvSpPr>
-          <p:spPr>
-            <a:xfrm>
-              <a:off x="1651157" y="102479"/>
-              <a:ext cx="1214199" cy="147955"/>
-            </a:xfrm>
-            <a:prstGeom prst="rect">
-              <a:avLst/>
-            </a:prstGeom>
-            <a:noFill/>
-          </p:spPr>
-          <p:txBody>
-            <a:bodyPr lIns="0" rIns="0" tIns="0" bIns="0" anchorCtr="1" anchor="ctr" wrap="none"/>
-            <a:lstStyle/>
-            <a:p>
-              <a:pPr algn="l" marL="0" marR="0" indent="0">
-                <a:lnSpc>
-                  <a:spcPts val="1280"/>
-                </a:lnSpc>
-                <a:spcBef>
-                  <a:spcPts val="0"/>
-                </a:spcBef>
-                <a:spcAft>
-                  <a:spcPts val="0"/>
-                </a:spcAft>
-              </a:pPr>
-              <a:r>
-                <a:rPr sz="1280">
-                  <a:solidFill>
-                    <a:srgbClr val="1A1A1A">
-                      <a:alpha val="100000"/>
-                    </a:srgbClr>
-                  </a:solidFill>
-                  <a:latin typeface="Times New Roman"/>
-                  <a:cs typeface="Times New Roman"/>
-                </a:rPr>
-                <a:t>Average Allopatry</a:t>
-              </a:r>
-            </a:p>
-          </p:txBody>
-        </p:sp>
-        <p:sp>
-          <p:nvSpPr>
-            <p:cNvPr id="77" name="pl77"/>
-            <p:cNvSpPr/>
-            <p:nvPr/>
-          </p:nvSpPr>
-          <p:spPr>
-            <a:xfrm>
-              <a:off x="1595485" y="8511412"/>
+            <p:cNvPr id="51" name="pl51"/>
+            <p:cNvSpPr/>
+            <p:nvPr/>
+          </p:nvSpPr>
+          <p:spPr>
+            <a:xfrm>
+              <a:off x="1595485" y="5920612"/>
               <a:ext cx="4743663" cy="0"/>
             </a:xfrm>
             <a:custGeom>
@@ -5701,13 +4781,13 @@
         </p:sp>
         <p:sp>
           <p:nvSpPr>
-            <p:cNvPr id="78" name="pl78"/>
-            <p:cNvSpPr/>
-            <p:nvPr/>
-          </p:nvSpPr>
-          <p:spPr>
-            <a:xfrm>
-              <a:off x="2092351" y="8511412"/>
+            <p:cNvPr id="52" name="pl52"/>
+            <p:cNvSpPr/>
+            <p:nvPr/>
+          </p:nvSpPr>
+          <p:spPr>
+            <a:xfrm>
+              <a:off x="2092351" y="5920612"/>
               <a:ext cx="0" cy="34794"/>
             </a:xfrm>
             <a:custGeom>
@@ -5741,13 +4821,13 @@
         </p:sp>
         <p:sp>
           <p:nvSpPr>
-            <p:cNvPr id="79" name="pl79"/>
-            <p:cNvSpPr/>
-            <p:nvPr/>
-          </p:nvSpPr>
-          <p:spPr>
-            <a:xfrm>
-              <a:off x="2561093" y="8511412"/>
+            <p:cNvPr id="53" name="pl53"/>
+            <p:cNvSpPr/>
+            <p:nvPr/>
+          </p:nvSpPr>
+          <p:spPr>
+            <a:xfrm>
+              <a:off x="2561093" y="5920612"/>
               <a:ext cx="0" cy="34794"/>
             </a:xfrm>
             <a:custGeom>
@@ -5781,13 +4861,13 @@
         </p:sp>
         <p:sp>
           <p:nvSpPr>
-            <p:cNvPr id="80" name="pl80"/>
-            <p:cNvSpPr/>
-            <p:nvPr/>
-          </p:nvSpPr>
-          <p:spPr>
-            <a:xfrm>
-              <a:off x="3029834" y="8511412"/>
+            <p:cNvPr id="54" name="pl54"/>
+            <p:cNvSpPr/>
+            <p:nvPr/>
+          </p:nvSpPr>
+          <p:spPr>
+            <a:xfrm>
+              <a:off x="3029834" y="5920612"/>
               <a:ext cx="0" cy="34794"/>
             </a:xfrm>
             <a:custGeom>
@@ -5821,13 +4901,13 @@
         </p:sp>
         <p:sp>
           <p:nvSpPr>
-            <p:cNvPr id="81" name="pl81"/>
-            <p:cNvSpPr/>
-            <p:nvPr/>
-          </p:nvSpPr>
-          <p:spPr>
-            <a:xfrm>
-              <a:off x="3498576" y="8511412"/>
+            <p:cNvPr id="55" name="pl55"/>
+            <p:cNvSpPr/>
+            <p:nvPr/>
+          </p:nvSpPr>
+          <p:spPr>
+            <a:xfrm>
+              <a:off x="3498576" y="5920612"/>
               <a:ext cx="0" cy="34794"/>
             </a:xfrm>
             <a:custGeom>
@@ -5861,13 +4941,13 @@
         </p:sp>
         <p:sp>
           <p:nvSpPr>
-            <p:cNvPr id="82" name="pl82"/>
-            <p:cNvSpPr/>
-            <p:nvPr/>
-          </p:nvSpPr>
-          <p:spPr>
-            <a:xfrm>
-              <a:off x="3967317" y="8511412"/>
+            <p:cNvPr id="56" name="pl56"/>
+            <p:cNvSpPr/>
+            <p:nvPr/>
+          </p:nvSpPr>
+          <p:spPr>
+            <a:xfrm>
+              <a:off x="3967317" y="5920612"/>
               <a:ext cx="0" cy="34794"/>
             </a:xfrm>
             <a:custGeom>
@@ -5901,13 +4981,13 @@
         </p:sp>
         <p:sp>
           <p:nvSpPr>
-            <p:cNvPr id="83" name="pl83"/>
-            <p:cNvSpPr/>
-            <p:nvPr/>
-          </p:nvSpPr>
-          <p:spPr>
-            <a:xfrm>
-              <a:off x="4436058" y="8511412"/>
+            <p:cNvPr id="57" name="pl57"/>
+            <p:cNvSpPr/>
+            <p:nvPr/>
+          </p:nvSpPr>
+          <p:spPr>
+            <a:xfrm>
+              <a:off x="4436058" y="5920612"/>
               <a:ext cx="0" cy="34794"/>
             </a:xfrm>
             <a:custGeom>
@@ -5941,13 +5021,13 @@
         </p:sp>
         <p:sp>
           <p:nvSpPr>
-            <p:cNvPr id="84" name="pl84"/>
-            <p:cNvSpPr/>
-            <p:nvPr/>
-          </p:nvSpPr>
-          <p:spPr>
-            <a:xfrm>
-              <a:off x="4904800" y="8511412"/>
+            <p:cNvPr id="58" name="pl58"/>
+            <p:cNvSpPr/>
+            <p:nvPr/>
+          </p:nvSpPr>
+          <p:spPr>
+            <a:xfrm>
+              <a:off x="4904800" y="5920612"/>
               <a:ext cx="0" cy="34794"/>
             </a:xfrm>
             <a:custGeom>
@@ -5981,13 +5061,13 @@
         </p:sp>
         <p:sp>
           <p:nvSpPr>
-            <p:cNvPr id="85" name="pl85"/>
-            <p:cNvSpPr/>
-            <p:nvPr/>
-          </p:nvSpPr>
-          <p:spPr>
-            <a:xfrm>
-              <a:off x="5373541" y="8511412"/>
+            <p:cNvPr id="59" name="pl59"/>
+            <p:cNvSpPr/>
+            <p:nvPr/>
+          </p:nvSpPr>
+          <p:spPr>
+            <a:xfrm>
+              <a:off x="5373541" y="5920612"/>
               <a:ext cx="0" cy="34794"/>
             </a:xfrm>
             <a:custGeom>
@@ -6021,13 +5101,13 @@
         </p:sp>
         <p:sp>
           <p:nvSpPr>
-            <p:cNvPr id="86" name="pl86"/>
-            <p:cNvSpPr/>
-            <p:nvPr/>
-          </p:nvSpPr>
-          <p:spPr>
-            <a:xfrm>
-              <a:off x="5842283" y="8511412"/>
+            <p:cNvPr id="60" name="pl60"/>
+            <p:cNvSpPr/>
+            <p:nvPr/>
+          </p:nvSpPr>
+          <p:spPr>
+            <a:xfrm>
+              <a:off x="5842283" y="5920612"/>
               <a:ext cx="0" cy="34794"/>
             </a:xfrm>
             <a:custGeom>
@@ -6061,13 +5141,13 @@
         </p:sp>
         <p:sp>
           <p:nvSpPr>
-            <p:cNvPr id="87" name="tx87"/>
-            <p:cNvSpPr/>
-            <p:nvPr/>
-          </p:nvSpPr>
-          <p:spPr>
-            <a:xfrm>
-              <a:off x="1923044" y="8569597"/>
+            <p:cNvPr id="61" name="tx61"/>
+            <p:cNvSpPr/>
+            <p:nvPr/>
+          </p:nvSpPr>
+          <p:spPr>
+            <a:xfrm>
+              <a:off x="1923044" y="5978797"/>
               <a:ext cx="338613" cy="112077"/>
             </a:xfrm>
             <a:prstGeom prst="rect">
@@ -6107,13 +5187,13 @@
         </p:sp>
         <p:sp>
           <p:nvSpPr>
-            <p:cNvPr id="88" name="tx88"/>
-            <p:cNvSpPr/>
-            <p:nvPr/>
-          </p:nvSpPr>
-          <p:spPr>
-            <a:xfrm>
-              <a:off x="2391786" y="8569597"/>
+            <p:cNvPr id="62" name="tx62"/>
+            <p:cNvSpPr/>
+            <p:nvPr/>
+          </p:nvSpPr>
+          <p:spPr>
+            <a:xfrm>
+              <a:off x="2391786" y="5978797"/>
               <a:ext cx="338613" cy="112077"/>
             </a:xfrm>
             <a:prstGeom prst="rect">
@@ -6153,13 +5233,13 @@
         </p:sp>
         <p:sp>
           <p:nvSpPr>
-            <p:cNvPr id="89" name="tx89"/>
-            <p:cNvSpPr/>
-            <p:nvPr/>
-          </p:nvSpPr>
-          <p:spPr>
-            <a:xfrm>
-              <a:off x="2860527" y="8569597"/>
+            <p:cNvPr id="63" name="tx63"/>
+            <p:cNvSpPr/>
+            <p:nvPr/>
+          </p:nvSpPr>
+          <p:spPr>
+            <a:xfrm>
+              <a:off x="2860527" y="5978797"/>
               <a:ext cx="338613" cy="112077"/>
             </a:xfrm>
             <a:prstGeom prst="rect">
@@ -6199,13 +5279,13 @@
         </p:sp>
         <p:sp>
           <p:nvSpPr>
-            <p:cNvPr id="90" name="tx90"/>
-            <p:cNvSpPr/>
-            <p:nvPr/>
-          </p:nvSpPr>
-          <p:spPr>
-            <a:xfrm>
-              <a:off x="3329269" y="8569597"/>
+            <p:cNvPr id="64" name="tx64"/>
+            <p:cNvSpPr/>
+            <p:nvPr/>
+          </p:nvSpPr>
+          <p:spPr>
+            <a:xfrm>
+              <a:off x="3329269" y="5978797"/>
               <a:ext cx="338613" cy="112077"/>
             </a:xfrm>
             <a:prstGeom prst="rect">
@@ -6245,13 +5325,13 @@
         </p:sp>
         <p:sp>
           <p:nvSpPr>
-            <p:cNvPr id="91" name="tx91"/>
-            <p:cNvSpPr/>
-            <p:nvPr/>
-          </p:nvSpPr>
-          <p:spPr>
-            <a:xfrm>
-              <a:off x="3825077" y="8569597"/>
+            <p:cNvPr id="65" name="tx65"/>
+            <p:cNvSpPr/>
+            <p:nvPr/>
+          </p:nvSpPr>
+          <p:spPr>
+            <a:xfrm>
+              <a:off x="3825077" y="5978797"/>
               <a:ext cx="284480" cy="112077"/>
             </a:xfrm>
             <a:prstGeom prst="rect">
@@ -6291,13 +5371,13 @@
         </p:sp>
         <p:sp>
           <p:nvSpPr>
-            <p:cNvPr id="92" name="tx92"/>
-            <p:cNvSpPr/>
-            <p:nvPr/>
-          </p:nvSpPr>
-          <p:spPr>
-            <a:xfrm>
-              <a:off x="4293818" y="8569597"/>
+            <p:cNvPr id="66" name="tx66"/>
+            <p:cNvSpPr/>
+            <p:nvPr/>
+          </p:nvSpPr>
+          <p:spPr>
+            <a:xfrm>
+              <a:off x="4293818" y="5978797"/>
               <a:ext cx="284480" cy="112077"/>
             </a:xfrm>
             <a:prstGeom prst="rect">
@@ -6337,13 +5417,13 @@
         </p:sp>
         <p:sp>
           <p:nvSpPr>
-            <p:cNvPr id="93" name="tx93"/>
-            <p:cNvSpPr/>
-            <p:nvPr/>
-          </p:nvSpPr>
-          <p:spPr>
-            <a:xfrm>
-              <a:off x="4762560" y="8569597"/>
+            <p:cNvPr id="67" name="tx67"/>
+            <p:cNvSpPr/>
+            <p:nvPr/>
+          </p:nvSpPr>
+          <p:spPr>
+            <a:xfrm>
+              <a:off x="4762560" y="5978797"/>
               <a:ext cx="284480" cy="112077"/>
             </a:xfrm>
             <a:prstGeom prst="rect">
@@ -6383,13 +5463,13 @@
         </p:sp>
         <p:sp>
           <p:nvSpPr>
-            <p:cNvPr id="94" name="tx94"/>
-            <p:cNvSpPr/>
-            <p:nvPr/>
-          </p:nvSpPr>
-          <p:spPr>
-            <a:xfrm>
-              <a:off x="5231301" y="8569597"/>
+            <p:cNvPr id="68" name="tx68"/>
+            <p:cNvSpPr/>
+            <p:nvPr/>
+          </p:nvSpPr>
+          <p:spPr>
+            <a:xfrm>
+              <a:off x="5231301" y="5978797"/>
               <a:ext cx="284480" cy="112077"/>
             </a:xfrm>
             <a:prstGeom prst="rect">
@@ -6429,13 +5509,13 @@
         </p:sp>
         <p:sp>
           <p:nvSpPr>
-            <p:cNvPr id="95" name="tx95"/>
-            <p:cNvSpPr/>
-            <p:nvPr/>
-          </p:nvSpPr>
-          <p:spPr>
-            <a:xfrm>
-              <a:off x="5700043" y="8569597"/>
+            <p:cNvPr id="69" name="tx69"/>
+            <p:cNvSpPr/>
+            <p:nvPr/>
+          </p:nvSpPr>
+          <p:spPr>
+            <a:xfrm>
+              <a:off x="5700043" y="5978797"/>
               <a:ext cx="284480" cy="112077"/>
             </a:xfrm>
             <a:prstGeom prst="rect">
@@ -6475,21 +5555,21 @@
         </p:sp>
         <p:sp>
           <p:nvSpPr>
-            <p:cNvPr id="96" name="pl96"/>
+            <p:cNvPr id="70" name="pl70"/>
             <p:cNvSpPr/>
             <p:nvPr/>
           </p:nvSpPr>
           <p:spPr>
             <a:xfrm>
               <a:off x="1595485" y="323647"/>
-              <a:ext cx="0" cy="1094921"/>
+              <a:ext cx="0" cy="1156505"/>
             </a:xfrm>
             <a:custGeom>
               <a:avLst/>
               <a:pathLst>
-                <a:path w="0" h="1094921">
+                <a:path w="0" h="1156505">
                   <a:moveTo>
-                    <a:pt x="0" y="1094921"/>
+                    <a:pt x="0" y="1156505"/>
                   </a:moveTo>
                   <a:lnTo>
                     <a:pt x="0" y="0"/>
@@ -6515,13 +5595,13 @@
         </p:sp>
         <p:sp>
           <p:nvSpPr>
-            <p:cNvPr id="97" name="tx97"/>
-            <p:cNvSpPr/>
-            <p:nvPr/>
-          </p:nvSpPr>
-          <p:spPr>
-            <a:xfrm>
-              <a:off x="1009060" y="1198092"/>
+            <p:cNvPr id="71" name="tx71"/>
+            <p:cNvSpPr/>
+            <p:nvPr/>
+          </p:nvSpPr>
+          <p:spPr>
+            <a:xfrm>
+              <a:off x="1009060" y="1252571"/>
               <a:ext cx="523795" cy="147955"/>
             </a:xfrm>
             <a:prstGeom prst="rect">
@@ -6561,13 +5641,13 @@
         </p:sp>
         <p:sp>
           <p:nvSpPr>
-            <p:cNvPr id="98" name="tx98"/>
-            <p:cNvSpPr/>
-            <p:nvPr/>
-          </p:nvSpPr>
-          <p:spPr>
-            <a:xfrm>
-              <a:off x="882695" y="987531"/>
+            <p:cNvPr id="72" name="tx72"/>
+            <p:cNvSpPr/>
+            <p:nvPr/>
+          </p:nvSpPr>
+          <p:spPr>
+            <a:xfrm>
+              <a:off x="882695" y="1030166"/>
               <a:ext cx="650160" cy="147955"/>
             </a:xfrm>
             <a:prstGeom prst="rect">
@@ -6607,13 +5687,13 @@
         </p:sp>
         <p:sp>
           <p:nvSpPr>
-            <p:cNvPr id="99" name="tx99"/>
-            <p:cNvSpPr/>
-            <p:nvPr/>
-          </p:nvSpPr>
-          <p:spPr>
-            <a:xfrm>
-              <a:off x="765140" y="777287"/>
+            <p:cNvPr id="73" name="tx73"/>
+            <p:cNvSpPr/>
+            <p:nvPr/>
+          </p:nvSpPr>
+          <p:spPr>
+            <a:xfrm>
+              <a:off x="765140" y="808079"/>
               <a:ext cx="767715" cy="147637"/>
             </a:xfrm>
             <a:prstGeom prst="rect">
@@ -6653,13 +5733,13 @@
         </p:sp>
         <p:sp>
           <p:nvSpPr>
-            <p:cNvPr id="100" name="tx100"/>
-            <p:cNvSpPr/>
-            <p:nvPr/>
-          </p:nvSpPr>
-          <p:spPr>
-            <a:xfrm>
-              <a:off x="282778" y="599269"/>
+            <p:cNvPr id="74" name="tx74"/>
+            <p:cNvSpPr/>
+            <p:nvPr/>
+          </p:nvSpPr>
+          <p:spPr>
+            <a:xfrm>
+              <a:off x="282778" y="618218"/>
               <a:ext cx="1250076" cy="115093"/>
             </a:xfrm>
             <a:prstGeom prst="rect">
@@ -6699,13 +5779,13 @@
         </p:sp>
         <p:sp>
           <p:nvSpPr>
-            <p:cNvPr id="101" name="tx101"/>
-            <p:cNvSpPr/>
-            <p:nvPr/>
-          </p:nvSpPr>
-          <p:spPr>
-            <a:xfrm>
-              <a:off x="774665" y="388707"/>
+            <p:cNvPr id="75" name="tx75"/>
+            <p:cNvSpPr/>
+            <p:nvPr/>
+          </p:nvSpPr>
+          <p:spPr>
+            <a:xfrm>
+              <a:off x="774665" y="395813"/>
               <a:ext cx="758189" cy="115093"/>
             </a:xfrm>
             <a:prstGeom prst="rect">
@@ -6745,13 +5825,13 @@
         </p:sp>
         <p:sp>
           <p:nvSpPr>
-            <p:cNvPr id="102" name="pl102"/>
-            <p:cNvSpPr/>
-            <p:nvPr/>
-          </p:nvSpPr>
-          <p:spPr>
-            <a:xfrm>
-              <a:off x="1560691" y="1292231"/>
+            <p:cNvPr id="76" name="pl76"/>
+            <p:cNvSpPr/>
+            <p:nvPr/>
+          </p:nvSpPr>
+          <p:spPr>
+            <a:xfrm>
+              <a:off x="1560691" y="1346710"/>
               <a:ext cx="34794" cy="0"/>
             </a:xfrm>
             <a:custGeom>
@@ -6785,13 +5865,13 @@
         </p:sp>
         <p:sp>
           <p:nvSpPr>
-            <p:cNvPr id="103" name="pl103"/>
-            <p:cNvSpPr/>
-            <p:nvPr/>
-          </p:nvSpPr>
-          <p:spPr>
-            <a:xfrm>
-              <a:off x="1560691" y="1081670"/>
+            <p:cNvPr id="77" name="pl77"/>
+            <p:cNvSpPr/>
+            <p:nvPr/>
+          </p:nvSpPr>
+          <p:spPr>
+            <a:xfrm>
+              <a:off x="1560691" y="1124305"/>
               <a:ext cx="34794" cy="0"/>
             </a:xfrm>
             <a:custGeom>
@@ -6825,13 +5905,13 @@
         </p:sp>
         <p:sp>
           <p:nvSpPr>
-            <p:cNvPr id="104" name="pl104"/>
-            <p:cNvSpPr/>
-            <p:nvPr/>
-          </p:nvSpPr>
-          <p:spPr>
-            <a:xfrm>
-              <a:off x="1560691" y="871108"/>
+            <p:cNvPr id="78" name="pl78"/>
+            <p:cNvSpPr/>
+            <p:nvPr/>
+          </p:nvSpPr>
+          <p:spPr>
+            <a:xfrm>
+              <a:off x="1560691" y="901900"/>
               <a:ext cx="34794" cy="0"/>
             </a:xfrm>
             <a:custGeom>
@@ -6865,13 +5945,13 @@
         </p:sp>
         <p:sp>
           <p:nvSpPr>
-            <p:cNvPr id="105" name="pl105"/>
-            <p:cNvSpPr/>
-            <p:nvPr/>
-          </p:nvSpPr>
-          <p:spPr>
-            <a:xfrm>
-              <a:off x="1560691" y="660546"/>
+            <p:cNvPr id="79" name="pl79"/>
+            <p:cNvSpPr/>
+            <p:nvPr/>
+          </p:nvSpPr>
+          <p:spPr>
+            <a:xfrm>
+              <a:off x="1560691" y="679495"/>
               <a:ext cx="34794" cy="0"/>
             </a:xfrm>
             <a:custGeom>
@@ -6905,13 +5985,13 @@
         </p:sp>
         <p:sp>
           <p:nvSpPr>
-            <p:cNvPr id="106" name="pl106"/>
-            <p:cNvSpPr/>
-            <p:nvPr/>
-          </p:nvSpPr>
-          <p:spPr>
-            <a:xfrm>
-              <a:off x="1560691" y="449984"/>
+            <p:cNvPr id="80" name="pl80"/>
+            <p:cNvSpPr/>
+            <p:nvPr/>
+          </p:nvSpPr>
+          <p:spPr>
+            <a:xfrm>
+              <a:off x="1560691" y="457090"/>
               <a:ext cx="34794" cy="0"/>
             </a:xfrm>
             <a:custGeom>
@@ -6945,21 +6025,21 @@
         </p:sp>
         <p:sp>
           <p:nvSpPr>
-            <p:cNvPr id="107" name="pl107"/>
-            <p:cNvSpPr/>
-            <p:nvPr/>
-          </p:nvSpPr>
-          <p:spPr>
-            <a:xfrm>
-              <a:off x="1595485" y="1742216"/>
-              <a:ext cx="0" cy="1094921"/>
+            <p:cNvPr id="81" name="pl81"/>
+            <p:cNvSpPr/>
+            <p:nvPr/>
+          </p:nvSpPr>
+          <p:spPr>
+            <a:xfrm>
+              <a:off x="1595485" y="1803800"/>
+              <a:ext cx="0" cy="1156505"/>
             </a:xfrm>
             <a:custGeom>
               <a:avLst/>
               <a:pathLst>
-                <a:path w="0" h="1094921">
+                <a:path w="0" h="1156505">
                   <a:moveTo>
-                    <a:pt x="0" y="1094921"/>
+                    <a:pt x="0" y="1156505"/>
                   </a:moveTo>
                   <a:lnTo>
                     <a:pt x="0" y="0"/>
@@ -6985,13 +6065,13 @@
         </p:sp>
         <p:sp>
           <p:nvSpPr>
-            <p:cNvPr id="108" name="tx108"/>
-            <p:cNvSpPr/>
-            <p:nvPr/>
-          </p:nvSpPr>
-          <p:spPr>
-            <a:xfrm>
-              <a:off x="1009060" y="2616661"/>
+            <p:cNvPr id="82" name="tx82"/>
+            <p:cNvSpPr/>
+            <p:nvPr/>
+          </p:nvSpPr>
+          <p:spPr>
+            <a:xfrm>
+              <a:off x="1009060" y="2732724"/>
               <a:ext cx="523795" cy="147955"/>
             </a:xfrm>
             <a:prstGeom prst="rect">
@@ -7031,13 +6111,13 @@
         </p:sp>
         <p:sp>
           <p:nvSpPr>
-            <p:cNvPr id="109" name="tx109"/>
-            <p:cNvSpPr/>
-            <p:nvPr/>
-          </p:nvSpPr>
-          <p:spPr>
-            <a:xfrm>
-              <a:off x="882695" y="2406100"/>
+            <p:cNvPr id="83" name="tx83"/>
+            <p:cNvSpPr/>
+            <p:nvPr/>
+          </p:nvSpPr>
+          <p:spPr>
+            <a:xfrm>
+              <a:off x="882695" y="2510319"/>
               <a:ext cx="650160" cy="147955"/>
             </a:xfrm>
             <a:prstGeom prst="rect">
@@ -7077,13 +6157,13 @@
         </p:sp>
         <p:sp>
           <p:nvSpPr>
-            <p:cNvPr id="110" name="tx110"/>
-            <p:cNvSpPr/>
-            <p:nvPr/>
-          </p:nvSpPr>
-          <p:spPr>
-            <a:xfrm>
-              <a:off x="765140" y="2195855"/>
+            <p:cNvPr id="84" name="tx84"/>
+            <p:cNvSpPr/>
+            <p:nvPr/>
+          </p:nvSpPr>
+          <p:spPr>
+            <a:xfrm>
+              <a:off x="765140" y="2288232"/>
               <a:ext cx="767715" cy="147637"/>
             </a:xfrm>
             <a:prstGeom prst="rect">
@@ -7123,13 +6203,13 @@
         </p:sp>
         <p:sp>
           <p:nvSpPr>
-            <p:cNvPr id="111" name="tx111"/>
-            <p:cNvSpPr/>
-            <p:nvPr/>
-          </p:nvSpPr>
-          <p:spPr>
-            <a:xfrm>
-              <a:off x="282778" y="2017837"/>
+            <p:cNvPr id="85" name="tx85"/>
+            <p:cNvSpPr/>
+            <p:nvPr/>
+          </p:nvSpPr>
+          <p:spPr>
+            <a:xfrm>
+              <a:off x="282778" y="2098371"/>
               <a:ext cx="1250076" cy="115093"/>
             </a:xfrm>
             <a:prstGeom prst="rect">
@@ -7169,13 +6249,13 @@
         </p:sp>
         <p:sp>
           <p:nvSpPr>
-            <p:cNvPr id="112" name="tx112"/>
-            <p:cNvSpPr/>
-            <p:nvPr/>
-          </p:nvSpPr>
-          <p:spPr>
-            <a:xfrm>
-              <a:off x="774665" y="1807276"/>
+            <p:cNvPr id="86" name="tx86"/>
+            <p:cNvSpPr/>
+            <p:nvPr/>
+          </p:nvSpPr>
+          <p:spPr>
+            <a:xfrm>
+              <a:off x="774665" y="1875966"/>
               <a:ext cx="758189" cy="115093"/>
             </a:xfrm>
             <a:prstGeom prst="rect">
@@ -7215,13 +6295,13 @@
         </p:sp>
         <p:sp>
           <p:nvSpPr>
-            <p:cNvPr id="113" name="pl113"/>
-            <p:cNvSpPr/>
-            <p:nvPr/>
-          </p:nvSpPr>
-          <p:spPr>
-            <a:xfrm>
-              <a:off x="1560691" y="2710800"/>
+            <p:cNvPr id="87" name="pl87"/>
+            <p:cNvSpPr/>
+            <p:nvPr/>
+          </p:nvSpPr>
+          <p:spPr>
+            <a:xfrm>
+              <a:off x="1560691" y="2826863"/>
               <a:ext cx="34794" cy="0"/>
             </a:xfrm>
             <a:custGeom>
@@ -7255,13 +6335,13 @@
         </p:sp>
         <p:sp>
           <p:nvSpPr>
-            <p:cNvPr id="114" name="pl114"/>
-            <p:cNvSpPr/>
-            <p:nvPr/>
-          </p:nvSpPr>
-          <p:spPr>
-            <a:xfrm>
-              <a:off x="1560691" y="2500238"/>
+            <p:cNvPr id="88" name="pl88"/>
+            <p:cNvSpPr/>
+            <p:nvPr/>
+          </p:nvSpPr>
+          <p:spPr>
+            <a:xfrm>
+              <a:off x="1560691" y="2604458"/>
               <a:ext cx="34794" cy="0"/>
             </a:xfrm>
             <a:custGeom>
@@ -7295,13 +6375,13 @@
         </p:sp>
         <p:sp>
           <p:nvSpPr>
-            <p:cNvPr id="115" name="pl115"/>
-            <p:cNvSpPr/>
-            <p:nvPr/>
-          </p:nvSpPr>
-          <p:spPr>
-            <a:xfrm>
-              <a:off x="1560691" y="2289677"/>
+            <p:cNvPr id="89" name="pl89"/>
+            <p:cNvSpPr/>
+            <p:nvPr/>
+          </p:nvSpPr>
+          <p:spPr>
+            <a:xfrm>
+              <a:off x="1560691" y="2382053"/>
               <a:ext cx="34794" cy="0"/>
             </a:xfrm>
             <a:custGeom>
@@ -7335,13 +6415,13 @@
         </p:sp>
         <p:sp>
           <p:nvSpPr>
-            <p:cNvPr id="116" name="pl116"/>
-            <p:cNvSpPr/>
-            <p:nvPr/>
-          </p:nvSpPr>
-          <p:spPr>
-            <a:xfrm>
-              <a:off x="1560691" y="2079115"/>
+            <p:cNvPr id="90" name="pl90"/>
+            <p:cNvSpPr/>
+            <p:nvPr/>
+          </p:nvSpPr>
+          <p:spPr>
+            <a:xfrm>
+              <a:off x="1560691" y="2159648"/>
               <a:ext cx="34794" cy="0"/>
             </a:xfrm>
             <a:custGeom>
@@ -7375,13 +6455,13 @@
         </p:sp>
         <p:sp>
           <p:nvSpPr>
-            <p:cNvPr id="117" name="pl117"/>
-            <p:cNvSpPr/>
-            <p:nvPr/>
-          </p:nvSpPr>
-          <p:spPr>
-            <a:xfrm>
-              <a:off x="1560691" y="1868553"/>
+            <p:cNvPr id="91" name="pl91"/>
+            <p:cNvSpPr/>
+            <p:nvPr/>
+          </p:nvSpPr>
+          <p:spPr>
+            <a:xfrm>
+              <a:off x="1560691" y="1937243"/>
               <a:ext cx="34794" cy="0"/>
             </a:xfrm>
             <a:custGeom>
@@ -7415,21 +6495,21 @@
         </p:sp>
         <p:sp>
           <p:nvSpPr>
-            <p:cNvPr id="118" name="pl118"/>
-            <p:cNvSpPr/>
-            <p:nvPr/>
-          </p:nvSpPr>
-          <p:spPr>
-            <a:xfrm>
-              <a:off x="1595485" y="3160785"/>
-              <a:ext cx="0" cy="1094921"/>
+            <p:cNvPr id="92" name="pl92"/>
+            <p:cNvSpPr/>
+            <p:nvPr/>
+          </p:nvSpPr>
+          <p:spPr>
+            <a:xfrm>
+              <a:off x="1595485" y="3283954"/>
+              <a:ext cx="0" cy="1156505"/>
             </a:xfrm>
             <a:custGeom>
               <a:avLst/>
               <a:pathLst>
-                <a:path w="0" h="1094921">
+                <a:path w="0" h="1156505">
                   <a:moveTo>
-                    <a:pt x="0" y="1094921"/>
+                    <a:pt x="0" y="1156505"/>
                   </a:moveTo>
                   <a:lnTo>
                     <a:pt x="0" y="0"/>
@@ -7455,13 +6535,13 @@
         </p:sp>
         <p:sp>
           <p:nvSpPr>
-            <p:cNvPr id="119" name="tx119"/>
-            <p:cNvSpPr/>
-            <p:nvPr/>
-          </p:nvSpPr>
-          <p:spPr>
-            <a:xfrm>
-              <a:off x="1009060" y="4035230"/>
+            <p:cNvPr id="93" name="tx93"/>
+            <p:cNvSpPr/>
+            <p:nvPr/>
+          </p:nvSpPr>
+          <p:spPr>
+            <a:xfrm>
+              <a:off x="1009060" y="4212877"/>
               <a:ext cx="523795" cy="147955"/>
             </a:xfrm>
             <a:prstGeom prst="rect">
@@ -7501,13 +6581,13 @@
         </p:sp>
         <p:sp>
           <p:nvSpPr>
-            <p:cNvPr id="120" name="tx120"/>
-            <p:cNvSpPr/>
-            <p:nvPr/>
-          </p:nvSpPr>
-          <p:spPr>
-            <a:xfrm>
-              <a:off x="882695" y="3824668"/>
+            <p:cNvPr id="94" name="tx94"/>
+            <p:cNvSpPr/>
+            <p:nvPr/>
+          </p:nvSpPr>
+          <p:spPr>
+            <a:xfrm>
+              <a:off x="882695" y="3990472"/>
               <a:ext cx="650160" cy="147955"/>
             </a:xfrm>
             <a:prstGeom prst="rect">
@@ -7547,13 +6627,13 @@
         </p:sp>
         <p:sp>
           <p:nvSpPr>
-            <p:cNvPr id="121" name="tx121"/>
-            <p:cNvSpPr/>
-            <p:nvPr/>
-          </p:nvSpPr>
-          <p:spPr>
-            <a:xfrm>
-              <a:off x="765140" y="3614424"/>
+            <p:cNvPr id="95" name="tx95"/>
+            <p:cNvSpPr/>
+            <p:nvPr/>
+          </p:nvSpPr>
+          <p:spPr>
+            <a:xfrm>
+              <a:off x="765140" y="3768385"/>
               <a:ext cx="767715" cy="147637"/>
             </a:xfrm>
             <a:prstGeom prst="rect">
@@ -7593,13 +6673,13 @@
         </p:sp>
         <p:sp>
           <p:nvSpPr>
-            <p:cNvPr id="122" name="tx122"/>
-            <p:cNvSpPr/>
-            <p:nvPr/>
-          </p:nvSpPr>
-          <p:spPr>
-            <a:xfrm>
-              <a:off x="282778" y="3436406"/>
+            <p:cNvPr id="96" name="tx96"/>
+            <p:cNvSpPr/>
+            <p:nvPr/>
+          </p:nvSpPr>
+          <p:spPr>
+            <a:xfrm>
+              <a:off x="282778" y="3578524"/>
               <a:ext cx="1250076" cy="115093"/>
             </a:xfrm>
             <a:prstGeom prst="rect">
@@ -7639,13 +6719,13 @@
         </p:sp>
         <p:sp>
           <p:nvSpPr>
-            <p:cNvPr id="123" name="tx123"/>
-            <p:cNvSpPr/>
-            <p:nvPr/>
-          </p:nvSpPr>
-          <p:spPr>
-            <a:xfrm>
-              <a:off x="774665" y="3225844"/>
+            <p:cNvPr id="97" name="tx97"/>
+            <p:cNvSpPr/>
+            <p:nvPr/>
+          </p:nvSpPr>
+          <p:spPr>
+            <a:xfrm>
+              <a:off x="774665" y="3356119"/>
               <a:ext cx="758189" cy="115093"/>
             </a:xfrm>
             <a:prstGeom prst="rect">
@@ -7685,13 +6765,13 @@
         </p:sp>
         <p:sp>
           <p:nvSpPr>
-            <p:cNvPr id="124" name="pl124"/>
-            <p:cNvSpPr/>
-            <p:nvPr/>
-          </p:nvSpPr>
-          <p:spPr>
-            <a:xfrm>
-              <a:off x="1560691" y="4129369"/>
+            <p:cNvPr id="98" name="pl98"/>
+            <p:cNvSpPr/>
+            <p:nvPr/>
+          </p:nvSpPr>
+          <p:spPr>
+            <a:xfrm>
+              <a:off x="1560691" y="4307016"/>
               <a:ext cx="34794" cy="0"/>
             </a:xfrm>
             <a:custGeom>
@@ -7725,13 +6805,13 @@
         </p:sp>
         <p:sp>
           <p:nvSpPr>
-            <p:cNvPr id="125" name="pl125"/>
-            <p:cNvSpPr/>
-            <p:nvPr/>
-          </p:nvSpPr>
-          <p:spPr>
-            <a:xfrm>
-              <a:off x="1560691" y="3918807"/>
+            <p:cNvPr id="99" name="pl99"/>
+            <p:cNvSpPr/>
+            <p:nvPr/>
+          </p:nvSpPr>
+          <p:spPr>
+            <a:xfrm>
+              <a:off x="1560691" y="4084611"/>
               <a:ext cx="34794" cy="0"/>
             </a:xfrm>
             <a:custGeom>
@@ -7765,13 +6845,13 @@
         </p:sp>
         <p:sp>
           <p:nvSpPr>
-            <p:cNvPr id="126" name="pl126"/>
-            <p:cNvSpPr/>
-            <p:nvPr/>
-          </p:nvSpPr>
-          <p:spPr>
-            <a:xfrm>
-              <a:off x="1560691" y="3708245"/>
+            <p:cNvPr id="100" name="pl100"/>
+            <p:cNvSpPr/>
+            <p:nvPr/>
+          </p:nvSpPr>
+          <p:spPr>
+            <a:xfrm>
+              <a:off x="1560691" y="3862206"/>
               <a:ext cx="34794" cy="0"/>
             </a:xfrm>
             <a:custGeom>
@@ -7805,13 +6885,13 @@
         </p:sp>
         <p:sp>
           <p:nvSpPr>
-            <p:cNvPr id="127" name="pl127"/>
-            <p:cNvSpPr/>
-            <p:nvPr/>
-          </p:nvSpPr>
-          <p:spPr>
-            <a:xfrm>
-              <a:off x="1560691" y="3497684"/>
+            <p:cNvPr id="101" name="pl101"/>
+            <p:cNvSpPr/>
+            <p:nvPr/>
+          </p:nvSpPr>
+          <p:spPr>
+            <a:xfrm>
+              <a:off x="1560691" y="3639801"/>
               <a:ext cx="34794" cy="0"/>
             </a:xfrm>
             <a:custGeom>
@@ -7845,13 +6925,13 @@
         </p:sp>
         <p:sp>
           <p:nvSpPr>
-            <p:cNvPr id="128" name="pl128"/>
-            <p:cNvSpPr/>
-            <p:nvPr/>
-          </p:nvSpPr>
-          <p:spPr>
-            <a:xfrm>
-              <a:off x="1560691" y="3287122"/>
+            <p:cNvPr id="102" name="pl102"/>
+            <p:cNvSpPr/>
+            <p:nvPr/>
+          </p:nvSpPr>
+          <p:spPr>
+            <a:xfrm>
+              <a:off x="1560691" y="3417397"/>
               <a:ext cx="34794" cy="0"/>
             </a:xfrm>
             <a:custGeom>
@@ -7885,21 +6965,21 @@
         </p:sp>
         <p:sp>
           <p:nvSpPr>
-            <p:cNvPr id="129" name="pl129"/>
-            <p:cNvSpPr/>
-            <p:nvPr/>
-          </p:nvSpPr>
-          <p:spPr>
-            <a:xfrm>
-              <a:off x="1595485" y="4579354"/>
-              <a:ext cx="0" cy="1094921"/>
+            <p:cNvPr id="103" name="pl103"/>
+            <p:cNvSpPr/>
+            <p:nvPr/>
+          </p:nvSpPr>
+          <p:spPr>
+            <a:xfrm>
+              <a:off x="1595485" y="4764107"/>
+              <a:ext cx="0" cy="1156505"/>
             </a:xfrm>
             <a:custGeom>
               <a:avLst/>
               <a:pathLst>
-                <a:path w="0" h="1094921">
+                <a:path w="0" h="1156505">
                   <a:moveTo>
-                    <a:pt x="0" y="1094921"/>
+                    <a:pt x="0" y="1156505"/>
                   </a:moveTo>
                   <a:lnTo>
                     <a:pt x="0" y="0"/>
@@ -7925,13 +7005,13 @@
         </p:sp>
         <p:sp>
           <p:nvSpPr>
-            <p:cNvPr id="130" name="tx130"/>
-            <p:cNvSpPr/>
-            <p:nvPr/>
-          </p:nvSpPr>
-          <p:spPr>
-            <a:xfrm>
-              <a:off x="1009060" y="5453799"/>
+            <p:cNvPr id="104" name="tx104"/>
+            <p:cNvSpPr/>
+            <p:nvPr/>
+          </p:nvSpPr>
+          <p:spPr>
+            <a:xfrm>
+              <a:off x="1009060" y="5693031"/>
               <a:ext cx="523795" cy="147955"/>
             </a:xfrm>
             <a:prstGeom prst="rect">
@@ -7971,13 +7051,13 @@
         </p:sp>
         <p:sp>
           <p:nvSpPr>
-            <p:cNvPr id="131" name="tx131"/>
-            <p:cNvSpPr/>
-            <p:nvPr/>
-          </p:nvSpPr>
-          <p:spPr>
-            <a:xfrm>
-              <a:off x="882695" y="5243237"/>
+            <p:cNvPr id="105" name="tx105"/>
+            <p:cNvSpPr/>
+            <p:nvPr/>
+          </p:nvSpPr>
+          <p:spPr>
+            <a:xfrm>
+              <a:off x="882695" y="5470626"/>
               <a:ext cx="650160" cy="147955"/>
             </a:xfrm>
             <a:prstGeom prst="rect">
@@ -8017,13 +7097,13 @@
         </p:sp>
         <p:sp>
           <p:nvSpPr>
-            <p:cNvPr id="132" name="tx132"/>
-            <p:cNvSpPr/>
-            <p:nvPr/>
-          </p:nvSpPr>
-          <p:spPr>
-            <a:xfrm>
-              <a:off x="765140" y="5032993"/>
+            <p:cNvPr id="106" name="tx106"/>
+            <p:cNvSpPr/>
+            <p:nvPr/>
+          </p:nvSpPr>
+          <p:spPr>
+            <a:xfrm>
+              <a:off x="765140" y="5248538"/>
               <a:ext cx="767715" cy="147637"/>
             </a:xfrm>
             <a:prstGeom prst="rect">
@@ -8063,13 +7143,13 @@
         </p:sp>
         <p:sp>
           <p:nvSpPr>
-            <p:cNvPr id="133" name="tx133"/>
-            <p:cNvSpPr/>
-            <p:nvPr/>
-          </p:nvSpPr>
-          <p:spPr>
-            <a:xfrm>
-              <a:off x="282778" y="4854975"/>
+            <p:cNvPr id="107" name="tx107"/>
+            <p:cNvSpPr/>
+            <p:nvPr/>
+          </p:nvSpPr>
+          <p:spPr>
+            <a:xfrm>
+              <a:off x="282778" y="5058677"/>
               <a:ext cx="1250076" cy="115093"/>
             </a:xfrm>
             <a:prstGeom prst="rect">
@@ -8109,13 +7189,13 @@
         </p:sp>
         <p:sp>
           <p:nvSpPr>
-            <p:cNvPr id="134" name="tx134"/>
-            <p:cNvSpPr/>
-            <p:nvPr/>
-          </p:nvSpPr>
-          <p:spPr>
-            <a:xfrm>
-              <a:off x="774665" y="4644413"/>
+            <p:cNvPr id="108" name="tx108"/>
+            <p:cNvSpPr/>
+            <p:nvPr/>
+          </p:nvSpPr>
+          <p:spPr>
+            <a:xfrm>
+              <a:off x="774665" y="4836272"/>
               <a:ext cx="758189" cy="115093"/>
             </a:xfrm>
             <a:prstGeom prst="rect">
@@ -8155,13 +7235,13 @@
         </p:sp>
         <p:sp>
           <p:nvSpPr>
-            <p:cNvPr id="135" name="pl135"/>
-            <p:cNvSpPr/>
-            <p:nvPr/>
-          </p:nvSpPr>
-          <p:spPr>
-            <a:xfrm>
-              <a:off x="1560691" y="5547938"/>
+            <p:cNvPr id="109" name="pl109"/>
+            <p:cNvSpPr/>
+            <p:nvPr/>
+          </p:nvSpPr>
+          <p:spPr>
+            <a:xfrm>
+              <a:off x="1560691" y="5787169"/>
               <a:ext cx="34794" cy="0"/>
             </a:xfrm>
             <a:custGeom>
@@ -8195,13 +7275,13 @@
         </p:sp>
         <p:sp>
           <p:nvSpPr>
-            <p:cNvPr id="136" name="pl136"/>
-            <p:cNvSpPr/>
-            <p:nvPr/>
-          </p:nvSpPr>
-          <p:spPr>
-            <a:xfrm>
-              <a:off x="1560691" y="5337376"/>
+            <p:cNvPr id="110" name="pl110"/>
+            <p:cNvSpPr/>
+            <p:nvPr/>
+          </p:nvSpPr>
+          <p:spPr>
+            <a:xfrm>
+              <a:off x="1560691" y="5564764"/>
               <a:ext cx="34794" cy="0"/>
             </a:xfrm>
             <a:custGeom>
@@ -8235,13 +7315,13 @@
         </p:sp>
         <p:sp>
           <p:nvSpPr>
-            <p:cNvPr id="137" name="pl137"/>
-            <p:cNvSpPr/>
-            <p:nvPr/>
-          </p:nvSpPr>
-          <p:spPr>
-            <a:xfrm>
-              <a:off x="1560691" y="5126814"/>
+            <p:cNvPr id="111" name="pl111"/>
+            <p:cNvSpPr/>
+            <p:nvPr/>
+          </p:nvSpPr>
+          <p:spPr>
+            <a:xfrm>
+              <a:off x="1560691" y="5342360"/>
               <a:ext cx="34794" cy="0"/>
             </a:xfrm>
             <a:custGeom>
@@ -8275,13 +7355,13 @@
         </p:sp>
         <p:sp>
           <p:nvSpPr>
-            <p:cNvPr id="138" name="pl138"/>
-            <p:cNvSpPr/>
-            <p:nvPr/>
-          </p:nvSpPr>
-          <p:spPr>
-            <a:xfrm>
-              <a:off x="1560691" y="4916252"/>
+            <p:cNvPr id="112" name="pl112"/>
+            <p:cNvSpPr/>
+            <p:nvPr/>
+          </p:nvSpPr>
+          <p:spPr>
+            <a:xfrm>
+              <a:off x="1560691" y="5119955"/>
               <a:ext cx="34794" cy="0"/>
             </a:xfrm>
             <a:custGeom>
@@ -8315,13 +7395,13 @@
         </p:sp>
         <p:sp>
           <p:nvSpPr>
-            <p:cNvPr id="139" name="pl139"/>
-            <p:cNvSpPr/>
-            <p:nvPr/>
-          </p:nvSpPr>
-          <p:spPr>
-            <a:xfrm>
-              <a:off x="1560691" y="4705691"/>
+            <p:cNvPr id="113" name="pl113"/>
+            <p:cNvSpPr/>
+            <p:nvPr/>
+          </p:nvSpPr>
+          <p:spPr>
+            <a:xfrm>
+              <a:off x="1560691" y="4897550"/>
               <a:ext cx="34794" cy="0"/>
             </a:xfrm>
             <a:custGeom>
@@ -8355,953 +7435,13 @@
         </p:sp>
         <p:sp>
           <p:nvSpPr>
-            <p:cNvPr id="140" name="pl140"/>
-            <p:cNvSpPr/>
-            <p:nvPr/>
-          </p:nvSpPr>
-          <p:spPr>
-            <a:xfrm>
-              <a:off x="1595485" y="5997922"/>
-              <a:ext cx="0" cy="1094921"/>
-            </a:xfrm>
-            <a:custGeom>
-              <a:avLst/>
-              <a:pathLst>
-                <a:path w="0" h="1094921">
-                  <a:moveTo>
-                    <a:pt x="0" y="1094921"/>
-                  </a:moveTo>
-                  <a:lnTo>
-                    <a:pt x="0" y="0"/>
-                  </a:lnTo>
-                </a:path>
-              </a:pathLst>
-            </a:custGeom>
-            <a:ln w="13550" cap="flat">
-              <a:solidFill>
-                <a:srgbClr val="000000">
-                  <a:alpha val="100000"/>
-                </a:srgbClr>
-              </a:solidFill>
-              <a:prstDash val="solid"/>
-              <a:round/>
-            </a:ln>
-          </p:spPr>
-          <p:txBody>
-            <a:bodyPr/>
-            <a:lstStyle/>
-            <a:p/>
-          </p:txBody>
-        </p:sp>
-        <p:sp>
-          <p:nvSpPr>
-            <p:cNvPr id="141" name="tx141"/>
-            <p:cNvSpPr/>
-            <p:nvPr/>
-          </p:nvSpPr>
-          <p:spPr>
-            <a:xfrm>
-              <a:off x="1009060" y="6872368"/>
-              <a:ext cx="523795" cy="147955"/>
-            </a:xfrm>
-            <a:prstGeom prst="rect">
-              <a:avLst/>
-            </a:prstGeom>
-            <a:noFill/>
-          </p:spPr>
-          <p:txBody>
-            <a:bodyPr lIns="0" rIns="0" tIns="0" bIns="0" anchorCtr="1" anchor="ctr" wrap="none"/>
-            <a:lstStyle/>
-            <a:p>
-              <a:pPr algn="l" marL="0" marR="0" indent="0">
-                <a:lnSpc>
-                  <a:spcPts val="1280"/>
-                </a:lnSpc>
-                <a:spcBef>
-                  <a:spcPts val="0"/>
-                </a:spcBef>
-                <a:spcAft>
-                  <a:spcPts val="0"/>
-                </a:spcAft>
-              </a:pPr>
-              <a:r>
-                <a:rPr sz="1280">
-                  <a:solidFill>
-                    <a:srgbClr val="4D4D4D">
-                      <a:alpha val="100000"/>
-                    </a:srgbClr>
-                  </a:solidFill>
-                  <a:latin typeface="Times New Roman"/>
-                  <a:cs typeface="Times New Roman"/>
-                </a:rPr>
-                <a:t>Fertility</a:t>
-              </a:r>
-            </a:p>
-          </p:txBody>
-        </p:sp>
-        <p:sp>
-          <p:nvSpPr>
-            <p:cNvPr id="142" name="tx142"/>
-            <p:cNvSpPr/>
-            <p:nvPr/>
-          </p:nvSpPr>
-          <p:spPr>
-            <a:xfrm>
-              <a:off x="882695" y="6661806"/>
-              <a:ext cx="650160" cy="147955"/>
-            </a:xfrm>
-            <a:prstGeom prst="rect">
-              <a:avLst/>
-            </a:prstGeom>
-            <a:noFill/>
-          </p:spPr>
-          <p:txBody>
-            <a:bodyPr lIns="0" rIns="0" tIns="0" bIns="0" anchorCtr="1" anchor="ctr" wrap="none"/>
-            <a:lstStyle/>
-            <a:p>
-              <a:pPr algn="l" marL="0" marR="0" indent="0">
-                <a:lnSpc>
-                  <a:spcPts val="1280"/>
-                </a:lnSpc>
-                <a:spcBef>
-                  <a:spcPts val="0"/>
-                </a:spcBef>
-                <a:spcAft>
-                  <a:spcPts val="0"/>
-                </a:spcAft>
-              </a:pPr>
-              <a:r>
-                <a:rPr sz="1280">
-                  <a:solidFill>
-                    <a:srgbClr val="4D4D4D">
-                      <a:alpha val="100000"/>
-                    </a:srgbClr>
-                  </a:solidFill>
-                  <a:latin typeface="Times New Roman"/>
-                  <a:cs typeface="Times New Roman"/>
-                </a:rPr>
-                <a:t>Fecundity</a:t>
-              </a:r>
-            </a:p>
-          </p:txBody>
-        </p:sp>
-        <p:sp>
-          <p:nvSpPr>
-            <p:cNvPr id="143" name="tx143"/>
-            <p:cNvSpPr/>
-            <p:nvPr/>
-          </p:nvSpPr>
-          <p:spPr>
-            <a:xfrm>
-              <a:off x="765140" y="6451562"/>
-              <a:ext cx="767715" cy="147637"/>
-            </a:xfrm>
-            <a:prstGeom prst="rect">
-              <a:avLst/>
-            </a:prstGeom>
-            <a:noFill/>
-          </p:spPr>
-          <p:txBody>
-            <a:bodyPr lIns="0" rIns="0" tIns="0" bIns="0" anchorCtr="1" anchor="ctr" wrap="none"/>
-            <a:lstStyle/>
-            <a:p>
-              <a:pPr algn="l" marL="0" marR="0" indent="0">
-                <a:lnSpc>
-                  <a:spcPts val="1280"/>
-                </a:lnSpc>
-                <a:spcBef>
-                  <a:spcPts val="0"/>
-                </a:spcBef>
-                <a:spcAft>
-                  <a:spcPts val="0"/>
-                </a:spcAft>
-              </a:pPr>
-              <a:r>
-                <a:rPr sz="1280">
-                  <a:solidFill>
-                    <a:srgbClr val="4D4D4D">
-                      <a:alpha val="100000"/>
-                    </a:srgbClr>
-                  </a:solidFill>
-                  <a:latin typeface="Times New Roman"/>
-                  <a:cs typeface="Times New Roman"/>
-                </a:rPr>
-                <a:t>Oviposition</a:t>
-              </a:r>
-            </a:p>
-          </p:txBody>
-        </p:sp>
-        <p:sp>
-          <p:nvSpPr>
-            <p:cNvPr id="144" name="tx144"/>
-            <p:cNvSpPr/>
-            <p:nvPr/>
-          </p:nvSpPr>
-          <p:spPr>
-            <a:xfrm>
-              <a:off x="282778" y="6273544"/>
-              <a:ext cx="1250076" cy="115093"/>
-            </a:xfrm>
-            <a:prstGeom prst="rect">
-              <a:avLst/>
-            </a:prstGeom>
-            <a:noFill/>
-          </p:spPr>
-          <p:txBody>
-            <a:bodyPr lIns="0" rIns="0" tIns="0" bIns="0" anchorCtr="1" anchor="ctr" wrap="none"/>
-            <a:lstStyle/>
-            <a:p>
-              <a:pPr algn="l" marL="0" marR="0" indent="0">
-                <a:lnSpc>
-                  <a:spcPts val="1280"/>
-                </a:lnSpc>
-                <a:spcBef>
-                  <a:spcPts val="0"/>
-                </a:spcBef>
-                <a:spcAft>
-                  <a:spcPts val="0"/>
-                </a:spcAft>
-              </a:pPr>
-              <a:r>
-                <a:rPr sz="1280">
-                  <a:solidFill>
-                    <a:srgbClr val="4D4D4D">
-                      <a:alpha val="100000"/>
-                    </a:srgbClr>
-                  </a:solidFill>
-                  <a:latin typeface="Times New Roman"/>
-                  <a:cs typeface="Times New Roman"/>
-                </a:rPr>
-                <a:t>Mechanical.Tactile</a:t>
-              </a:r>
-            </a:p>
-          </p:txBody>
-        </p:sp>
-        <p:sp>
-          <p:nvSpPr>
-            <p:cNvPr id="145" name="tx145"/>
-            <p:cNvSpPr/>
-            <p:nvPr/>
-          </p:nvSpPr>
-          <p:spPr>
-            <a:xfrm>
-              <a:off x="774665" y="6062982"/>
-              <a:ext cx="758189" cy="115093"/>
-            </a:xfrm>
-            <a:prstGeom prst="rect">
-              <a:avLst/>
-            </a:prstGeom>
-            <a:noFill/>
-          </p:spPr>
-          <p:txBody>
-            <a:bodyPr lIns="0" rIns="0" tIns="0" bIns="0" anchorCtr="1" anchor="ctr" wrap="none"/>
-            <a:lstStyle/>
-            <a:p>
-              <a:pPr algn="l" marL="0" marR="0" indent="0">
-                <a:lnSpc>
-                  <a:spcPts val="1280"/>
-                </a:lnSpc>
-                <a:spcBef>
-                  <a:spcPts val="0"/>
-                </a:spcBef>
-                <a:spcAft>
-                  <a:spcPts val="0"/>
-                </a:spcAft>
-              </a:pPr>
-              <a:r>
-                <a:rPr sz="1280">
-                  <a:solidFill>
-                    <a:srgbClr val="4D4D4D">
-                      <a:alpha val="100000"/>
-                    </a:srgbClr>
-                  </a:solidFill>
-                  <a:latin typeface="Times New Roman"/>
-                  <a:cs typeface="Times New Roman"/>
-                </a:rPr>
-                <a:t>Mechanical</a:t>
-              </a:r>
-            </a:p>
-          </p:txBody>
-        </p:sp>
-        <p:sp>
-          <p:nvSpPr>
-            <p:cNvPr id="146" name="pl146"/>
-            <p:cNvSpPr/>
-            <p:nvPr/>
-          </p:nvSpPr>
-          <p:spPr>
-            <a:xfrm>
-              <a:off x="1560691" y="6966506"/>
-              <a:ext cx="34794" cy="0"/>
-            </a:xfrm>
-            <a:custGeom>
-              <a:avLst/>
-              <a:pathLst>
-                <a:path w="34794" h="0">
-                  <a:moveTo>
-                    <a:pt x="0" y="0"/>
-                  </a:moveTo>
-                  <a:lnTo>
-                    <a:pt x="34794" y="0"/>
-                  </a:lnTo>
-                </a:path>
-              </a:pathLst>
-            </a:custGeom>
-            <a:ln w="13550" cap="flat">
-              <a:solidFill>
-                <a:srgbClr val="333333">
-                  <a:alpha val="100000"/>
-                </a:srgbClr>
-              </a:solidFill>
-              <a:prstDash val="solid"/>
-              <a:round/>
-            </a:ln>
-          </p:spPr>
-          <p:txBody>
-            <a:bodyPr/>
-            <a:lstStyle/>
-            <a:p/>
-          </p:txBody>
-        </p:sp>
-        <p:sp>
-          <p:nvSpPr>
-            <p:cNvPr id="147" name="pl147"/>
-            <p:cNvSpPr/>
-            <p:nvPr/>
-          </p:nvSpPr>
-          <p:spPr>
-            <a:xfrm>
-              <a:off x="1560691" y="6755945"/>
-              <a:ext cx="34794" cy="0"/>
-            </a:xfrm>
-            <a:custGeom>
-              <a:avLst/>
-              <a:pathLst>
-                <a:path w="34794" h="0">
-                  <a:moveTo>
-                    <a:pt x="0" y="0"/>
-                  </a:moveTo>
-                  <a:lnTo>
-                    <a:pt x="34794" y="0"/>
-                  </a:lnTo>
-                </a:path>
-              </a:pathLst>
-            </a:custGeom>
-            <a:ln w="13550" cap="flat">
-              <a:solidFill>
-                <a:srgbClr val="333333">
-                  <a:alpha val="100000"/>
-                </a:srgbClr>
-              </a:solidFill>
-              <a:prstDash val="solid"/>
-              <a:round/>
-            </a:ln>
-          </p:spPr>
-          <p:txBody>
-            <a:bodyPr/>
-            <a:lstStyle/>
-            <a:p/>
-          </p:txBody>
-        </p:sp>
-        <p:sp>
-          <p:nvSpPr>
-            <p:cNvPr id="148" name="pl148"/>
-            <p:cNvSpPr/>
-            <p:nvPr/>
-          </p:nvSpPr>
-          <p:spPr>
-            <a:xfrm>
-              <a:off x="1560691" y="6545383"/>
-              <a:ext cx="34794" cy="0"/>
-            </a:xfrm>
-            <a:custGeom>
-              <a:avLst/>
-              <a:pathLst>
-                <a:path w="34794" h="0">
-                  <a:moveTo>
-                    <a:pt x="0" y="0"/>
-                  </a:moveTo>
-                  <a:lnTo>
-                    <a:pt x="34794" y="0"/>
-                  </a:lnTo>
-                </a:path>
-              </a:pathLst>
-            </a:custGeom>
-            <a:ln w="13550" cap="flat">
-              <a:solidFill>
-                <a:srgbClr val="333333">
-                  <a:alpha val="100000"/>
-                </a:srgbClr>
-              </a:solidFill>
-              <a:prstDash val="solid"/>
-              <a:round/>
-            </a:ln>
-          </p:spPr>
-          <p:txBody>
-            <a:bodyPr/>
-            <a:lstStyle/>
-            <a:p/>
-          </p:txBody>
-        </p:sp>
-        <p:sp>
-          <p:nvSpPr>
-            <p:cNvPr id="149" name="pl149"/>
-            <p:cNvSpPr/>
-            <p:nvPr/>
-          </p:nvSpPr>
-          <p:spPr>
-            <a:xfrm>
-              <a:off x="1560691" y="6334821"/>
-              <a:ext cx="34794" cy="0"/>
-            </a:xfrm>
-            <a:custGeom>
-              <a:avLst/>
-              <a:pathLst>
-                <a:path w="34794" h="0">
-                  <a:moveTo>
-                    <a:pt x="0" y="0"/>
-                  </a:moveTo>
-                  <a:lnTo>
-                    <a:pt x="34794" y="0"/>
-                  </a:lnTo>
-                </a:path>
-              </a:pathLst>
-            </a:custGeom>
-            <a:ln w="13550" cap="flat">
-              <a:solidFill>
-                <a:srgbClr val="333333">
-                  <a:alpha val="100000"/>
-                </a:srgbClr>
-              </a:solidFill>
-              <a:prstDash val="solid"/>
-              <a:round/>
-            </a:ln>
-          </p:spPr>
-          <p:txBody>
-            <a:bodyPr/>
-            <a:lstStyle/>
-            <a:p/>
-          </p:txBody>
-        </p:sp>
-        <p:sp>
-          <p:nvSpPr>
-            <p:cNvPr id="150" name="pl150"/>
-            <p:cNvSpPr/>
-            <p:nvPr/>
-          </p:nvSpPr>
-          <p:spPr>
-            <a:xfrm>
-              <a:off x="1560691" y="6124259"/>
-              <a:ext cx="34794" cy="0"/>
-            </a:xfrm>
-            <a:custGeom>
-              <a:avLst/>
-              <a:pathLst>
-                <a:path w="34794" h="0">
-                  <a:moveTo>
-                    <a:pt x="0" y="0"/>
-                  </a:moveTo>
-                  <a:lnTo>
-                    <a:pt x="34794" y="0"/>
-                  </a:lnTo>
-                </a:path>
-              </a:pathLst>
-            </a:custGeom>
-            <a:ln w="13550" cap="flat">
-              <a:solidFill>
-                <a:srgbClr val="333333">
-                  <a:alpha val="100000"/>
-                </a:srgbClr>
-              </a:solidFill>
-              <a:prstDash val="solid"/>
-              <a:round/>
-            </a:ln>
-          </p:spPr>
-          <p:txBody>
-            <a:bodyPr/>
-            <a:lstStyle/>
-            <a:p/>
-          </p:txBody>
-        </p:sp>
-        <p:sp>
-          <p:nvSpPr>
-            <p:cNvPr id="151" name="pl151"/>
-            <p:cNvSpPr/>
-            <p:nvPr/>
-          </p:nvSpPr>
-          <p:spPr>
-            <a:xfrm>
-              <a:off x="1595485" y="7416491"/>
-              <a:ext cx="0" cy="1094921"/>
-            </a:xfrm>
-            <a:custGeom>
-              <a:avLst/>
-              <a:pathLst>
-                <a:path w="0" h="1094921">
-                  <a:moveTo>
-                    <a:pt x="0" y="1094921"/>
-                  </a:moveTo>
-                  <a:lnTo>
-                    <a:pt x="0" y="0"/>
-                  </a:lnTo>
-                </a:path>
-              </a:pathLst>
-            </a:custGeom>
-            <a:ln w="13550" cap="flat">
-              <a:solidFill>
-                <a:srgbClr val="000000">
-                  <a:alpha val="100000"/>
-                </a:srgbClr>
-              </a:solidFill>
-              <a:prstDash val="solid"/>
-              <a:round/>
-            </a:ln>
-          </p:spPr>
-          <p:txBody>
-            <a:bodyPr/>
-            <a:lstStyle/>
-            <a:p/>
-          </p:txBody>
-        </p:sp>
-        <p:sp>
-          <p:nvSpPr>
-            <p:cNvPr id="152" name="tx152"/>
-            <p:cNvSpPr/>
-            <p:nvPr/>
-          </p:nvSpPr>
-          <p:spPr>
-            <a:xfrm>
-              <a:off x="1009060" y="8290936"/>
-              <a:ext cx="523795" cy="147955"/>
-            </a:xfrm>
-            <a:prstGeom prst="rect">
-              <a:avLst/>
-            </a:prstGeom>
-            <a:noFill/>
-          </p:spPr>
-          <p:txBody>
-            <a:bodyPr lIns="0" rIns="0" tIns="0" bIns="0" anchorCtr="1" anchor="ctr" wrap="none"/>
-            <a:lstStyle/>
-            <a:p>
-              <a:pPr algn="l" marL="0" marR="0" indent="0">
-                <a:lnSpc>
-                  <a:spcPts val="1280"/>
-                </a:lnSpc>
-                <a:spcBef>
-                  <a:spcPts val="0"/>
-                </a:spcBef>
-                <a:spcAft>
-                  <a:spcPts val="0"/>
-                </a:spcAft>
-              </a:pPr>
-              <a:r>
-                <a:rPr sz="1280">
-                  <a:solidFill>
-                    <a:srgbClr val="4D4D4D">
-                      <a:alpha val="100000"/>
-                    </a:srgbClr>
-                  </a:solidFill>
-                  <a:latin typeface="Times New Roman"/>
-                  <a:cs typeface="Times New Roman"/>
-                </a:rPr>
-                <a:t>Fertility</a:t>
-              </a:r>
-            </a:p>
-          </p:txBody>
-        </p:sp>
-        <p:sp>
-          <p:nvSpPr>
-            <p:cNvPr id="153" name="tx153"/>
-            <p:cNvSpPr/>
-            <p:nvPr/>
-          </p:nvSpPr>
-          <p:spPr>
-            <a:xfrm>
-              <a:off x="882695" y="8080375"/>
-              <a:ext cx="650160" cy="147955"/>
-            </a:xfrm>
-            <a:prstGeom prst="rect">
-              <a:avLst/>
-            </a:prstGeom>
-            <a:noFill/>
-          </p:spPr>
-          <p:txBody>
-            <a:bodyPr lIns="0" rIns="0" tIns="0" bIns="0" anchorCtr="1" anchor="ctr" wrap="none"/>
-            <a:lstStyle/>
-            <a:p>
-              <a:pPr algn="l" marL="0" marR="0" indent="0">
-                <a:lnSpc>
-                  <a:spcPts val="1280"/>
-                </a:lnSpc>
-                <a:spcBef>
-                  <a:spcPts val="0"/>
-                </a:spcBef>
-                <a:spcAft>
-                  <a:spcPts val="0"/>
-                </a:spcAft>
-              </a:pPr>
-              <a:r>
-                <a:rPr sz="1280">
-                  <a:solidFill>
-                    <a:srgbClr val="4D4D4D">
-                      <a:alpha val="100000"/>
-                    </a:srgbClr>
-                  </a:solidFill>
-                  <a:latin typeface="Times New Roman"/>
-                  <a:cs typeface="Times New Roman"/>
-                </a:rPr>
-                <a:t>Fecundity</a:t>
-              </a:r>
-            </a:p>
-          </p:txBody>
-        </p:sp>
-        <p:sp>
-          <p:nvSpPr>
-            <p:cNvPr id="154" name="tx154"/>
-            <p:cNvSpPr/>
-            <p:nvPr/>
-          </p:nvSpPr>
-          <p:spPr>
-            <a:xfrm>
-              <a:off x="765140" y="7870130"/>
-              <a:ext cx="767715" cy="147637"/>
-            </a:xfrm>
-            <a:prstGeom prst="rect">
-              <a:avLst/>
-            </a:prstGeom>
-            <a:noFill/>
-          </p:spPr>
-          <p:txBody>
-            <a:bodyPr lIns="0" rIns="0" tIns="0" bIns="0" anchorCtr="1" anchor="ctr" wrap="none"/>
-            <a:lstStyle/>
-            <a:p>
-              <a:pPr algn="l" marL="0" marR="0" indent="0">
-                <a:lnSpc>
-                  <a:spcPts val="1280"/>
-                </a:lnSpc>
-                <a:spcBef>
-                  <a:spcPts val="0"/>
-                </a:spcBef>
-                <a:spcAft>
-                  <a:spcPts val="0"/>
-                </a:spcAft>
-              </a:pPr>
-              <a:r>
-                <a:rPr sz="1280">
-                  <a:solidFill>
-                    <a:srgbClr val="4D4D4D">
-                      <a:alpha val="100000"/>
-                    </a:srgbClr>
-                  </a:solidFill>
-                  <a:latin typeface="Times New Roman"/>
-                  <a:cs typeface="Times New Roman"/>
-                </a:rPr>
-                <a:t>Oviposition</a:t>
-              </a:r>
-            </a:p>
-          </p:txBody>
-        </p:sp>
-        <p:sp>
-          <p:nvSpPr>
-            <p:cNvPr id="155" name="tx155"/>
-            <p:cNvSpPr/>
-            <p:nvPr/>
-          </p:nvSpPr>
-          <p:spPr>
-            <a:xfrm>
-              <a:off x="282778" y="7692112"/>
-              <a:ext cx="1250076" cy="115093"/>
-            </a:xfrm>
-            <a:prstGeom prst="rect">
-              <a:avLst/>
-            </a:prstGeom>
-            <a:noFill/>
-          </p:spPr>
-          <p:txBody>
-            <a:bodyPr lIns="0" rIns="0" tIns="0" bIns="0" anchorCtr="1" anchor="ctr" wrap="none"/>
-            <a:lstStyle/>
-            <a:p>
-              <a:pPr algn="l" marL="0" marR="0" indent="0">
-                <a:lnSpc>
-                  <a:spcPts val="1280"/>
-                </a:lnSpc>
-                <a:spcBef>
-                  <a:spcPts val="0"/>
-                </a:spcBef>
-                <a:spcAft>
-                  <a:spcPts val="0"/>
-                </a:spcAft>
-              </a:pPr>
-              <a:r>
-                <a:rPr sz="1280">
-                  <a:solidFill>
-                    <a:srgbClr val="4D4D4D">
-                      <a:alpha val="100000"/>
-                    </a:srgbClr>
-                  </a:solidFill>
-                  <a:latin typeface="Times New Roman"/>
-                  <a:cs typeface="Times New Roman"/>
-                </a:rPr>
-                <a:t>Mechanical.Tactile</a:t>
-              </a:r>
-            </a:p>
-          </p:txBody>
-        </p:sp>
-        <p:sp>
-          <p:nvSpPr>
-            <p:cNvPr id="156" name="tx156"/>
-            <p:cNvSpPr/>
-            <p:nvPr/>
-          </p:nvSpPr>
-          <p:spPr>
-            <a:xfrm>
-              <a:off x="774665" y="7481551"/>
-              <a:ext cx="758189" cy="115093"/>
-            </a:xfrm>
-            <a:prstGeom prst="rect">
-              <a:avLst/>
-            </a:prstGeom>
-            <a:noFill/>
-          </p:spPr>
-          <p:txBody>
-            <a:bodyPr lIns="0" rIns="0" tIns="0" bIns="0" anchorCtr="1" anchor="ctr" wrap="none"/>
-            <a:lstStyle/>
-            <a:p>
-              <a:pPr algn="l" marL="0" marR="0" indent="0">
-                <a:lnSpc>
-                  <a:spcPts val="1280"/>
-                </a:lnSpc>
-                <a:spcBef>
-                  <a:spcPts val="0"/>
-                </a:spcBef>
-                <a:spcAft>
-                  <a:spcPts val="0"/>
-                </a:spcAft>
-              </a:pPr>
-              <a:r>
-                <a:rPr sz="1280">
-                  <a:solidFill>
-                    <a:srgbClr val="4D4D4D">
-                      <a:alpha val="100000"/>
-                    </a:srgbClr>
-                  </a:solidFill>
-                  <a:latin typeface="Times New Roman"/>
-                  <a:cs typeface="Times New Roman"/>
-                </a:rPr>
-                <a:t>Mechanical</a:t>
-              </a:r>
-            </a:p>
-          </p:txBody>
-        </p:sp>
-        <p:sp>
-          <p:nvSpPr>
-            <p:cNvPr id="157" name="pl157"/>
-            <p:cNvSpPr/>
-            <p:nvPr/>
-          </p:nvSpPr>
-          <p:spPr>
-            <a:xfrm>
-              <a:off x="1560691" y="8385075"/>
-              <a:ext cx="34794" cy="0"/>
-            </a:xfrm>
-            <a:custGeom>
-              <a:avLst/>
-              <a:pathLst>
-                <a:path w="34794" h="0">
-                  <a:moveTo>
-                    <a:pt x="0" y="0"/>
-                  </a:moveTo>
-                  <a:lnTo>
-                    <a:pt x="34794" y="0"/>
-                  </a:lnTo>
-                </a:path>
-              </a:pathLst>
-            </a:custGeom>
-            <a:ln w="13550" cap="flat">
-              <a:solidFill>
-                <a:srgbClr val="333333">
-                  <a:alpha val="100000"/>
-                </a:srgbClr>
-              </a:solidFill>
-              <a:prstDash val="solid"/>
-              <a:round/>
-            </a:ln>
-          </p:spPr>
-          <p:txBody>
-            <a:bodyPr/>
-            <a:lstStyle/>
-            <a:p/>
-          </p:txBody>
-        </p:sp>
-        <p:sp>
-          <p:nvSpPr>
-            <p:cNvPr id="158" name="pl158"/>
-            <p:cNvSpPr/>
-            <p:nvPr/>
-          </p:nvSpPr>
-          <p:spPr>
-            <a:xfrm>
-              <a:off x="1560691" y="8174513"/>
-              <a:ext cx="34794" cy="0"/>
-            </a:xfrm>
-            <a:custGeom>
-              <a:avLst/>
-              <a:pathLst>
-                <a:path w="34794" h="0">
-                  <a:moveTo>
-                    <a:pt x="0" y="0"/>
-                  </a:moveTo>
-                  <a:lnTo>
-                    <a:pt x="34794" y="0"/>
-                  </a:lnTo>
-                </a:path>
-              </a:pathLst>
-            </a:custGeom>
-            <a:ln w="13550" cap="flat">
-              <a:solidFill>
-                <a:srgbClr val="333333">
-                  <a:alpha val="100000"/>
-                </a:srgbClr>
-              </a:solidFill>
-              <a:prstDash val="solid"/>
-              <a:round/>
-            </a:ln>
-          </p:spPr>
-          <p:txBody>
-            <a:bodyPr/>
-            <a:lstStyle/>
-            <a:p/>
-          </p:txBody>
-        </p:sp>
-        <p:sp>
-          <p:nvSpPr>
-            <p:cNvPr id="159" name="pl159"/>
-            <p:cNvSpPr/>
-            <p:nvPr/>
-          </p:nvSpPr>
-          <p:spPr>
-            <a:xfrm>
-              <a:off x="1560691" y="7963952"/>
-              <a:ext cx="34794" cy="0"/>
-            </a:xfrm>
-            <a:custGeom>
-              <a:avLst/>
-              <a:pathLst>
-                <a:path w="34794" h="0">
-                  <a:moveTo>
-                    <a:pt x="0" y="0"/>
-                  </a:moveTo>
-                  <a:lnTo>
-                    <a:pt x="34794" y="0"/>
-                  </a:lnTo>
-                </a:path>
-              </a:pathLst>
-            </a:custGeom>
-            <a:ln w="13550" cap="flat">
-              <a:solidFill>
-                <a:srgbClr val="333333">
-                  <a:alpha val="100000"/>
-                </a:srgbClr>
-              </a:solidFill>
-              <a:prstDash val="solid"/>
-              <a:round/>
-            </a:ln>
-          </p:spPr>
-          <p:txBody>
-            <a:bodyPr/>
-            <a:lstStyle/>
-            <a:p/>
-          </p:txBody>
-        </p:sp>
-        <p:sp>
-          <p:nvSpPr>
-            <p:cNvPr id="160" name="pl160"/>
-            <p:cNvSpPr/>
-            <p:nvPr/>
-          </p:nvSpPr>
-          <p:spPr>
-            <a:xfrm>
-              <a:off x="1560691" y="7753390"/>
-              <a:ext cx="34794" cy="0"/>
-            </a:xfrm>
-            <a:custGeom>
-              <a:avLst/>
-              <a:pathLst>
-                <a:path w="34794" h="0">
-                  <a:moveTo>
-                    <a:pt x="0" y="0"/>
-                  </a:moveTo>
-                  <a:lnTo>
-                    <a:pt x="34794" y="0"/>
-                  </a:lnTo>
-                </a:path>
-              </a:pathLst>
-            </a:custGeom>
-            <a:ln w="13550" cap="flat">
-              <a:solidFill>
-                <a:srgbClr val="333333">
-                  <a:alpha val="100000"/>
-                </a:srgbClr>
-              </a:solidFill>
-              <a:prstDash val="solid"/>
-              <a:round/>
-            </a:ln>
-          </p:spPr>
-          <p:txBody>
-            <a:bodyPr/>
-            <a:lstStyle/>
-            <a:p/>
-          </p:txBody>
-        </p:sp>
-        <p:sp>
-          <p:nvSpPr>
-            <p:cNvPr id="161" name="pl161"/>
-            <p:cNvSpPr/>
-            <p:nvPr/>
-          </p:nvSpPr>
-          <p:spPr>
-            <a:xfrm>
-              <a:off x="1560691" y="7542828"/>
-              <a:ext cx="34794" cy="0"/>
-            </a:xfrm>
-            <a:custGeom>
-              <a:avLst/>
-              <a:pathLst>
-                <a:path w="34794" h="0">
-                  <a:moveTo>
-                    <a:pt x="0" y="0"/>
-                  </a:moveTo>
-                  <a:lnTo>
-                    <a:pt x="34794" y="0"/>
-                  </a:lnTo>
-                </a:path>
-              </a:pathLst>
-            </a:custGeom>
-            <a:ln w="13550" cap="flat">
-              <a:solidFill>
-                <a:srgbClr val="333333">
-                  <a:alpha val="100000"/>
-                </a:srgbClr>
-              </a:solidFill>
-              <a:prstDash val="solid"/>
-              <a:round/>
-            </a:ln>
-          </p:spPr>
-          <p:txBody>
-            <a:bodyPr/>
-            <a:lstStyle/>
-            <a:p/>
-          </p:txBody>
-        </p:sp>
-        <p:sp>
-          <p:nvSpPr>
-            <p:cNvPr id="162" name="tx162"/>
-            <p:cNvSpPr/>
-            <p:nvPr/>
-          </p:nvSpPr>
-          <p:spPr>
-            <a:xfrm>
-              <a:off x="1814419" y="8681505"/>
+            <p:cNvPr id="114" name="tx114"/>
+            <p:cNvSpPr/>
+            <p:nvPr/>
+          </p:nvSpPr>
+          <p:spPr>
+            <a:xfrm>
+              <a:off x="1814419" y="6090705"/>
               <a:ext cx="4305796" cy="204589"/>
             </a:xfrm>
             <a:prstGeom prst="rect">
@@ -9341,13 +7481,13 @@
         </p:sp>
         <p:sp>
           <p:nvSpPr>
-            <p:cNvPr id="163" name="tx163"/>
+            <p:cNvPr id="115" name="tx115"/>
             <p:cNvSpPr/>
             <p:nvPr/>
           </p:nvSpPr>
           <p:spPr>
             <a:xfrm rot="-5400000">
-              <a:off x="-155488" y="4345596"/>
+              <a:off x="-155488" y="3050196"/>
               <a:ext cx="575369" cy="143867"/>
             </a:xfrm>
             <a:prstGeom prst="rect">
@@ -9400,9 +7540,9 @@
 </file>
 
 <file path=ppt/theme/theme1.xml><?xml version="1.0" encoding="utf-8"?>
-<a:theme xmlns:a="http://schemas.openxmlformats.org/drawingml/2006/main" name="Tema de Office">
+<a:theme xmlns:a="http://schemas.openxmlformats.org/drawingml/2006/main" name="Office 2013 - Tema de 2022">
   <a:themeElements>
-    <a:clrScheme name="Tema de Office">
+    <a:clrScheme name="Office 2013 - Tema de 2022">
       <a:dk1>
         <a:sysClr val="windowText" lastClr="000000"/>
       </a:dk1>
@@ -9440,7 +7580,7 @@
         <a:srgbClr val="954F72"/>
       </a:folHlink>
     </a:clrScheme>
-    <a:fontScheme name="Tema de Office">
+    <a:fontScheme name="Office 2013 - Tema de 2022">
       <a:majorFont>
         <a:latin typeface="Calibri Light" panose="020F0302020204030204"/>
         <a:ea typeface=""/>
@@ -9512,7 +7652,7 @@
         <a:font script="Geor" typeface="Sylfaen"/>
       </a:minorFont>
     </a:fontScheme>
-    <a:fmtScheme name="Tema de Office">
+    <a:fmtScheme name="Office 2013 - Tema de 2022">
       <a:fillStyleLst>
         <a:solidFill>
           <a:schemeClr val="phClr"/>
@@ -9654,7 +7794,7 @@
   <a:extraClrSchemeLst/>
   <a:extLst>
     <a:ext uri="{05A4C25C-085E-4340-85A3-A5531E510DB2}">
-      <thm15:themeFamily xmlns:thm15="http://schemas.microsoft.com/office/thememl/2012/main" name="Office Theme 2013 - 2022" id="{62F939B6-93AF-4DB8-9C6B-D6C7DFDC589F}" vid="{4A3C46E8-61CC-4603-A589-7422A47A8E4A}"/>
+      <thm15:themeFamily xmlns:thm15="http://schemas.microsoft.com/office/thememl/2012/main" name="Office 2013 - 2022 Theme" id="{62F939B6-93AF-4DB8-9C6B-D6C7DFDC589F}" vid="{4A3C46E8-61CC-4603-A589-7422A47A8E4A}"/>
     </a:ext>
   </a:extLst>
 </a:theme>

</xml_diff>